<commit_message>
Adding a new slide.
</commit_message>
<xml_diff>
--- a/Introduction-to-CSS.pptx
+++ b/Introduction-to-CSS.pptx
@@ -6,9 +6,10 @@
   </p:sldMasterIdLst>
   <p:sldIdLst>
     <p:sldId id="256" r:id="rId2"/>
-    <p:sldId id="257" r:id="rId3"/>
-    <p:sldId id="258" r:id="rId4"/>
-    <p:sldId id="259" r:id="rId5"/>
+    <p:sldId id="260" r:id="rId3"/>
+    <p:sldId id="257" r:id="rId4"/>
+    <p:sldId id="258" r:id="rId5"/>
+    <p:sldId id="259" r:id="rId6"/>
   </p:sldIdLst>
   <p:sldSz cx="12192000" cy="6858000"/>
   <p:notesSz cx="6858000" cy="9144000"/>
@@ -107,11 +108,40 @@
       </a:defRPr>
     </a:lvl9pPr>
   </p:defaultTextStyle>
+  <p:extLst>
+    <p:ext uri="{EFAFB233-063F-42B5-8137-9DF3F51BA10A}">
+      <p15:sldGuideLst xmlns:p15="http://schemas.microsoft.com/office/powerpoint/2012/main"/>
+    </p:ext>
+  </p:extLst>
 </p:presentation>
 </file>
 
 <file path=ppt/changesInfos/changesInfo1.xml><?xml version="1.0" encoding="utf-8"?>
 <pc:chgInfo xmlns:a="http://schemas.openxmlformats.org/drawingml/2006/main" xmlns:r="http://schemas.openxmlformats.org/officeDocument/2006/relationships" xmlns:ac="http://schemas.microsoft.com/office/drawing/2013/main/command" xmlns:pc="http://schemas.microsoft.com/office/powerpoint/2013/main/command">
+  <pc:docChgLst>
+    <pc:chgData name="anum sharma" userId="f66cf99955dbac7d" providerId="LiveId" clId="{6E04F4B5-AC0F-493B-B1A2-008A2E900AEB}"/>
+    <pc:docChg chg="addSld modSld">
+      <pc:chgData name="anum sharma" userId="f66cf99955dbac7d" providerId="LiveId" clId="{6E04F4B5-AC0F-493B-B1A2-008A2E900AEB}" dt="2017-12-24T08:21:18.765" v="42" actId="20577"/>
+      <pc:docMkLst>
+        <pc:docMk/>
+      </pc:docMkLst>
+      <pc:sldChg chg="modSp add">
+        <pc:chgData name="anum sharma" userId="f66cf99955dbac7d" providerId="LiveId" clId="{6E04F4B5-AC0F-493B-B1A2-008A2E900AEB}" dt="2017-12-24T08:21:18.765" v="42" actId="20577"/>
+        <pc:sldMkLst>
+          <pc:docMk/>
+          <pc:sldMk cId="2696776914" sldId="260"/>
+        </pc:sldMkLst>
+        <pc:spChg chg="mod">
+          <ac:chgData name="anum sharma" userId="f66cf99955dbac7d" providerId="LiveId" clId="{6E04F4B5-AC0F-493B-B1A2-008A2E900AEB}" dt="2017-12-24T08:21:18.765" v="42" actId="20577"/>
+          <ac:spMkLst>
+            <pc:docMk/>
+            <pc:sldMk cId="2696776914" sldId="260"/>
+            <ac:spMk id="2" creationId="{9E35EAED-7E6B-4221-BE5D-7FD70FC2A68B}"/>
+          </ac:spMkLst>
+        </pc:spChg>
+      </pc:sldChg>
+    </pc:docChg>
+  </pc:docChgLst>
   <pc:docChgLst>
     <pc:chgData name="anum sharma" userId="f66cf99955dbac7d" providerId="LiveId" clId="{CD544E5D-E21A-4EAF-A770-71D9981BA413}"/>
     <pc:docChg chg="undo custSel addSld modSld">
@@ -10475,7 +10505,7 @@
             <a:fld id="{B61BEF0D-F0BB-DE4B-95CE-6DB70DBA9567}" type="datetimeFigureOut">
               <a:rPr lang="en-US" smtClean="0"/>
               <a:pPr/>
-              <a:t>12/22/2017</a:t>
+              <a:t>12/24/2017</a:t>
             </a:fld>
             <a:endParaRPr lang="en-US" dirty="0"/>
           </a:p>
@@ -10728,7 +10758,7 @@
             <a:fld id="{B61BEF0D-F0BB-DE4B-95CE-6DB70DBA9567}" type="datetimeFigureOut">
               <a:rPr lang="en-US" smtClean="0"/>
               <a:pPr/>
-              <a:t>12/22/2017</a:t>
+              <a:t>12/24/2017</a:t>
             </a:fld>
             <a:endParaRPr lang="en-US" dirty="0"/>
           </a:p>
@@ -11044,7 +11074,7 @@
             <a:fld id="{B61BEF0D-F0BB-DE4B-95CE-6DB70DBA9567}" type="datetimeFigureOut">
               <a:rPr lang="en-US" smtClean="0"/>
               <a:pPr/>
-              <a:t>12/22/2017</a:t>
+              <a:t>12/24/2017</a:t>
             </a:fld>
             <a:endParaRPr lang="en-US" dirty="0"/>
           </a:p>
@@ -11387,7 +11417,7 @@
             <a:fld id="{B61BEF0D-F0BB-DE4B-95CE-6DB70DBA9567}" type="datetimeFigureOut">
               <a:rPr lang="en-US" smtClean="0"/>
               <a:pPr/>
-              <a:t>12/22/2017</a:t>
+              <a:t>12/24/2017</a:t>
             </a:fld>
             <a:endParaRPr lang="en-US" dirty="0"/>
           </a:p>
@@ -11703,7 +11733,7 @@
             <a:fld id="{B61BEF0D-F0BB-DE4B-95CE-6DB70DBA9567}" type="datetimeFigureOut">
               <a:rPr lang="en-US" smtClean="0"/>
               <a:pPr/>
-              <a:t>12/22/2017</a:t>
+              <a:t>12/24/2017</a:t>
             </a:fld>
             <a:endParaRPr lang="en-US" dirty="0"/>
           </a:p>
@@ -12098,7 +12128,7 @@
             <a:fld id="{B61BEF0D-F0BB-DE4B-95CE-6DB70DBA9567}" type="datetimeFigureOut">
               <a:rPr lang="en-US" smtClean="0"/>
               <a:pPr/>
-              <a:t>12/22/2017</a:t>
+              <a:t>12/24/2017</a:t>
             </a:fld>
             <a:endParaRPr lang="en-US" dirty="0"/>
           </a:p>
@@ -12269,7 +12299,7 @@
           <a:p>
             <a:fld id="{55C6B4A9-1611-4792-9094-5F34BCA07E0B}" type="datetimeFigureOut">
               <a:rPr lang="en-US" smtClean="0"/>
-              <a:t>12/22/2017</a:t>
+              <a:t>12/24/2017</a:t>
             </a:fld>
             <a:endParaRPr lang="en-US" dirty="0"/>
           </a:p>
@@ -12450,7 +12480,7 @@
             <a:fld id="{B61BEF0D-F0BB-DE4B-95CE-6DB70DBA9567}" type="datetimeFigureOut">
               <a:rPr lang="en-US" smtClean="0"/>
               <a:pPr/>
-              <a:t>12/22/2017</a:t>
+              <a:t>12/24/2017</a:t>
             </a:fld>
             <a:endParaRPr lang="en-US" dirty="0"/>
           </a:p>
@@ -12628,7 +12658,7 @@
             <a:fld id="{B61BEF0D-F0BB-DE4B-95CE-6DB70DBA9567}" type="datetimeFigureOut">
               <a:rPr lang="en-US" smtClean="0"/>
               <a:pPr/>
-              <a:t>12/22/2017</a:t>
+              <a:t>12/24/2017</a:t>
             </a:fld>
             <a:endParaRPr lang="en-US" dirty="0"/>
           </a:p>
@@ -12877,7 +12907,7 @@
             <a:fld id="{B61BEF0D-F0BB-DE4B-95CE-6DB70DBA9567}" type="datetimeFigureOut">
               <a:rPr lang="en-US" smtClean="0"/>
               <a:pPr/>
-              <a:t>12/22/2017</a:t>
+              <a:t>12/24/2017</a:t>
             </a:fld>
             <a:endParaRPr lang="en-US" dirty="0"/>
           </a:p>
@@ -13110,7 +13140,7 @@
           <a:p>
             <a:fld id="{EB712588-04B1-427B-82EE-E8DB90309F08}" type="datetimeFigureOut">
               <a:rPr lang="en-US" smtClean="0"/>
-              <a:t>12/22/2017</a:t>
+              <a:t>12/24/2017</a:t>
             </a:fld>
             <a:endParaRPr lang="en-US" dirty="0"/>
           </a:p>
@@ -13485,7 +13515,7 @@
             <a:fld id="{B61BEF0D-F0BB-DE4B-95CE-6DB70DBA9567}" type="datetimeFigureOut">
               <a:rPr lang="en-US" smtClean="0"/>
               <a:pPr/>
-              <a:t>12/22/2017</a:t>
+              <a:t>12/24/2017</a:t>
             </a:fld>
             <a:endParaRPr lang="en-US" dirty="0"/>
           </a:p>
@@ -13610,7 +13640,7 @@
             <a:fld id="{B61BEF0D-F0BB-DE4B-95CE-6DB70DBA9567}" type="datetimeFigureOut">
               <a:rPr lang="en-US" smtClean="0"/>
               <a:pPr/>
-              <a:t>12/22/2017</a:t>
+              <a:t>12/24/2017</a:t>
             </a:fld>
             <a:endParaRPr lang="en-US" dirty="0"/>
           </a:p>
@@ -13707,7 +13737,7 @@
             <a:fld id="{B61BEF0D-F0BB-DE4B-95CE-6DB70DBA9567}" type="datetimeFigureOut">
               <a:rPr lang="en-US" smtClean="0"/>
               <a:pPr/>
-              <a:t>12/22/2017</a:t>
+              <a:t>12/24/2017</a:t>
             </a:fld>
             <a:endParaRPr lang="en-US" dirty="0"/>
           </a:p>
@@ -13963,7 +13993,7 @@
           <a:p>
             <a:fld id="{42A54C80-263E-416B-A8E0-580EDEADCBDC}" type="datetimeFigureOut">
               <a:rPr lang="en-US" smtClean="0"/>
-              <a:t>12/22/2017</a:t>
+              <a:t>12/24/2017</a:t>
             </a:fld>
             <a:endParaRPr lang="en-US" dirty="0"/>
           </a:p>
@@ -14227,7 +14257,7 @@
             <a:fld id="{B61BEF0D-F0BB-DE4B-95CE-6DB70DBA9567}" type="datetimeFigureOut">
               <a:rPr lang="en-US" smtClean="0"/>
               <a:pPr/>
-              <a:t>12/22/2017</a:t>
+              <a:t>12/24/2017</a:t>
             </a:fld>
             <a:endParaRPr lang="en-US" dirty="0"/>
           </a:p>
@@ -14972,7 +15002,7 @@
             <a:fld id="{B61BEF0D-F0BB-DE4B-95CE-6DB70DBA9567}" type="datetimeFigureOut">
               <a:rPr lang="en-US" smtClean="0"/>
               <a:pPr/>
-              <a:t>12/22/2017</a:t>
+              <a:t>12/24/2017</a:t>
             </a:fld>
             <a:endParaRPr lang="en-US" dirty="0"/>
           </a:p>
@@ -16293,6 +16323,93 @@
 <file path=ppt/slides/slide2.xml><?xml version="1.0" encoding="utf-8"?>
 <p:sld xmlns:a="http://schemas.openxmlformats.org/drawingml/2006/main" xmlns:r="http://schemas.openxmlformats.org/officeDocument/2006/relationships" xmlns:p="http://schemas.openxmlformats.org/presentationml/2006/main">
   <p:cSld>
+    <p:spTree>
+      <p:nvGrpSpPr>
+        <p:cNvPr id="1" name=""/>
+        <p:cNvGrpSpPr/>
+        <p:nvPr/>
+      </p:nvGrpSpPr>
+      <p:grpSpPr>
+        <a:xfrm>
+          <a:off x="0" y="0"/>
+          <a:ext cx="0" cy="0"/>
+          <a:chOff x="0" y="0"/>
+          <a:chExt cx="0" cy="0"/>
+        </a:xfrm>
+      </p:grpSpPr>
+      <p:sp>
+        <p:nvSpPr>
+          <p:cNvPr id="2" name="Title 1">
+            <a:extLst>
+              <a:ext uri="{FF2B5EF4-FFF2-40B4-BE49-F238E27FC236}">
+                <a16:creationId xmlns:a16="http://schemas.microsoft.com/office/drawing/2014/main" id="{9E35EAED-7E6B-4221-BE5D-7FD70FC2A68B}"/>
+              </a:ext>
+            </a:extLst>
+          </p:cNvPr>
+          <p:cNvSpPr>
+            <a:spLocks noGrp="1"/>
+          </p:cNvSpPr>
+          <p:nvPr>
+            <p:ph type="title"/>
+          </p:nvPr>
+        </p:nvSpPr>
+        <p:spPr/>
+        <p:txBody>
+          <a:bodyPr/>
+          <a:lstStyle/>
+          <a:p>
+            <a:r>
+              <a:rPr lang="en-US" dirty="0"/>
+              <a:t>Adding a </a:t>
+            </a:r>
+            <a:r>
+              <a:rPr lang="en-US"/>
+              <a:t>new slide</a:t>
+            </a:r>
+          </a:p>
+        </p:txBody>
+      </p:sp>
+      <p:sp>
+        <p:nvSpPr>
+          <p:cNvPr id="3" name="Content Placeholder 2">
+            <a:extLst>
+              <a:ext uri="{FF2B5EF4-FFF2-40B4-BE49-F238E27FC236}">
+                <a16:creationId xmlns:a16="http://schemas.microsoft.com/office/drawing/2014/main" id="{94C31EE9-29F5-4DAA-A148-B87ACC2E0CF9}"/>
+              </a:ext>
+            </a:extLst>
+          </p:cNvPr>
+          <p:cNvSpPr>
+            <a:spLocks noGrp="1"/>
+          </p:cNvSpPr>
+          <p:nvPr>
+            <p:ph idx="1"/>
+          </p:nvPr>
+        </p:nvSpPr>
+        <p:spPr/>
+        <p:txBody>
+          <a:bodyPr/>
+          <a:lstStyle/>
+          <a:p>
+            <a:endParaRPr lang="en-US"/>
+          </a:p>
+        </p:txBody>
+      </p:sp>
+    </p:spTree>
+    <p:extLst>
+      <p:ext uri="{BB962C8B-B14F-4D97-AF65-F5344CB8AC3E}">
+        <p14:creationId xmlns:p14="http://schemas.microsoft.com/office/powerpoint/2010/main" val="2696776914"/>
+      </p:ext>
+    </p:extLst>
+  </p:cSld>
+  <p:clrMapOvr>
+    <a:masterClrMapping/>
+  </p:clrMapOvr>
+</p:sld>
+</file>
+
+<file path=ppt/slides/slide3.xml><?xml version="1.0" encoding="utf-8"?>
+<p:sld xmlns:a="http://schemas.openxmlformats.org/drawingml/2006/main" xmlns:r="http://schemas.openxmlformats.org/officeDocument/2006/relationships" xmlns:p="http://schemas.openxmlformats.org/presentationml/2006/main">
+  <p:cSld>
     <p:bg>
       <p:bgPr>
         <a:solidFill>
@@ -17113,7 +17230,7 @@
 </p:sld>
 </file>
 
-<file path=ppt/slides/slide3.xml><?xml version="1.0" encoding="utf-8"?>
+<file path=ppt/slides/slide4.xml><?xml version="1.0" encoding="utf-8"?>
 <p:sld xmlns:a="http://schemas.openxmlformats.org/drawingml/2006/main" xmlns:r="http://schemas.openxmlformats.org/officeDocument/2006/relationships" xmlns:p="http://schemas.openxmlformats.org/presentationml/2006/main">
   <p:cSld>
     <p:bg>
@@ -17936,7 +18053,7 @@
 </p:sld>
 </file>
 
-<file path=ppt/slides/slide4.xml><?xml version="1.0" encoding="utf-8"?>
+<file path=ppt/slides/slide5.xml><?xml version="1.0" encoding="utf-8"?>
 <p:sld xmlns:a="http://schemas.openxmlformats.org/drawingml/2006/main" xmlns:r="http://schemas.openxmlformats.org/officeDocument/2006/relationships" xmlns:p="http://schemas.openxmlformats.org/presentationml/2006/main">
   <p:cSld>
     <p:bg>

</xml_diff>

<commit_message>
feat: Add CSS syntax
</commit_message>
<xml_diff>
--- a/Introduction-to-CSS.pptx
+++ b/Introduction-to-CSS.pptx
@@ -6,10 +6,10 @@
   </p:sldMasterIdLst>
   <p:sldIdLst>
     <p:sldId id="256" r:id="rId2"/>
-    <p:sldId id="260" r:id="rId3"/>
-    <p:sldId id="257" r:id="rId4"/>
-    <p:sldId id="258" r:id="rId5"/>
-    <p:sldId id="259" r:id="rId6"/>
+    <p:sldId id="257" r:id="rId3"/>
+    <p:sldId id="258" r:id="rId4"/>
+    <p:sldId id="259" r:id="rId5"/>
+    <p:sldId id="260" r:id="rId6"/>
   </p:sldIdLst>
   <p:sldSz cx="12192000" cy="6858000"/>
   <p:notesSz cx="6858000" cy="9144000"/>
@@ -120,23 +120,31 @@
 <pc:chgInfo xmlns:a="http://schemas.openxmlformats.org/drawingml/2006/main" xmlns:r="http://schemas.openxmlformats.org/officeDocument/2006/relationships" xmlns:ac="http://schemas.microsoft.com/office/drawing/2013/main/command" xmlns:pc="http://schemas.microsoft.com/office/powerpoint/2013/main/command">
   <pc:docChgLst>
     <pc:chgData name="anum sharma" userId="f66cf99955dbac7d" providerId="LiveId" clId="{6E04F4B5-AC0F-493B-B1A2-008A2E900AEB}"/>
-    <pc:docChg chg="addSld modSld">
-      <pc:chgData name="anum sharma" userId="f66cf99955dbac7d" providerId="LiveId" clId="{6E04F4B5-AC0F-493B-B1A2-008A2E900AEB}" dt="2017-12-24T08:21:18.765" v="42" actId="20577"/>
+    <pc:docChg chg="undo custSel addSld modSld sldOrd">
+      <pc:chgData name="anum sharma" userId="f66cf99955dbac7d" providerId="LiveId" clId="{6E04F4B5-AC0F-493B-B1A2-008A2E900AEB}" dt="2017-12-25T08:32:45.546" v="247" actId="20577"/>
       <pc:docMkLst>
         <pc:docMk/>
       </pc:docMkLst>
-      <pc:sldChg chg="modSp add">
-        <pc:chgData name="anum sharma" userId="f66cf99955dbac7d" providerId="LiveId" clId="{6E04F4B5-AC0F-493B-B1A2-008A2E900AEB}" dt="2017-12-24T08:21:18.765" v="42" actId="20577"/>
+      <pc:sldChg chg="modSp add ord">
+        <pc:chgData name="anum sharma" userId="f66cf99955dbac7d" providerId="LiveId" clId="{6E04F4B5-AC0F-493B-B1A2-008A2E900AEB}" dt="2017-12-25T08:32:45.546" v="247" actId="20577"/>
         <pc:sldMkLst>
           <pc:docMk/>
           <pc:sldMk cId="2696776914" sldId="260"/>
         </pc:sldMkLst>
         <pc:spChg chg="mod">
-          <ac:chgData name="anum sharma" userId="f66cf99955dbac7d" providerId="LiveId" clId="{6E04F4B5-AC0F-493B-B1A2-008A2E900AEB}" dt="2017-12-24T08:21:18.765" v="42" actId="20577"/>
+          <ac:chgData name="anum sharma" userId="f66cf99955dbac7d" providerId="LiveId" clId="{6E04F4B5-AC0F-493B-B1A2-008A2E900AEB}" dt="2017-12-25T08:29:28.843" v="71" actId="20577"/>
           <ac:spMkLst>
             <pc:docMk/>
             <pc:sldMk cId="2696776914" sldId="260"/>
             <ac:spMk id="2" creationId="{9E35EAED-7E6B-4221-BE5D-7FD70FC2A68B}"/>
+          </ac:spMkLst>
+        </pc:spChg>
+        <pc:spChg chg="mod">
+          <ac:chgData name="anum sharma" userId="f66cf99955dbac7d" providerId="LiveId" clId="{6E04F4B5-AC0F-493B-B1A2-008A2E900AEB}" dt="2017-12-25T08:32:45.546" v="247" actId="20577"/>
+          <ac:spMkLst>
+            <pc:docMk/>
+            <pc:sldMk cId="2696776914" sldId="260"/>
+            <ac:spMk id="3" creationId="{94C31EE9-29F5-4DAA-A148-B87ACC2E0CF9}"/>
           </ac:spMkLst>
         </pc:spChg>
       </pc:sldChg>
@@ -10505,7 +10513,7 @@
             <a:fld id="{B61BEF0D-F0BB-DE4B-95CE-6DB70DBA9567}" type="datetimeFigureOut">
               <a:rPr lang="en-US" smtClean="0"/>
               <a:pPr/>
-              <a:t>12/24/2017</a:t>
+              <a:t>12/25/2017</a:t>
             </a:fld>
             <a:endParaRPr lang="en-US" dirty="0"/>
           </a:p>
@@ -10758,7 +10766,7 @@
             <a:fld id="{B61BEF0D-F0BB-DE4B-95CE-6DB70DBA9567}" type="datetimeFigureOut">
               <a:rPr lang="en-US" smtClean="0"/>
               <a:pPr/>
-              <a:t>12/24/2017</a:t>
+              <a:t>12/25/2017</a:t>
             </a:fld>
             <a:endParaRPr lang="en-US" dirty="0"/>
           </a:p>
@@ -11074,7 +11082,7 @@
             <a:fld id="{B61BEF0D-F0BB-DE4B-95CE-6DB70DBA9567}" type="datetimeFigureOut">
               <a:rPr lang="en-US" smtClean="0"/>
               <a:pPr/>
-              <a:t>12/24/2017</a:t>
+              <a:t>12/25/2017</a:t>
             </a:fld>
             <a:endParaRPr lang="en-US" dirty="0"/>
           </a:p>
@@ -11417,7 +11425,7 @@
             <a:fld id="{B61BEF0D-F0BB-DE4B-95CE-6DB70DBA9567}" type="datetimeFigureOut">
               <a:rPr lang="en-US" smtClean="0"/>
               <a:pPr/>
-              <a:t>12/24/2017</a:t>
+              <a:t>12/25/2017</a:t>
             </a:fld>
             <a:endParaRPr lang="en-US" dirty="0"/>
           </a:p>
@@ -11733,7 +11741,7 @@
             <a:fld id="{B61BEF0D-F0BB-DE4B-95CE-6DB70DBA9567}" type="datetimeFigureOut">
               <a:rPr lang="en-US" smtClean="0"/>
               <a:pPr/>
-              <a:t>12/24/2017</a:t>
+              <a:t>12/25/2017</a:t>
             </a:fld>
             <a:endParaRPr lang="en-US" dirty="0"/>
           </a:p>
@@ -12128,7 +12136,7 @@
             <a:fld id="{B61BEF0D-F0BB-DE4B-95CE-6DB70DBA9567}" type="datetimeFigureOut">
               <a:rPr lang="en-US" smtClean="0"/>
               <a:pPr/>
-              <a:t>12/24/2017</a:t>
+              <a:t>12/25/2017</a:t>
             </a:fld>
             <a:endParaRPr lang="en-US" dirty="0"/>
           </a:p>
@@ -12299,7 +12307,7 @@
           <a:p>
             <a:fld id="{55C6B4A9-1611-4792-9094-5F34BCA07E0B}" type="datetimeFigureOut">
               <a:rPr lang="en-US" smtClean="0"/>
-              <a:t>12/24/2017</a:t>
+              <a:t>12/25/2017</a:t>
             </a:fld>
             <a:endParaRPr lang="en-US" dirty="0"/>
           </a:p>
@@ -12480,7 +12488,7 @@
             <a:fld id="{B61BEF0D-F0BB-DE4B-95CE-6DB70DBA9567}" type="datetimeFigureOut">
               <a:rPr lang="en-US" smtClean="0"/>
               <a:pPr/>
-              <a:t>12/24/2017</a:t>
+              <a:t>12/25/2017</a:t>
             </a:fld>
             <a:endParaRPr lang="en-US" dirty="0"/>
           </a:p>
@@ -12658,7 +12666,7 @@
             <a:fld id="{B61BEF0D-F0BB-DE4B-95CE-6DB70DBA9567}" type="datetimeFigureOut">
               <a:rPr lang="en-US" smtClean="0"/>
               <a:pPr/>
-              <a:t>12/24/2017</a:t>
+              <a:t>12/25/2017</a:t>
             </a:fld>
             <a:endParaRPr lang="en-US" dirty="0"/>
           </a:p>
@@ -12907,7 +12915,7 @@
             <a:fld id="{B61BEF0D-F0BB-DE4B-95CE-6DB70DBA9567}" type="datetimeFigureOut">
               <a:rPr lang="en-US" smtClean="0"/>
               <a:pPr/>
-              <a:t>12/24/2017</a:t>
+              <a:t>12/25/2017</a:t>
             </a:fld>
             <a:endParaRPr lang="en-US" dirty="0"/>
           </a:p>
@@ -13140,7 +13148,7 @@
           <a:p>
             <a:fld id="{EB712588-04B1-427B-82EE-E8DB90309F08}" type="datetimeFigureOut">
               <a:rPr lang="en-US" smtClean="0"/>
-              <a:t>12/24/2017</a:t>
+              <a:t>12/25/2017</a:t>
             </a:fld>
             <a:endParaRPr lang="en-US" dirty="0"/>
           </a:p>
@@ -13515,7 +13523,7 @@
             <a:fld id="{B61BEF0D-F0BB-DE4B-95CE-6DB70DBA9567}" type="datetimeFigureOut">
               <a:rPr lang="en-US" smtClean="0"/>
               <a:pPr/>
-              <a:t>12/24/2017</a:t>
+              <a:t>12/25/2017</a:t>
             </a:fld>
             <a:endParaRPr lang="en-US" dirty="0"/>
           </a:p>
@@ -13640,7 +13648,7 @@
             <a:fld id="{B61BEF0D-F0BB-DE4B-95CE-6DB70DBA9567}" type="datetimeFigureOut">
               <a:rPr lang="en-US" smtClean="0"/>
               <a:pPr/>
-              <a:t>12/24/2017</a:t>
+              <a:t>12/25/2017</a:t>
             </a:fld>
             <a:endParaRPr lang="en-US" dirty="0"/>
           </a:p>
@@ -13737,7 +13745,7 @@
             <a:fld id="{B61BEF0D-F0BB-DE4B-95CE-6DB70DBA9567}" type="datetimeFigureOut">
               <a:rPr lang="en-US" smtClean="0"/>
               <a:pPr/>
-              <a:t>12/24/2017</a:t>
+              <a:t>12/25/2017</a:t>
             </a:fld>
             <a:endParaRPr lang="en-US" dirty="0"/>
           </a:p>
@@ -13993,7 +14001,7 @@
           <a:p>
             <a:fld id="{42A54C80-263E-416B-A8E0-580EDEADCBDC}" type="datetimeFigureOut">
               <a:rPr lang="en-US" smtClean="0"/>
-              <a:t>12/24/2017</a:t>
+              <a:t>12/25/2017</a:t>
             </a:fld>
             <a:endParaRPr lang="en-US" dirty="0"/>
           </a:p>
@@ -14257,7 +14265,7 @@
             <a:fld id="{B61BEF0D-F0BB-DE4B-95CE-6DB70DBA9567}" type="datetimeFigureOut">
               <a:rPr lang="en-US" smtClean="0"/>
               <a:pPr/>
-              <a:t>12/24/2017</a:t>
+              <a:t>12/25/2017</a:t>
             </a:fld>
             <a:endParaRPr lang="en-US" dirty="0"/>
           </a:p>
@@ -15002,7 +15010,7 @@
             <a:fld id="{B61BEF0D-F0BB-DE4B-95CE-6DB70DBA9567}" type="datetimeFigureOut">
               <a:rPr lang="en-US" smtClean="0"/>
               <a:pPr/>
-              <a:t>12/24/2017</a:t>
+              <a:t>12/25/2017</a:t>
             </a:fld>
             <a:endParaRPr lang="en-US" dirty="0"/>
           </a:p>
@@ -16323,93 +16331,6 @@
 <file path=ppt/slides/slide2.xml><?xml version="1.0" encoding="utf-8"?>
 <p:sld xmlns:a="http://schemas.openxmlformats.org/drawingml/2006/main" xmlns:r="http://schemas.openxmlformats.org/officeDocument/2006/relationships" xmlns:p="http://schemas.openxmlformats.org/presentationml/2006/main">
   <p:cSld>
-    <p:spTree>
-      <p:nvGrpSpPr>
-        <p:cNvPr id="1" name=""/>
-        <p:cNvGrpSpPr/>
-        <p:nvPr/>
-      </p:nvGrpSpPr>
-      <p:grpSpPr>
-        <a:xfrm>
-          <a:off x="0" y="0"/>
-          <a:ext cx="0" cy="0"/>
-          <a:chOff x="0" y="0"/>
-          <a:chExt cx="0" cy="0"/>
-        </a:xfrm>
-      </p:grpSpPr>
-      <p:sp>
-        <p:nvSpPr>
-          <p:cNvPr id="2" name="Title 1">
-            <a:extLst>
-              <a:ext uri="{FF2B5EF4-FFF2-40B4-BE49-F238E27FC236}">
-                <a16:creationId xmlns:a16="http://schemas.microsoft.com/office/drawing/2014/main" id="{9E35EAED-7E6B-4221-BE5D-7FD70FC2A68B}"/>
-              </a:ext>
-            </a:extLst>
-          </p:cNvPr>
-          <p:cNvSpPr>
-            <a:spLocks noGrp="1"/>
-          </p:cNvSpPr>
-          <p:nvPr>
-            <p:ph type="title"/>
-          </p:nvPr>
-        </p:nvSpPr>
-        <p:spPr/>
-        <p:txBody>
-          <a:bodyPr/>
-          <a:lstStyle/>
-          <a:p>
-            <a:r>
-              <a:rPr lang="en-US" dirty="0"/>
-              <a:t>Adding a </a:t>
-            </a:r>
-            <a:r>
-              <a:rPr lang="en-US"/>
-              <a:t>new slide</a:t>
-            </a:r>
-          </a:p>
-        </p:txBody>
-      </p:sp>
-      <p:sp>
-        <p:nvSpPr>
-          <p:cNvPr id="3" name="Content Placeholder 2">
-            <a:extLst>
-              <a:ext uri="{FF2B5EF4-FFF2-40B4-BE49-F238E27FC236}">
-                <a16:creationId xmlns:a16="http://schemas.microsoft.com/office/drawing/2014/main" id="{94C31EE9-29F5-4DAA-A148-B87ACC2E0CF9}"/>
-              </a:ext>
-            </a:extLst>
-          </p:cNvPr>
-          <p:cNvSpPr>
-            <a:spLocks noGrp="1"/>
-          </p:cNvSpPr>
-          <p:nvPr>
-            <p:ph idx="1"/>
-          </p:nvPr>
-        </p:nvSpPr>
-        <p:spPr/>
-        <p:txBody>
-          <a:bodyPr/>
-          <a:lstStyle/>
-          <a:p>
-            <a:endParaRPr lang="en-US"/>
-          </a:p>
-        </p:txBody>
-      </p:sp>
-    </p:spTree>
-    <p:extLst>
-      <p:ext uri="{BB962C8B-B14F-4D97-AF65-F5344CB8AC3E}">
-        <p14:creationId xmlns:p14="http://schemas.microsoft.com/office/powerpoint/2010/main" val="2696776914"/>
-      </p:ext>
-    </p:extLst>
-  </p:cSld>
-  <p:clrMapOvr>
-    <a:masterClrMapping/>
-  </p:clrMapOvr>
-</p:sld>
-</file>
-
-<file path=ppt/slides/slide3.xml><?xml version="1.0" encoding="utf-8"?>
-<p:sld xmlns:a="http://schemas.openxmlformats.org/drawingml/2006/main" xmlns:r="http://schemas.openxmlformats.org/officeDocument/2006/relationships" xmlns:p="http://schemas.openxmlformats.org/presentationml/2006/main">
-  <p:cSld>
     <p:bg>
       <p:bgPr>
         <a:solidFill>
@@ -17230,7 +17151,7 @@
 </p:sld>
 </file>
 
-<file path=ppt/slides/slide4.xml><?xml version="1.0" encoding="utf-8"?>
+<file path=ppt/slides/slide3.xml><?xml version="1.0" encoding="utf-8"?>
 <p:sld xmlns:a="http://schemas.openxmlformats.org/drawingml/2006/main" xmlns:r="http://schemas.openxmlformats.org/officeDocument/2006/relationships" xmlns:p="http://schemas.openxmlformats.org/presentationml/2006/main">
   <p:cSld>
     <p:bg>
@@ -18053,7 +17974,7 @@
 </p:sld>
 </file>
 
-<file path=ppt/slides/slide5.xml><?xml version="1.0" encoding="utf-8"?>
+<file path=ppt/slides/slide4.xml><?xml version="1.0" encoding="utf-8"?>
 <p:sld xmlns:a="http://schemas.openxmlformats.org/drawingml/2006/main" xmlns:r="http://schemas.openxmlformats.org/officeDocument/2006/relationships" xmlns:p="http://schemas.openxmlformats.org/presentationml/2006/main">
   <p:cSld>
     <p:bg>
@@ -18876,6 +18797,175 @@
 </p:sld>
 </file>
 
+<file path=ppt/slides/slide5.xml><?xml version="1.0" encoding="utf-8"?>
+<p:sld xmlns:a="http://schemas.openxmlformats.org/drawingml/2006/main" xmlns:r="http://schemas.openxmlformats.org/officeDocument/2006/relationships" xmlns:p="http://schemas.openxmlformats.org/presentationml/2006/main">
+  <p:cSld>
+    <p:spTree>
+      <p:nvGrpSpPr>
+        <p:cNvPr id="1" name=""/>
+        <p:cNvGrpSpPr/>
+        <p:nvPr/>
+      </p:nvGrpSpPr>
+      <p:grpSpPr>
+        <a:xfrm>
+          <a:off x="0" y="0"/>
+          <a:ext cx="0" cy="0"/>
+          <a:chOff x="0" y="0"/>
+          <a:chExt cx="0" cy="0"/>
+        </a:xfrm>
+      </p:grpSpPr>
+      <p:sp>
+        <p:nvSpPr>
+          <p:cNvPr id="2" name="Title 1">
+            <a:extLst>
+              <a:ext uri="{FF2B5EF4-FFF2-40B4-BE49-F238E27FC236}">
+                <a16:creationId xmlns:a16="http://schemas.microsoft.com/office/drawing/2014/main" id="{9E35EAED-7E6B-4221-BE5D-7FD70FC2A68B}"/>
+              </a:ext>
+            </a:extLst>
+          </p:cNvPr>
+          <p:cNvSpPr>
+            <a:spLocks noGrp="1"/>
+          </p:cNvSpPr>
+          <p:nvPr>
+            <p:ph type="title"/>
+          </p:nvPr>
+        </p:nvSpPr>
+        <p:spPr/>
+        <p:txBody>
+          <a:bodyPr/>
+          <a:lstStyle/>
+          <a:p>
+            <a:r>
+              <a:rPr lang="en-US" dirty="0"/>
+              <a:t>CSS Syntax</a:t>
+            </a:r>
+          </a:p>
+        </p:txBody>
+      </p:sp>
+      <p:sp>
+        <p:nvSpPr>
+          <p:cNvPr id="3" name="Content Placeholder 2">
+            <a:extLst>
+              <a:ext uri="{FF2B5EF4-FFF2-40B4-BE49-F238E27FC236}">
+                <a16:creationId xmlns:a16="http://schemas.microsoft.com/office/drawing/2014/main" id="{94C31EE9-29F5-4DAA-A148-B87ACC2E0CF9}"/>
+              </a:ext>
+            </a:extLst>
+          </p:cNvPr>
+          <p:cNvSpPr>
+            <a:spLocks noGrp="1"/>
+          </p:cNvSpPr>
+          <p:nvPr>
+            <p:ph idx="1"/>
+          </p:nvPr>
+        </p:nvSpPr>
+        <p:spPr/>
+        <p:txBody>
+          <a:bodyPr>
+            <a:normAutofit/>
+          </a:bodyPr>
+          <a:lstStyle/>
+          <a:p>
+            <a:r>
+              <a:rPr lang="en-US" sz="1600" dirty="0">
+                <a:latin typeface="Times New Roman" panose="02020603050405020304" pitchFamily="18" charset="0"/>
+                <a:cs typeface="Times New Roman" panose="02020603050405020304" pitchFamily="18" charset="0"/>
+              </a:rPr>
+              <a:t>p </a:t>
+            </a:r>
+          </a:p>
+          <a:p>
+            <a:pPr marL="0" indent="0">
+              <a:buNone/>
+            </a:pPr>
+            <a:r>
+              <a:rPr lang="en-US" sz="1600" dirty="0">
+                <a:latin typeface="Times New Roman" panose="02020603050405020304" pitchFamily="18" charset="0"/>
+                <a:cs typeface="Times New Roman" panose="02020603050405020304" pitchFamily="18" charset="0"/>
+              </a:rPr>
+              <a:t>           {</a:t>
+            </a:r>
+          </a:p>
+          <a:p>
+            <a:pPr marL="914400" lvl="2" indent="0">
+              <a:buNone/>
+            </a:pPr>
+            <a:r>
+              <a:rPr lang="en-US" sz="1600" dirty="0" err="1">
+                <a:latin typeface="Times New Roman" panose="02020603050405020304" pitchFamily="18" charset="0"/>
+                <a:cs typeface="Times New Roman" panose="02020603050405020304" pitchFamily="18" charset="0"/>
+              </a:rPr>
+              <a:t>font-family:Arial</a:t>
+            </a:r>
+            <a:r>
+              <a:rPr lang="en-US" sz="1600" dirty="0">
+                <a:latin typeface="Times New Roman" panose="02020603050405020304" pitchFamily="18" charset="0"/>
+                <a:cs typeface="Times New Roman" panose="02020603050405020304" pitchFamily="18" charset="0"/>
+              </a:rPr>
+              <a:t>;</a:t>
+            </a:r>
+          </a:p>
+          <a:p>
+            <a:pPr marL="914400" lvl="2" indent="0">
+              <a:buNone/>
+            </a:pPr>
+            <a:r>
+              <a:rPr lang="en-US" sz="1600" dirty="0">
+                <a:latin typeface="Times New Roman" panose="02020603050405020304" pitchFamily="18" charset="0"/>
+                <a:cs typeface="Times New Roman" panose="02020603050405020304" pitchFamily="18" charset="0"/>
+              </a:rPr>
+              <a:t>font:size:10px;</a:t>
+            </a:r>
+          </a:p>
+          <a:p>
+            <a:pPr marL="914400" lvl="2" indent="0">
+              <a:buNone/>
+            </a:pPr>
+            <a:r>
+              <a:rPr lang="en-US" sz="1600" dirty="0">
+                <a:latin typeface="Times New Roman" panose="02020603050405020304" pitchFamily="18" charset="0"/>
+                <a:cs typeface="Times New Roman" panose="02020603050405020304" pitchFamily="18" charset="0"/>
+              </a:rPr>
+              <a:t>}</a:t>
+            </a:r>
+          </a:p>
+          <a:p>
+            <a:pPr marL="914400" lvl="2" indent="0">
+              <a:buNone/>
+            </a:pPr>
+            <a:r>
+              <a:rPr lang="en-US" sz="1600" dirty="0">
+                <a:latin typeface="Times New Roman" panose="02020603050405020304" pitchFamily="18" charset="0"/>
+                <a:cs typeface="Times New Roman" panose="02020603050405020304" pitchFamily="18" charset="0"/>
+              </a:rPr>
+              <a:t>Where p  is selector and  declaration blocks in the </a:t>
+            </a:r>
+            <a:r>
+              <a:rPr lang="en-US" sz="1600">
+                <a:latin typeface="Times New Roman" panose="02020603050405020304" pitchFamily="18" charset="0"/>
+                <a:cs typeface="Times New Roman" panose="02020603050405020304" pitchFamily="18" charset="0"/>
+              </a:rPr>
+              <a:t>curly braces.</a:t>
+            </a:r>
+            <a:endParaRPr lang="en-US" sz="1600" dirty="0">
+              <a:latin typeface="Times New Roman" panose="02020603050405020304" pitchFamily="18" charset="0"/>
+              <a:cs typeface="Times New Roman" panose="02020603050405020304" pitchFamily="18" charset="0"/>
+            </a:endParaRPr>
+          </a:p>
+        </p:txBody>
+      </p:sp>
+    </p:spTree>
+    <p:extLst>
+      <p:ext uri="{BB962C8B-B14F-4D97-AF65-F5344CB8AC3E}">
+        <p14:creationId xmlns:p14="http://schemas.microsoft.com/office/powerpoint/2010/main" val="2696776914"/>
+      </p:ext>
+    </p:extLst>
+  </p:cSld>
+  <p:clrMapOvr>
+    <a:masterClrMapping/>
+  </p:clrMapOvr>
+</p:sld>
+</file>
+
 <file path=ppt/theme/theme1.xml><?xml version="1.0" encoding="utf-8"?>
 <a:theme xmlns:a="http://schemas.openxmlformats.org/drawingml/2006/main" name="Facet">
   <a:themeElements>

</xml_diff>

<commit_message>
feat: Selectors- element specific
</commit_message>
<xml_diff>
--- a/Introduction-to-CSS.pptx
+++ b/Introduction-to-CSS.pptx
@@ -14,6 +14,7 @@
     <p:sldId id="262" r:id="rId8"/>
     <p:sldId id="263" r:id="rId9"/>
     <p:sldId id="264" r:id="rId10"/>
+    <p:sldId id="265" r:id="rId11"/>
   </p:sldIdLst>
   <p:sldSz cx="12192000" cy="6858000"/>
   <p:notesSz cx="6858000" cy="9144000"/>
@@ -125,7 +126,7 @@
   <pc:docChgLst>
     <pc:chgData name="anum sharma" userId="f66cf99955dbac7d" providerId="LiveId" clId="{6E04F4B5-AC0F-493B-B1A2-008A2E900AEB}"/>
     <pc:docChg chg="undo custSel addSld modSld sldOrd">
-      <pc:chgData name="anum sharma" userId="f66cf99955dbac7d" providerId="LiveId" clId="{6E04F4B5-AC0F-493B-B1A2-008A2E900AEB}" dt="2017-12-31T07:46:16.396" v="1628"/>
+      <pc:chgData name="anum sharma" userId="f66cf99955dbac7d" providerId="LiveId" clId="{6E04F4B5-AC0F-493B-B1A2-008A2E900AEB}" dt="2018-01-01T07:25:08.989" v="2135"/>
       <pc:docMkLst>
         <pc:docMk/>
       </pc:docMkLst>
@@ -241,6 +242,29 @@
             <pc:docMk/>
             <pc:sldMk cId="2984233788" sldId="264"/>
             <ac:spMk id="3" creationId="{7250A3D6-1804-44A1-893E-1A620BCD62E6}"/>
+          </ac:spMkLst>
+        </pc:spChg>
+      </pc:sldChg>
+      <pc:sldChg chg="modSp add">
+        <pc:chgData name="anum sharma" userId="f66cf99955dbac7d" providerId="LiveId" clId="{6E04F4B5-AC0F-493B-B1A2-008A2E900AEB}" dt="2018-01-01T07:25:08.989" v="2135"/>
+        <pc:sldMkLst>
+          <pc:docMk/>
+          <pc:sldMk cId="2502690904" sldId="265"/>
+        </pc:sldMkLst>
+        <pc:spChg chg="mod">
+          <ac:chgData name="anum sharma" userId="f66cf99955dbac7d" providerId="LiveId" clId="{6E04F4B5-AC0F-493B-B1A2-008A2E900AEB}" dt="2018-01-01T07:20:10.949" v="1661" actId="14100"/>
+          <ac:spMkLst>
+            <pc:docMk/>
+            <pc:sldMk cId="2502690904" sldId="265"/>
+            <ac:spMk id="2" creationId="{002ABF38-DBFA-446C-B3C8-4AD8C792CE08}"/>
+          </ac:spMkLst>
+        </pc:spChg>
+        <pc:spChg chg="mod">
+          <ac:chgData name="anum sharma" userId="f66cf99955dbac7d" providerId="LiveId" clId="{6E04F4B5-AC0F-493B-B1A2-008A2E900AEB}" dt="2018-01-01T07:25:08.989" v="2135"/>
+          <ac:spMkLst>
+            <pc:docMk/>
+            <pc:sldMk cId="2502690904" sldId="265"/>
+            <ac:spMk id="3" creationId="{109A5BD3-1C82-4DD0-ACB0-B835F089F1BE}"/>
           </ac:spMkLst>
         </pc:spChg>
       </pc:sldChg>
@@ -10609,7 +10633,7 @@
             <a:fld id="{B61BEF0D-F0BB-DE4B-95CE-6DB70DBA9567}" type="datetimeFigureOut">
               <a:rPr lang="en-US" smtClean="0"/>
               <a:pPr/>
-              <a:t>12/30/2017</a:t>
+              <a:t>12/31/2017</a:t>
             </a:fld>
             <a:endParaRPr lang="en-US" dirty="0"/>
           </a:p>
@@ -10862,7 +10886,7 @@
             <a:fld id="{B61BEF0D-F0BB-DE4B-95CE-6DB70DBA9567}" type="datetimeFigureOut">
               <a:rPr lang="en-US" smtClean="0"/>
               <a:pPr/>
-              <a:t>12/30/2017</a:t>
+              <a:t>12/31/2017</a:t>
             </a:fld>
             <a:endParaRPr lang="en-US" dirty="0"/>
           </a:p>
@@ -11178,7 +11202,7 @@
             <a:fld id="{B61BEF0D-F0BB-DE4B-95CE-6DB70DBA9567}" type="datetimeFigureOut">
               <a:rPr lang="en-US" smtClean="0"/>
               <a:pPr/>
-              <a:t>12/30/2017</a:t>
+              <a:t>12/31/2017</a:t>
             </a:fld>
             <a:endParaRPr lang="en-US" dirty="0"/>
           </a:p>
@@ -11521,7 +11545,7 @@
             <a:fld id="{B61BEF0D-F0BB-DE4B-95CE-6DB70DBA9567}" type="datetimeFigureOut">
               <a:rPr lang="en-US" smtClean="0"/>
               <a:pPr/>
-              <a:t>12/30/2017</a:t>
+              <a:t>12/31/2017</a:t>
             </a:fld>
             <a:endParaRPr lang="en-US" dirty="0"/>
           </a:p>
@@ -11837,7 +11861,7 @@
             <a:fld id="{B61BEF0D-F0BB-DE4B-95CE-6DB70DBA9567}" type="datetimeFigureOut">
               <a:rPr lang="en-US" smtClean="0"/>
               <a:pPr/>
-              <a:t>12/30/2017</a:t>
+              <a:t>12/31/2017</a:t>
             </a:fld>
             <a:endParaRPr lang="en-US" dirty="0"/>
           </a:p>
@@ -12232,7 +12256,7 @@
             <a:fld id="{B61BEF0D-F0BB-DE4B-95CE-6DB70DBA9567}" type="datetimeFigureOut">
               <a:rPr lang="en-US" smtClean="0"/>
               <a:pPr/>
-              <a:t>12/30/2017</a:t>
+              <a:t>12/31/2017</a:t>
             </a:fld>
             <a:endParaRPr lang="en-US" dirty="0"/>
           </a:p>
@@ -12403,7 +12427,7 @@
           <a:p>
             <a:fld id="{55C6B4A9-1611-4792-9094-5F34BCA07E0B}" type="datetimeFigureOut">
               <a:rPr lang="en-US" smtClean="0"/>
-              <a:t>12/30/2017</a:t>
+              <a:t>12/31/2017</a:t>
             </a:fld>
             <a:endParaRPr lang="en-US" dirty="0"/>
           </a:p>
@@ -12584,7 +12608,7 @@
             <a:fld id="{B61BEF0D-F0BB-DE4B-95CE-6DB70DBA9567}" type="datetimeFigureOut">
               <a:rPr lang="en-US" smtClean="0"/>
               <a:pPr/>
-              <a:t>12/30/2017</a:t>
+              <a:t>12/31/2017</a:t>
             </a:fld>
             <a:endParaRPr lang="en-US" dirty="0"/>
           </a:p>
@@ -12762,7 +12786,7 @@
             <a:fld id="{B61BEF0D-F0BB-DE4B-95CE-6DB70DBA9567}" type="datetimeFigureOut">
               <a:rPr lang="en-US" smtClean="0"/>
               <a:pPr/>
-              <a:t>12/30/2017</a:t>
+              <a:t>12/31/2017</a:t>
             </a:fld>
             <a:endParaRPr lang="en-US" dirty="0"/>
           </a:p>
@@ -13011,7 +13035,7 @@
             <a:fld id="{B61BEF0D-F0BB-DE4B-95CE-6DB70DBA9567}" type="datetimeFigureOut">
               <a:rPr lang="en-US" smtClean="0"/>
               <a:pPr/>
-              <a:t>12/30/2017</a:t>
+              <a:t>12/31/2017</a:t>
             </a:fld>
             <a:endParaRPr lang="en-US" dirty="0"/>
           </a:p>
@@ -13244,7 +13268,7 @@
           <a:p>
             <a:fld id="{EB712588-04B1-427B-82EE-E8DB90309F08}" type="datetimeFigureOut">
               <a:rPr lang="en-US" smtClean="0"/>
-              <a:t>12/30/2017</a:t>
+              <a:t>12/31/2017</a:t>
             </a:fld>
             <a:endParaRPr lang="en-US" dirty="0"/>
           </a:p>
@@ -13619,7 +13643,7 @@
             <a:fld id="{B61BEF0D-F0BB-DE4B-95CE-6DB70DBA9567}" type="datetimeFigureOut">
               <a:rPr lang="en-US" smtClean="0"/>
               <a:pPr/>
-              <a:t>12/30/2017</a:t>
+              <a:t>12/31/2017</a:t>
             </a:fld>
             <a:endParaRPr lang="en-US" dirty="0"/>
           </a:p>
@@ -13744,7 +13768,7 @@
             <a:fld id="{B61BEF0D-F0BB-DE4B-95CE-6DB70DBA9567}" type="datetimeFigureOut">
               <a:rPr lang="en-US" smtClean="0"/>
               <a:pPr/>
-              <a:t>12/30/2017</a:t>
+              <a:t>12/31/2017</a:t>
             </a:fld>
             <a:endParaRPr lang="en-US" dirty="0"/>
           </a:p>
@@ -13841,7 +13865,7 @@
             <a:fld id="{B61BEF0D-F0BB-DE4B-95CE-6DB70DBA9567}" type="datetimeFigureOut">
               <a:rPr lang="en-US" smtClean="0"/>
               <a:pPr/>
-              <a:t>12/30/2017</a:t>
+              <a:t>12/31/2017</a:t>
             </a:fld>
             <a:endParaRPr lang="en-US" dirty="0"/>
           </a:p>
@@ -14097,7 +14121,7 @@
           <a:p>
             <a:fld id="{42A54C80-263E-416B-A8E0-580EDEADCBDC}" type="datetimeFigureOut">
               <a:rPr lang="en-US" smtClean="0"/>
-              <a:t>12/30/2017</a:t>
+              <a:t>12/31/2017</a:t>
             </a:fld>
             <a:endParaRPr lang="en-US" dirty="0"/>
           </a:p>
@@ -14361,7 +14385,7 @@
             <a:fld id="{B61BEF0D-F0BB-DE4B-95CE-6DB70DBA9567}" type="datetimeFigureOut">
               <a:rPr lang="en-US" smtClean="0"/>
               <a:pPr/>
-              <a:t>12/30/2017</a:t>
+              <a:t>12/31/2017</a:t>
             </a:fld>
             <a:endParaRPr lang="en-US" dirty="0"/>
           </a:p>
@@ -15106,7 +15130,7 @@
             <a:fld id="{B61BEF0D-F0BB-DE4B-95CE-6DB70DBA9567}" type="datetimeFigureOut">
               <a:rPr lang="en-US" smtClean="0"/>
               <a:pPr/>
-              <a:t>12/30/2017</a:t>
+              <a:t>12/31/2017</a:t>
             </a:fld>
             <a:endParaRPr lang="en-US" dirty="0"/>
           </a:p>
@@ -16420,6 +16444,174 @@
   </p:cSld>
   <p:clrMapOvr>
     <a:overrideClrMapping bg1="dk1" tx1="lt1" bg2="dk2" tx2="lt2" accent1="accent1" accent2="accent2" accent3="accent3" accent4="accent4" accent5="accent5" accent6="accent6" hlink="hlink" folHlink="folHlink"/>
+  </p:clrMapOvr>
+</p:sld>
+</file>
+
+<file path=ppt/slides/slide10.xml><?xml version="1.0" encoding="utf-8"?>
+<p:sld xmlns:a="http://schemas.openxmlformats.org/drawingml/2006/main" xmlns:r="http://schemas.openxmlformats.org/officeDocument/2006/relationships" xmlns:p="http://schemas.openxmlformats.org/presentationml/2006/main">
+  <p:cSld>
+    <p:spTree>
+      <p:nvGrpSpPr>
+        <p:cNvPr id="1" name=""/>
+        <p:cNvGrpSpPr/>
+        <p:nvPr/>
+      </p:nvGrpSpPr>
+      <p:grpSpPr>
+        <a:xfrm>
+          <a:off x="0" y="0"/>
+          <a:ext cx="0" cy="0"/>
+          <a:chOff x="0" y="0"/>
+          <a:chExt cx="0" cy="0"/>
+        </a:xfrm>
+      </p:grpSpPr>
+      <p:sp>
+        <p:nvSpPr>
+          <p:cNvPr id="2" name="Title 1">
+            <a:extLst>
+              <a:ext uri="{FF2B5EF4-FFF2-40B4-BE49-F238E27FC236}">
+                <a16:creationId xmlns:a16="http://schemas.microsoft.com/office/drawing/2014/main" id="{002ABF38-DBFA-446C-B3C8-4AD8C792CE08}"/>
+              </a:ext>
+            </a:extLst>
+          </p:cNvPr>
+          <p:cNvSpPr>
+            <a:spLocks noGrp="1"/>
+          </p:cNvSpPr>
+          <p:nvPr>
+            <p:ph type="title"/>
+          </p:nvPr>
+        </p:nvSpPr>
+        <p:spPr>
+          <a:xfrm>
+            <a:off x="677334" y="609600"/>
+            <a:ext cx="8596668" cy="647700"/>
+          </a:xfrm>
+        </p:spPr>
+        <p:txBody>
+          <a:bodyPr/>
+          <a:lstStyle/>
+          <a:p>
+            <a:r>
+              <a:rPr lang="en-US" dirty="0"/>
+              <a:t>Class and ID Selector</a:t>
+            </a:r>
+          </a:p>
+        </p:txBody>
+      </p:sp>
+      <p:sp>
+        <p:nvSpPr>
+          <p:cNvPr id="3" name="Content Placeholder 2">
+            <a:extLst>
+              <a:ext uri="{FF2B5EF4-FFF2-40B4-BE49-F238E27FC236}">
+                <a16:creationId xmlns:a16="http://schemas.microsoft.com/office/drawing/2014/main" id="{109A5BD3-1C82-4DD0-ACB0-B835F089F1BE}"/>
+              </a:ext>
+            </a:extLst>
+          </p:cNvPr>
+          <p:cNvSpPr>
+            <a:spLocks noGrp="1"/>
+          </p:cNvSpPr>
+          <p:nvPr>
+            <p:ph idx="1"/>
+          </p:nvPr>
+        </p:nvSpPr>
+        <p:spPr/>
+        <p:txBody>
+          <a:bodyPr/>
+          <a:lstStyle/>
+          <a:p>
+            <a:r>
+              <a:rPr lang="en-US" dirty="0"/>
+              <a:t>One of the strengths of CSS that we have talked about is its ability to cascade, to combine CSS from multiple sources, enable inheritance of styles from parent to child theme.</a:t>
+            </a:r>
+          </a:p>
+          <a:p>
+            <a:r>
+              <a:rPr lang="en-US" dirty="0"/>
+              <a:t>IDs can only be used once on a page, their scope is more specific and they can override class based styles.</a:t>
+            </a:r>
+          </a:p>
+          <a:p>
+            <a:r>
+              <a:rPr lang="en-US" dirty="0"/>
+              <a:t>Example:</a:t>
+            </a:r>
+          </a:p>
+          <a:p>
+            <a:pPr lvl="3"/>
+            <a:r>
+              <a:rPr lang="en-US" dirty="0">
+                <a:solidFill>
+                  <a:srgbClr val="FF0000"/>
+                </a:solidFill>
+              </a:rPr>
+              <a:t>HTML: &lt;div id=“content” class=“main”&gt; </a:t>
+            </a:r>
+            <a:r>
+              <a:rPr lang="en-US" dirty="0" err="1">
+                <a:solidFill>
+                  <a:srgbClr val="FF0000"/>
+                </a:solidFill>
+              </a:rPr>
+              <a:t>Lopem</a:t>
+            </a:r>
+            <a:r>
+              <a:rPr lang="en-US" dirty="0">
+                <a:solidFill>
+                  <a:srgbClr val="FF0000"/>
+                </a:solidFill>
+              </a:rPr>
+              <a:t> ipsum &lt;/div&gt;</a:t>
+            </a:r>
+          </a:p>
+          <a:p>
+            <a:pPr lvl="3"/>
+            <a:r>
+              <a:rPr lang="en-US" dirty="0">
+                <a:solidFill>
+                  <a:srgbClr val="FF0000"/>
+                </a:solidFill>
+              </a:rPr>
+              <a:t>CSS:  #content { </a:t>
+            </a:r>
+            <a:r>
+              <a:rPr lang="en-US" dirty="0" err="1">
+                <a:solidFill>
+                  <a:srgbClr val="FF0000"/>
+                </a:solidFill>
+              </a:rPr>
+              <a:t>color:green</a:t>
+            </a:r>
+            <a:r>
+              <a:rPr lang="en-US" dirty="0">
+                <a:solidFill>
+                  <a:srgbClr val="FF0000"/>
+                </a:solidFill>
+              </a:rPr>
+              <a:t> }</a:t>
+            </a:r>
+          </a:p>
+          <a:p>
+            <a:pPr lvl="3"/>
+            <a:r>
+              <a:rPr lang="en-US" dirty="0">
+                <a:solidFill>
+                  <a:srgbClr val="FF0000"/>
+                </a:solidFill>
+              </a:rPr>
+              <a:t>CSS: .main { color: red}</a:t>
+            </a:r>
+          </a:p>
+        </p:txBody>
+      </p:sp>
+    </p:spTree>
+    <p:extLst>
+      <p:ext uri="{BB962C8B-B14F-4D97-AF65-F5344CB8AC3E}">
+        <p14:creationId xmlns:p14="http://schemas.microsoft.com/office/powerpoint/2010/main" val="2502690904"/>
+      </p:ext>
+    </p:extLst>
+  </p:cSld>
+  <p:clrMapOvr>
+    <a:masterClrMapping/>
   </p:clrMapOvr>
 </p:sld>
 </file>

</xml_diff>

<commit_message>
feat: Tips for working with CSS and HTML
</commit_message>
<xml_diff>
--- a/Introduction-to-CSS.pptx
+++ b/Introduction-to-CSS.pptx
@@ -17,6 +17,7 @@
     <p:sldId id="265" r:id="rId11"/>
     <p:sldId id="266" r:id="rId12"/>
     <p:sldId id="267" r:id="rId13"/>
+    <p:sldId id="268" r:id="rId14"/>
   </p:sldIdLst>
   <p:sldSz cx="12192000" cy="6858000"/>
   <p:notesSz cx="6858000" cy="9144000"/>
@@ -127,8 +128,8 @@
 <pc:chgInfo xmlns:a="http://schemas.openxmlformats.org/drawingml/2006/main" xmlns:r="http://schemas.openxmlformats.org/officeDocument/2006/relationships" xmlns:ac="http://schemas.microsoft.com/office/drawing/2013/main/command" xmlns:pc="http://schemas.microsoft.com/office/powerpoint/2013/main/command">
   <pc:docChgLst>
     <pc:chgData name="anum sharma" userId="f66cf99955dbac7d" providerId="LiveId" clId="{6E04F4B5-AC0F-493B-B1A2-008A2E900AEB}"/>
-    <pc:docChg chg="undo custSel addSld modSld sldOrd">
-      <pc:chgData name="anum sharma" userId="f66cf99955dbac7d" providerId="LiveId" clId="{6E04F4B5-AC0F-493B-B1A2-008A2E900AEB}" dt="2018-01-03T07:36:05.200" v="3073" actId="5793"/>
+    <pc:docChg chg="undo custSel addSld delSld modSld sldOrd">
+      <pc:chgData name="anum sharma" userId="f66cf99955dbac7d" providerId="LiveId" clId="{6E04F4B5-AC0F-493B-B1A2-008A2E900AEB}" dt="2018-01-04T01:20:58.206" v="3372" actId="26606"/>
       <pc:docMkLst>
         <pc:docMk/>
       </pc:docMkLst>
@@ -202,7 +203,7 @@
         </pc:spChg>
       </pc:sldChg>
       <pc:sldChg chg="modSp add">
-        <pc:chgData name="anum sharma" userId="f66cf99955dbac7d" providerId="LiveId" clId="{6E04F4B5-AC0F-493B-B1A2-008A2E900AEB}" dt="2017-12-30T07:50:47.987" v="1164"/>
+        <pc:chgData name="anum sharma" userId="f66cf99955dbac7d" providerId="LiveId" clId="{6E04F4B5-AC0F-493B-B1A2-008A2E900AEB}" dt="2017-12-30T07:50:47.987" v="1164" actId="5793"/>
         <pc:sldMkLst>
           <pc:docMk/>
           <pc:sldMk cId="2289440628" sldId="263"/>
@@ -216,7 +217,7 @@
           </ac:spMkLst>
         </pc:spChg>
         <pc:spChg chg="mod">
-          <ac:chgData name="anum sharma" userId="f66cf99955dbac7d" providerId="LiveId" clId="{6E04F4B5-AC0F-493B-B1A2-008A2E900AEB}" dt="2017-12-30T07:50:47.987" v="1164"/>
+          <ac:chgData name="anum sharma" userId="f66cf99955dbac7d" providerId="LiveId" clId="{6E04F4B5-AC0F-493B-B1A2-008A2E900AEB}" dt="2017-12-30T07:50:47.987" v="1164" actId="5793"/>
           <ac:spMkLst>
             <pc:docMk/>
             <pc:sldMk cId="2289440628" sldId="263"/>
@@ -225,7 +226,7 @@
         </pc:spChg>
       </pc:sldChg>
       <pc:sldChg chg="modSp add">
-        <pc:chgData name="anum sharma" userId="f66cf99955dbac7d" providerId="LiveId" clId="{6E04F4B5-AC0F-493B-B1A2-008A2E900AEB}" dt="2017-12-31T07:46:16.396" v="1628"/>
+        <pc:chgData name="anum sharma" userId="f66cf99955dbac7d" providerId="LiveId" clId="{6E04F4B5-AC0F-493B-B1A2-008A2E900AEB}" dt="2017-12-31T07:46:16.396" v="1628" actId="5793"/>
         <pc:sldMkLst>
           <pc:docMk/>
           <pc:sldMk cId="2984233788" sldId="264"/>
@@ -239,7 +240,7 @@
           </ac:spMkLst>
         </pc:spChg>
         <pc:spChg chg="mod">
-          <ac:chgData name="anum sharma" userId="f66cf99955dbac7d" providerId="LiveId" clId="{6E04F4B5-AC0F-493B-B1A2-008A2E900AEB}" dt="2017-12-31T07:46:16.396" v="1628"/>
+          <ac:chgData name="anum sharma" userId="f66cf99955dbac7d" providerId="LiveId" clId="{6E04F4B5-AC0F-493B-B1A2-008A2E900AEB}" dt="2017-12-31T07:46:16.396" v="1628" actId="5793"/>
           <ac:spMkLst>
             <pc:docMk/>
             <pc:sldMk cId="2984233788" sldId="264"/>
@@ -248,7 +249,7 @@
         </pc:spChg>
       </pc:sldChg>
       <pc:sldChg chg="modSp add">
-        <pc:chgData name="anum sharma" userId="f66cf99955dbac7d" providerId="LiveId" clId="{6E04F4B5-AC0F-493B-B1A2-008A2E900AEB}" dt="2018-01-01T07:25:08.989" v="2135"/>
+        <pc:chgData name="anum sharma" userId="f66cf99955dbac7d" providerId="LiveId" clId="{6E04F4B5-AC0F-493B-B1A2-008A2E900AEB}" dt="2018-01-01T07:25:08.989" v="2135" actId="5793"/>
         <pc:sldMkLst>
           <pc:docMk/>
           <pc:sldMk cId="2502690904" sldId="265"/>
@@ -262,7 +263,7 @@
           </ac:spMkLst>
         </pc:spChg>
         <pc:spChg chg="mod">
-          <ac:chgData name="anum sharma" userId="f66cf99955dbac7d" providerId="LiveId" clId="{6E04F4B5-AC0F-493B-B1A2-008A2E900AEB}" dt="2018-01-01T07:25:08.989" v="2135"/>
+          <ac:chgData name="anum sharma" userId="f66cf99955dbac7d" providerId="LiveId" clId="{6E04F4B5-AC0F-493B-B1A2-008A2E900AEB}" dt="2018-01-01T07:25:08.989" v="2135" actId="5793"/>
           <ac:spMkLst>
             <pc:docMk/>
             <pc:sldMk cId="2502690904" sldId="265"/>
@@ -315,6 +316,300 @@
             <ac:spMk id="3" creationId="{AC6F5981-0173-4EE9-B62A-E3BF939B933B}"/>
           </ac:spMkLst>
         </pc:spChg>
+      </pc:sldChg>
+      <pc:sldChg chg="addSp delSp modSp add mod setBg">
+        <pc:chgData name="anum sharma" userId="f66cf99955dbac7d" providerId="LiveId" clId="{6E04F4B5-AC0F-493B-B1A2-008A2E900AEB}" dt="2018-01-04T01:20:58.206" v="3372" actId="26606"/>
+        <pc:sldMkLst>
+          <pc:docMk/>
+          <pc:sldMk cId="3500082507" sldId="268"/>
+        </pc:sldMkLst>
+        <pc:spChg chg="mod">
+          <ac:chgData name="anum sharma" userId="f66cf99955dbac7d" providerId="LiveId" clId="{6E04F4B5-AC0F-493B-B1A2-008A2E900AEB}" dt="2018-01-04T01:20:58.206" v="3372" actId="26606"/>
+          <ac:spMkLst>
+            <pc:docMk/>
+            <pc:sldMk cId="3500082507" sldId="268"/>
+            <ac:spMk id="2" creationId="{32A0DBD2-2E85-41A0-B69E-179723D54BF6}"/>
+          </ac:spMkLst>
+        </pc:spChg>
+        <pc:spChg chg="add del">
+          <ac:chgData name="anum sharma" userId="f66cf99955dbac7d" providerId="LiveId" clId="{6E04F4B5-AC0F-493B-B1A2-008A2E900AEB}" dt="2018-01-04T01:20:58.191" v="3369" actId="26606"/>
+          <ac:spMkLst>
+            <pc:docMk/>
+            <pc:sldMk cId="3500082507" sldId="268"/>
+            <ac:spMk id="10" creationId="{655AE6B0-AC9E-4167-806F-E9DB135FC46B}"/>
+          </ac:spMkLst>
+        </pc:spChg>
+        <pc:spChg chg="add">
+          <ac:chgData name="anum sharma" userId="f66cf99955dbac7d" providerId="LiveId" clId="{6E04F4B5-AC0F-493B-B1A2-008A2E900AEB}" dt="2018-01-04T01:20:58.206" v="3372" actId="26606"/>
+          <ac:spMkLst>
+            <pc:docMk/>
+            <pc:sldMk cId="3500082507" sldId="268"/>
+            <ac:spMk id="14" creationId="{B2205F6E-03C6-4E92-877C-E2482F6599AA}"/>
+          </ac:spMkLst>
+        </pc:spChg>
+        <pc:spChg chg="add del">
+          <ac:chgData name="anum sharma" userId="f66cf99955dbac7d" providerId="LiveId" clId="{6E04F4B5-AC0F-493B-B1A2-008A2E900AEB}" dt="2018-01-04T01:20:58.191" v="3369" actId="26606"/>
+          <ac:spMkLst>
+            <pc:docMk/>
+            <pc:sldMk cId="3500082507" sldId="268"/>
+            <ac:spMk id="23" creationId="{87BD1F4E-A66D-4C06-86DA-8D56CA7A3B41}"/>
+          </ac:spMkLst>
+        </pc:spChg>
+        <pc:spChg chg="add">
+          <ac:chgData name="anum sharma" userId="f66cf99955dbac7d" providerId="LiveId" clId="{6E04F4B5-AC0F-493B-B1A2-008A2E900AEB}" dt="2018-01-04T01:20:58.206" v="3372" actId="26606"/>
+          <ac:spMkLst>
+            <pc:docMk/>
+            <pc:sldMk cId="3500082507" sldId="268"/>
+            <ac:spMk id="25" creationId="{9F4444CE-BC8D-4D61-B303-4C05614E62AB}"/>
+          </ac:spMkLst>
+        </pc:spChg>
+        <pc:spChg chg="add">
+          <ac:chgData name="anum sharma" userId="f66cf99955dbac7d" providerId="LiveId" clId="{6E04F4B5-AC0F-493B-B1A2-008A2E900AEB}" dt="2018-01-04T01:20:58.206" v="3372" actId="26606"/>
+          <ac:spMkLst>
+            <pc:docMk/>
+            <pc:sldMk cId="3500082507" sldId="268"/>
+            <ac:spMk id="26" creationId="{73772B81-181F-48B7-8826-4D9686D15DF5}"/>
+          </ac:spMkLst>
+        </pc:spChg>
+        <pc:spChg chg="add del mod">
+          <ac:chgData name="anum sharma" userId="f66cf99955dbac7d" providerId="LiveId" clId="{6E04F4B5-AC0F-493B-B1A2-008A2E900AEB}" dt="2018-01-04T01:20:58.206" v="3372" actId="26606"/>
+          <ac:spMkLst>
+            <pc:docMk/>
+            <pc:sldMk cId="3500082507" sldId="268"/>
+            <ac:spMk id="28" creationId="{98DA7D36-1AB9-4CDC-AE5C-B905243F86FA}"/>
+          </ac:spMkLst>
+        </pc:spChg>
+        <pc:grpChg chg="add del">
+          <ac:chgData name="anum sharma" userId="f66cf99955dbac7d" providerId="LiveId" clId="{6E04F4B5-AC0F-493B-B1A2-008A2E900AEB}" dt="2018-01-04T01:20:58.191" v="3369" actId="26606"/>
+          <ac:grpSpMkLst>
+            <pc:docMk/>
+            <pc:sldMk cId="3500082507" sldId="268"/>
+            <ac:grpSpMk id="12" creationId="{3523416A-383B-4FDC-B4C9-D8EDDFE9C043}"/>
+          </ac:grpSpMkLst>
+        </pc:grpChg>
+        <pc:graphicFrameChg chg="add del">
+          <ac:chgData name="anum sharma" userId="f66cf99955dbac7d" providerId="LiveId" clId="{6E04F4B5-AC0F-493B-B1A2-008A2E900AEB}" dt="2018-01-04T01:20:58.191" v="3369" actId="26606"/>
+          <ac:graphicFrameMkLst>
+            <pc:docMk/>
+            <pc:sldMk cId="3500082507" sldId="268"/>
+            <ac:graphicFrameMk id="5" creationId="{00000000-0000-0000-0000-000000000000}"/>
+          </ac:graphicFrameMkLst>
+        </pc:graphicFrameChg>
+        <pc:graphicFrameChg chg="add">
+          <ac:chgData name="anum sharma" userId="f66cf99955dbac7d" providerId="LiveId" clId="{6E04F4B5-AC0F-493B-B1A2-008A2E900AEB}" dt="2018-01-04T01:20:58.206" v="3372" actId="26606"/>
+          <ac:graphicFrameMkLst>
+            <pc:docMk/>
+            <pc:sldMk cId="3500082507" sldId="268"/>
+            <ac:graphicFrameMk id="27" creationId="{00000000-0000-0000-0000-000000000000}"/>
+          </ac:graphicFrameMkLst>
+        </pc:graphicFrameChg>
+      </pc:sldChg>
+      <pc:sldChg chg="addSp delSp add del">
+        <pc:chgData name="anum sharma" userId="f66cf99955dbac7d" providerId="LiveId" clId="{6E04F4B5-AC0F-493B-B1A2-008A2E900AEB}" dt="2018-01-04T01:19:40.408" v="3276"/>
+        <pc:sldMkLst>
+          <pc:docMk/>
+          <pc:sldMk cId="3570514873" sldId="269"/>
+        </pc:sldMkLst>
+        <pc:inkChg chg="add del">
+          <ac:chgData name="anum sharma" userId="f66cf99955dbac7d" providerId="LiveId" clId="{6E04F4B5-AC0F-493B-B1A2-008A2E900AEB}" dt="2018-01-04T01:19:40.362" v="3275"/>
+          <ac:inkMkLst>
+            <pc:docMk/>
+            <pc:sldMk cId="3570514873" sldId="269"/>
+            <ac:inkMk id="4" creationId="{8C5C79DC-C4D1-4296-B7C7-DC737D8B9112}"/>
+          </ac:inkMkLst>
+        </pc:inkChg>
+        <pc:inkChg chg="add del">
+          <ac:chgData name="anum sharma" userId="f66cf99955dbac7d" providerId="LiveId" clId="{6E04F4B5-AC0F-493B-B1A2-008A2E900AEB}" dt="2018-01-04T01:19:40.330" v="3274"/>
+          <ac:inkMkLst>
+            <pc:docMk/>
+            <pc:sldMk cId="3570514873" sldId="269"/>
+            <ac:inkMk id="5" creationId="{C0A94CE6-AB89-4F4E-95FA-48CABB4C7520}"/>
+          </ac:inkMkLst>
+        </pc:inkChg>
+        <pc:inkChg chg="add del">
+          <ac:chgData name="anum sharma" userId="f66cf99955dbac7d" providerId="LiveId" clId="{6E04F4B5-AC0F-493B-B1A2-008A2E900AEB}" dt="2018-01-04T01:19:27.397" v="3242"/>
+          <ac:inkMkLst>
+            <pc:docMk/>
+            <pc:sldMk cId="3570514873" sldId="269"/>
+            <ac:inkMk id="6" creationId="{828B02A6-10E4-4B76-8F3D-598A26E218B5}"/>
+          </ac:inkMkLst>
+        </pc:inkChg>
+        <pc:inkChg chg="add del">
+          <ac:chgData name="anum sharma" userId="f66cf99955dbac7d" providerId="LiveId" clId="{6E04F4B5-AC0F-493B-B1A2-008A2E900AEB}" dt="2018-01-04T01:19:40.299" v="3273"/>
+          <ac:inkMkLst>
+            <pc:docMk/>
+            <pc:sldMk cId="3570514873" sldId="269"/>
+            <ac:inkMk id="7" creationId="{2524ACDD-04F3-4EF1-8D4C-EF0AA6687BB3}"/>
+          </ac:inkMkLst>
+        </pc:inkChg>
+        <pc:inkChg chg="add del">
+          <ac:chgData name="anum sharma" userId="f66cf99955dbac7d" providerId="LiveId" clId="{6E04F4B5-AC0F-493B-B1A2-008A2E900AEB}" dt="2018-01-04T01:19:40.268" v="3272"/>
+          <ac:inkMkLst>
+            <pc:docMk/>
+            <pc:sldMk cId="3570514873" sldId="269"/>
+            <ac:inkMk id="8" creationId="{21077BA6-2D11-4C74-9719-9B6C2B4E06EC}"/>
+          </ac:inkMkLst>
+        </pc:inkChg>
+        <pc:inkChg chg="add del">
+          <ac:chgData name="anum sharma" userId="f66cf99955dbac7d" providerId="LiveId" clId="{6E04F4B5-AC0F-493B-B1A2-008A2E900AEB}" dt="2018-01-04T01:19:40.221" v="3271"/>
+          <ac:inkMkLst>
+            <pc:docMk/>
+            <pc:sldMk cId="3570514873" sldId="269"/>
+            <ac:inkMk id="9" creationId="{3AF86D8C-BEE6-442B-B33E-49C4A7C8AFEA}"/>
+          </ac:inkMkLst>
+        </pc:inkChg>
+        <pc:inkChg chg="add del">
+          <ac:chgData name="anum sharma" userId="f66cf99955dbac7d" providerId="LiveId" clId="{6E04F4B5-AC0F-493B-B1A2-008A2E900AEB}" dt="2018-01-04T01:19:28.023" v="3245"/>
+          <ac:inkMkLst>
+            <pc:docMk/>
+            <pc:sldMk cId="3570514873" sldId="269"/>
+            <ac:inkMk id="10" creationId="{D7440E3D-3F55-4FC7-B447-2A20F487CA9F}"/>
+          </ac:inkMkLst>
+        </pc:inkChg>
+        <pc:inkChg chg="add del">
+          <ac:chgData name="anum sharma" userId="f66cf99955dbac7d" providerId="LiveId" clId="{6E04F4B5-AC0F-493B-B1A2-008A2E900AEB}" dt="2018-01-04T01:19:39.658" v="3270"/>
+          <ac:inkMkLst>
+            <pc:docMk/>
+            <pc:sldMk cId="3570514873" sldId="269"/>
+            <ac:inkMk id="11" creationId="{763B4DA4-798F-4077-B1FE-CB7393FC8474}"/>
+          </ac:inkMkLst>
+        </pc:inkChg>
+        <pc:inkChg chg="add del">
+          <ac:chgData name="anum sharma" userId="f66cf99955dbac7d" providerId="LiveId" clId="{6E04F4B5-AC0F-493B-B1A2-008A2E900AEB}" dt="2018-01-04T01:19:39.502" v="3269"/>
+          <ac:inkMkLst>
+            <pc:docMk/>
+            <pc:sldMk cId="3570514873" sldId="269"/>
+            <ac:inkMk id="12" creationId="{6179BA1D-5AC5-47DA-96E6-0A0E29031194}"/>
+          </ac:inkMkLst>
+        </pc:inkChg>
+        <pc:inkChg chg="add del">
+          <ac:chgData name="anum sharma" userId="f66cf99955dbac7d" providerId="LiveId" clId="{6E04F4B5-AC0F-493B-B1A2-008A2E900AEB}" dt="2018-01-04T01:19:28.618" v="3248"/>
+          <ac:inkMkLst>
+            <pc:docMk/>
+            <pc:sldMk cId="3570514873" sldId="269"/>
+            <ac:inkMk id="13" creationId="{8103288D-92A6-4F8D-A601-C7D83C093167}"/>
+          </ac:inkMkLst>
+        </pc:inkChg>
+        <pc:inkChg chg="add del">
+          <ac:chgData name="anum sharma" userId="f66cf99955dbac7d" providerId="LiveId" clId="{6E04F4B5-AC0F-493B-B1A2-008A2E900AEB}" dt="2018-01-04T01:19:39.298" v="3268"/>
+          <ac:inkMkLst>
+            <pc:docMk/>
+            <pc:sldMk cId="3570514873" sldId="269"/>
+            <ac:inkMk id="14" creationId="{75F7E868-C97D-42C5-BCDA-353F2D49E217}"/>
+          </ac:inkMkLst>
+        </pc:inkChg>
+        <pc:inkChg chg="add del">
+          <ac:chgData name="anum sharma" userId="f66cf99955dbac7d" providerId="LiveId" clId="{6E04F4B5-AC0F-493B-B1A2-008A2E900AEB}" dt="2018-01-04T01:19:39.095" v="3267"/>
+          <ac:inkMkLst>
+            <pc:docMk/>
+            <pc:sldMk cId="3570514873" sldId="269"/>
+            <ac:inkMk id="15" creationId="{ECEDDFD0-9FB3-4BB3-AA9C-062F3A4E0BBE}"/>
+          </ac:inkMkLst>
+        </pc:inkChg>
+        <pc:inkChg chg="add del">
+          <ac:chgData name="anum sharma" userId="f66cf99955dbac7d" providerId="LiveId" clId="{6E04F4B5-AC0F-493B-B1A2-008A2E900AEB}" dt="2018-01-04T01:19:29.368" v="3250"/>
+          <ac:inkMkLst>
+            <pc:docMk/>
+            <pc:sldMk cId="3570514873" sldId="269"/>
+            <ac:inkMk id="16" creationId="{96F65FF6-5B48-4820-BC1B-0D7319473B51}"/>
+          </ac:inkMkLst>
+        </pc:inkChg>
+        <pc:inkChg chg="add del">
+          <ac:chgData name="anum sharma" userId="f66cf99955dbac7d" providerId="LiveId" clId="{6E04F4B5-AC0F-493B-B1A2-008A2E900AEB}" dt="2018-01-04T01:19:38.876" v="3266"/>
+          <ac:inkMkLst>
+            <pc:docMk/>
+            <pc:sldMk cId="3570514873" sldId="269"/>
+            <ac:inkMk id="17" creationId="{1910A3B3-9A06-478E-BDB7-B1D25BED3B95}"/>
+          </ac:inkMkLst>
+        </pc:inkChg>
+        <pc:inkChg chg="add del">
+          <ac:chgData name="anum sharma" userId="f66cf99955dbac7d" providerId="LiveId" clId="{6E04F4B5-AC0F-493B-B1A2-008A2E900AEB}" dt="2018-01-04T01:19:30.040" v="3252"/>
+          <ac:inkMkLst>
+            <pc:docMk/>
+            <pc:sldMk cId="3570514873" sldId="269"/>
+            <ac:inkMk id="18" creationId="{313EFE8F-A9E4-413A-87FE-168968D4F492}"/>
+          </ac:inkMkLst>
+        </pc:inkChg>
+        <pc:inkChg chg="add del">
+          <ac:chgData name="anum sharma" userId="f66cf99955dbac7d" providerId="LiveId" clId="{6E04F4B5-AC0F-493B-B1A2-008A2E900AEB}" dt="2018-01-04T01:19:38.672" v="3265"/>
+          <ac:inkMkLst>
+            <pc:docMk/>
+            <pc:sldMk cId="3570514873" sldId="269"/>
+            <ac:inkMk id="19" creationId="{F7F6C560-313D-4A57-A956-70DD622CFD94}"/>
+          </ac:inkMkLst>
+        </pc:inkChg>
+        <pc:inkChg chg="add del">
+          <ac:chgData name="anum sharma" userId="f66cf99955dbac7d" providerId="LiveId" clId="{6E04F4B5-AC0F-493B-B1A2-008A2E900AEB}" dt="2018-01-04T01:19:31.416" v="3254"/>
+          <ac:inkMkLst>
+            <pc:docMk/>
+            <pc:sldMk cId="3570514873" sldId="269"/>
+            <ac:inkMk id="20" creationId="{FC57E399-7310-401C-8092-5130B38092EF}"/>
+          </ac:inkMkLst>
+        </pc:inkChg>
+        <pc:inkChg chg="add del">
+          <ac:chgData name="anum sharma" userId="f66cf99955dbac7d" providerId="LiveId" clId="{6E04F4B5-AC0F-493B-B1A2-008A2E900AEB}" dt="2018-01-04T01:19:38.454" v="3264"/>
+          <ac:inkMkLst>
+            <pc:docMk/>
+            <pc:sldMk cId="3570514873" sldId="269"/>
+            <ac:inkMk id="21" creationId="{AA6A4271-A927-4054-BE32-1AC372927EE2}"/>
+          </ac:inkMkLst>
+        </pc:inkChg>
+        <pc:inkChg chg="add del">
+          <ac:chgData name="anum sharma" userId="f66cf99955dbac7d" providerId="LiveId" clId="{6E04F4B5-AC0F-493B-B1A2-008A2E900AEB}" dt="2018-01-04T01:19:32.184" v="3256"/>
+          <ac:inkMkLst>
+            <pc:docMk/>
+            <pc:sldMk cId="3570514873" sldId="269"/>
+            <ac:inkMk id="22" creationId="{F2C3E6C6-31F7-4D06-A9C7-C146A1D0E6CB}"/>
+          </ac:inkMkLst>
+        </pc:inkChg>
+        <pc:inkChg chg="add del">
+          <ac:chgData name="anum sharma" userId="f66cf99955dbac7d" providerId="LiveId" clId="{6E04F4B5-AC0F-493B-B1A2-008A2E900AEB}" dt="2018-01-04T01:19:38.282" v="3263"/>
+          <ac:inkMkLst>
+            <pc:docMk/>
+            <pc:sldMk cId="3570514873" sldId="269"/>
+            <ac:inkMk id="23" creationId="{E6C31FE4-7EB2-44A2-9409-987CBCAD25B6}"/>
+          </ac:inkMkLst>
+        </pc:inkChg>
+        <pc:inkChg chg="add del">
+          <ac:chgData name="anum sharma" userId="f66cf99955dbac7d" providerId="LiveId" clId="{6E04F4B5-AC0F-493B-B1A2-008A2E900AEB}" dt="2018-01-04T01:19:33.526" v="3258"/>
+          <ac:inkMkLst>
+            <pc:docMk/>
+            <pc:sldMk cId="3570514873" sldId="269"/>
+            <ac:inkMk id="24" creationId="{48837CEC-8FBB-454D-9C94-5BA5140C1D9A}"/>
+          </ac:inkMkLst>
+        </pc:inkChg>
+        <pc:inkChg chg="add del">
+          <ac:chgData name="anum sharma" userId="f66cf99955dbac7d" providerId="LiveId" clId="{6E04F4B5-AC0F-493B-B1A2-008A2E900AEB}" dt="2018-01-04T01:19:38.046" v="3262"/>
+          <ac:inkMkLst>
+            <pc:docMk/>
+            <pc:sldMk cId="3570514873" sldId="269"/>
+            <ac:inkMk id="25" creationId="{2E4A1DD7-DB70-46EC-8154-FBEF7D0D129B}"/>
+          </ac:inkMkLst>
+        </pc:inkChg>
+        <pc:inkChg chg="add del">
+          <ac:chgData name="anum sharma" userId="f66cf99955dbac7d" providerId="LiveId" clId="{6E04F4B5-AC0F-493B-B1A2-008A2E900AEB}" dt="2018-01-04T01:19:34.987" v="3260"/>
+          <ac:inkMkLst>
+            <pc:docMk/>
+            <pc:sldMk cId="3570514873" sldId="269"/>
+            <ac:inkMk id="26" creationId="{0D1F680D-8348-4431-A94A-34EF9DBDE3FE}"/>
+          </ac:inkMkLst>
+        </pc:inkChg>
+        <pc:inkChg chg="add del">
+          <ac:chgData name="anum sharma" userId="f66cf99955dbac7d" providerId="LiveId" clId="{6E04F4B5-AC0F-493B-B1A2-008A2E900AEB}" dt="2018-01-04T01:19:37.655" v="3261"/>
+          <ac:inkMkLst>
+            <pc:docMk/>
+            <pc:sldMk cId="3570514873" sldId="269"/>
+            <ac:inkMk id="27" creationId="{276F0172-D18C-47E1-B247-6513688F4FFF}"/>
+          </ac:inkMkLst>
+        </pc:inkChg>
+        <pc:inkChg chg="add">
+          <ac:chgData name="anum sharma" userId="f66cf99955dbac7d" providerId="LiveId" clId="{6E04F4B5-AC0F-493B-B1A2-008A2E900AEB}" dt="2018-01-04T01:19:34.987" v="3260"/>
+          <ac:inkMkLst>
+            <pc:docMk/>
+            <pc:sldMk cId="3570514873" sldId="269"/>
+            <ac:inkMk id="28" creationId="{57875CA4-ABEE-415E-BF04-F51F9953CC12}"/>
+          </ac:inkMkLst>
+        </pc:inkChg>
       </pc:sldChg>
     </pc:docChg>
   </pc:docChgLst>
@@ -2985,6 +3280,788 @@
     <dgm:fillClrLst meth="repeat">
       <a:schemeClr val="accent1">
         <a:tint val="60000"/>
+      </a:schemeClr>
+    </dgm:fillClrLst>
+    <dgm:linClrLst meth="repeat">
+      <a:schemeClr val="lt1"/>
+    </dgm:linClrLst>
+    <dgm:effectClrLst/>
+    <dgm:txLinClrLst/>
+    <dgm:txFillClrLst meth="repeat">
+      <a:schemeClr val="dk1"/>
+    </dgm:txFillClrLst>
+    <dgm:txEffectClrLst/>
+  </dgm:styleLbl>
+  <dgm:styleLbl name="revTx">
+    <dgm:fillClrLst meth="repeat">
+      <a:schemeClr val="lt1">
+        <a:alpha val="0"/>
+      </a:schemeClr>
+    </dgm:fillClrLst>
+    <dgm:linClrLst meth="repeat">
+      <a:schemeClr val="dk1">
+        <a:alpha val="0"/>
+      </a:schemeClr>
+    </dgm:linClrLst>
+    <dgm:effectClrLst/>
+    <dgm:txLinClrLst/>
+    <dgm:txFillClrLst meth="repeat">
+      <a:schemeClr val="tx1"/>
+    </dgm:txFillClrLst>
+    <dgm:txEffectClrLst/>
+  </dgm:styleLbl>
+</dgm:colorsDef>
+</file>
+
+<file path=ppt/diagrams/colors4.xml><?xml version="1.0" encoding="utf-8"?>
+<dgm:colorsDef xmlns:dgm="http://schemas.openxmlformats.org/drawingml/2006/diagram" xmlns:a="http://schemas.openxmlformats.org/drawingml/2006/main" uniqueId="urn:microsoft.com/office/officeart/2005/8/colors/colorful2">
+  <dgm:title val=""/>
+  <dgm:desc val=""/>
+  <dgm:catLst>
+    <dgm:cat type="colorful" pri="10200"/>
+  </dgm:catLst>
+  <dgm:styleLbl name="node0">
+    <dgm:fillClrLst meth="repeat">
+      <a:schemeClr val="accent1"/>
+    </dgm:fillClrLst>
+    <dgm:linClrLst meth="repeat">
+      <a:schemeClr val="lt1"/>
+    </dgm:linClrLst>
+    <dgm:effectClrLst/>
+    <dgm:txLinClrLst/>
+    <dgm:txFillClrLst/>
+    <dgm:txEffectClrLst/>
+  </dgm:styleLbl>
+  <dgm:styleLbl name="node1">
+    <dgm:fillClrLst>
+      <a:schemeClr val="accent2"/>
+      <a:schemeClr val="accent3"/>
+    </dgm:fillClrLst>
+    <dgm:linClrLst meth="repeat">
+      <a:schemeClr val="lt1"/>
+    </dgm:linClrLst>
+    <dgm:effectClrLst/>
+    <dgm:txLinClrLst/>
+    <dgm:txFillClrLst/>
+    <dgm:txEffectClrLst/>
+  </dgm:styleLbl>
+  <dgm:styleLbl name="alignNode1">
+    <dgm:fillClrLst>
+      <a:schemeClr val="accent2"/>
+      <a:schemeClr val="accent3"/>
+    </dgm:fillClrLst>
+    <dgm:linClrLst>
+      <a:schemeClr val="accent2"/>
+      <a:schemeClr val="accent3"/>
+    </dgm:linClrLst>
+    <dgm:effectClrLst/>
+    <dgm:txLinClrLst/>
+    <dgm:txFillClrLst/>
+    <dgm:txEffectClrLst/>
+  </dgm:styleLbl>
+  <dgm:styleLbl name="lnNode1">
+    <dgm:fillClrLst>
+      <a:schemeClr val="accent2"/>
+      <a:schemeClr val="accent3"/>
+    </dgm:fillClrLst>
+    <dgm:linClrLst meth="repeat">
+      <a:schemeClr val="lt1"/>
+    </dgm:linClrLst>
+    <dgm:effectClrLst/>
+    <dgm:txLinClrLst/>
+    <dgm:txFillClrLst/>
+    <dgm:txEffectClrLst/>
+  </dgm:styleLbl>
+  <dgm:styleLbl name="vennNode1">
+    <dgm:fillClrLst>
+      <a:schemeClr val="accent2">
+        <a:alpha val="50000"/>
+      </a:schemeClr>
+      <a:schemeClr val="accent3">
+        <a:alpha val="50000"/>
+      </a:schemeClr>
+    </dgm:fillClrLst>
+    <dgm:linClrLst meth="repeat">
+      <a:schemeClr val="lt1"/>
+    </dgm:linClrLst>
+    <dgm:effectClrLst/>
+    <dgm:txLinClrLst/>
+    <dgm:txFillClrLst/>
+    <dgm:txEffectClrLst/>
+  </dgm:styleLbl>
+  <dgm:styleLbl name="node2">
+    <dgm:fillClrLst>
+      <a:schemeClr val="accent3"/>
+    </dgm:fillClrLst>
+    <dgm:linClrLst meth="repeat">
+      <a:schemeClr val="lt1"/>
+    </dgm:linClrLst>
+    <dgm:effectClrLst/>
+    <dgm:txLinClrLst/>
+    <dgm:txFillClrLst/>
+    <dgm:txEffectClrLst/>
+  </dgm:styleLbl>
+  <dgm:styleLbl name="node3">
+    <dgm:fillClrLst>
+      <a:schemeClr val="accent4"/>
+    </dgm:fillClrLst>
+    <dgm:linClrLst meth="repeat">
+      <a:schemeClr val="lt1"/>
+    </dgm:linClrLst>
+    <dgm:effectClrLst/>
+    <dgm:txLinClrLst/>
+    <dgm:txFillClrLst/>
+    <dgm:txEffectClrLst/>
+  </dgm:styleLbl>
+  <dgm:styleLbl name="node4">
+    <dgm:fillClrLst>
+      <a:schemeClr val="accent5"/>
+    </dgm:fillClrLst>
+    <dgm:linClrLst meth="repeat">
+      <a:schemeClr val="lt1"/>
+    </dgm:linClrLst>
+    <dgm:effectClrLst/>
+    <dgm:txLinClrLst/>
+    <dgm:txFillClrLst/>
+    <dgm:txEffectClrLst/>
+  </dgm:styleLbl>
+  <dgm:styleLbl name="fgImgPlace1">
+    <dgm:fillClrLst>
+      <a:schemeClr val="accent2">
+        <a:tint val="50000"/>
+      </a:schemeClr>
+      <a:schemeClr val="accent3">
+        <a:tint val="50000"/>
+      </a:schemeClr>
+    </dgm:fillClrLst>
+    <dgm:linClrLst meth="repeat">
+      <a:schemeClr val="lt1"/>
+    </dgm:linClrLst>
+    <dgm:effectClrLst/>
+    <dgm:txLinClrLst/>
+    <dgm:txFillClrLst meth="repeat">
+      <a:schemeClr val="lt1"/>
+    </dgm:txFillClrLst>
+    <dgm:txEffectClrLst/>
+  </dgm:styleLbl>
+  <dgm:styleLbl name="alignImgPlace1">
+    <dgm:fillClrLst>
+      <a:schemeClr val="accent2">
+        <a:tint val="50000"/>
+      </a:schemeClr>
+      <a:schemeClr val="accent3">
+        <a:tint val="20000"/>
+      </a:schemeClr>
+    </dgm:fillClrLst>
+    <dgm:linClrLst meth="repeat">
+      <a:schemeClr val="lt1"/>
+    </dgm:linClrLst>
+    <dgm:effectClrLst/>
+    <dgm:txLinClrLst/>
+    <dgm:txFillClrLst meth="repeat">
+      <a:schemeClr val="lt1"/>
+    </dgm:txFillClrLst>
+    <dgm:txEffectClrLst/>
+  </dgm:styleLbl>
+  <dgm:styleLbl name="bgImgPlace1">
+    <dgm:fillClrLst>
+      <a:schemeClr val="accent2">
+        <a:tint val="50000"/>
+      </a:schemeClr>
+      <a:schemeClr val="accent3">
+        <a:tint val="20000"/>
+      </a:schemeClr>
+    </dgm:fillClrLst>
+    <dgm:linClrLst meth="repeat">
+      <a:schemeClr val="lt1"/>
+    </dgm:linClrLst>
+    <dgm:effectClrLst/>
+    <dgm:txLinClrLst/>
+    <dgm:txFillClrLst meth="repeat">
+      <a:schemeClr val="lt1"/>
+    </dgm:txFillClrLst>
+    <dgm:txEffectClrLst/>
+  </dgm:styleLbl>
+  <dgm:styleLbl name="sibTrans2D1">
+    <dgm:fillClrLst>
+      <a:schemeClr val="accent2"/>
+      <a:schemeClr val="accent3"/>
+    </dgm:fillClrLst>
+    <dgm:linClrLst meth="repeat">
+      <a:schemeClr val="lt1"/>
+    </dgm:linClrLst>
+    <dgm:effectClrLst/>
+    <dgm:txLinClrLst/>
+    <dgm:txFillClrLst/>
+    <dgm:txEffectClrLst/>
+  </dgm:styleLbl>
+  <dgm:styleLbl name="fgSibTrans2D1">
+    <dgm:fillClrLst>
+      <a:schemeClr val="accent2"/>
+      <a:schemeClr val="accent3"/>
+    </dgm:fillClrLst>
+    <dgm:linClrLst meth="repeat">
+      <a:schemeClr val="lt1"/>
+    </dgm:linClrLst>
+    <dgm:effectClrLst/>
+    <dgm:txLinClrLst/>
+    <dgm:txFillClrLst meth="repeat">
+      <a:schemeClr val="lt1"/>
+    </dgm:txFillClrLst>
+    <dgm:txEffectClrLst/>
+  </dgm:styleLbl>
+  <dgm:styleLbl name="bgSibTrans2D1">
+    <dgm:fillClrLst>
+      <a:schemeClr val="accent2"/>
+      <a:schemeClr val="accent3"/>
+    </dgm:fillClrLst>
+    <dgm:linClrLst meth="repeat">
+      <a:schemeClr val="lt1"/>
+    </dgm:linClrLst>
+    <dgm:effectClrLst/>
+    <dgm:txLinClrLst/>
+    <dgm:txFillClrLst meth="repeat">
+      <a:schemeClr val="lt1"/>
+    </dgm:txFillClrLst>
+    <dgm:txEffectClrLst/>
+  </dgm:styleLbl>
+  <dgm:styleLbl name="sibTrans1D1">
+    <dgm:fillClrLst/>
+    <dgm:linClrLst>
+      <a:schemeClr val="accent2"/>
+      <a:schemeClr val="accent3"/>
+    </dgm:linClrLst>
+    <dgm:effectClrLst/>
+    <dgm:txLinClrLst/>
+    <dgm:txFillClrLst meth="repeat">
+      <a:schemeClr val="tx1"/>
+    </dgm:txFillClrLst>
+    <dgm:txEffectClrLst/>
+  </dgm:styleLbl>
+  <dgm:styleLbl name="callout">
+    <dgm:fillClrLst meth="repeat">
+      <a:schemeClr val="accent2"/>
+    </dgm:fillClrLst>
+    <dgm:linClrLst meth="repeat">
+      <a:schemeClr val="accent2">
+        <a:tint val="50000"/>
+      </a:schemeClr>
+    </dgm:linClrLst>
+    <dgm:effectClrLst/>
+    <dgm:txLinClrLst/>
+    <dgm:txFillClrLst meth="repeat">
+      <a:schemeClr val="tx1"/>
+    </dgm:txFillClrLst>
+    <dgm:txEffectClrLst/>
+  </dgm:styleLbl>
+  <dgm:styleLbl name="asst0">
+    <dgm:fillClrLst meth="repeat">
+      <a:schemeClr val="accent2"/>
+    </dgm:fillClrLst>
+    <dgm:linClrLst meth="repeat">
+      <a:schemeClr val="lt1">
+        <a:shade val="80000"/>
+      </a:schemeClr>
+    </dgm:linClrLst>
+    <dgm:effectClrLst/>
+    <dgm:txLinClrLst/>
+    <dgm:txFillClrLst/>
+    <dgm:txEffectClrLst/>
+  </dgm:styleLbl>
+  <dgm:styleLbl name="asst1">
+    <dgm:fillClrLst meth="repeat">
+      <a:schemeClr val="accent3"/>
+    </dgm:fillClrLst>
+    <dgm:linClrLst meth="repeat">
+      <a:schemeClr val="lt1">
+        <a:shade val="80000"/>
+      </a:schemeClr>
+    </dgm:linClrLst>
+    <dgm:effectClrLst/>
+    <dgm:txLinClrLst/>
+    <dgm:txFillClrLst/>
+    <dgm:txEffectClrLst/>
+  </dgm:styleLbl>
+  <dgm:styleLbl name="asst2">
+    <dgm:fillClrLst>
+      <a:schemeClr val="accent4"/>
+    </dgm:fillClrLst>
+    <dgm:linClrLst meth="repeat">
+      <a:schemeClr val="lt1"/>
+    </dgm:linClrLst>
+    <dgm:effectClrLst/>
+    <dgm:txLinClrLst/>
+    <dgm:txFillClrLst/>
+    <dgm:txEffectClrLst/>
+  </dgm:styleLbl>
+  <dgm:styleLbl name="asst3">
+    <dgm:fillClrLst>
+      <a:schemeClr val="accent5"/>
+    </dgm:fillClrLst>
+    <dgm:linClrLst meth="repeat">
+      <a:schemeClr val="lt1"/>
+    </dgm:linClrLst>
+    <dgm:effectClrLst/>
+    <dgm:txLinClrLst/>
+    <dgm:txFillClrLst/>
+    <dgm:txEffectClrLst/>
+  </dgm:styleLbl>
+  <dgm:styleLbl name="asst4">
+    <dgm:fillClrLst>
+      <a:schemeClr val="accent6"/>
+    </dgm:fillClrLst>
+    <dgm:linClrLst meth="repeat">
+      <a:schemeClr val="lt1"/>
+    </dgm:linClrLst>
+    <dgm:effectClrLst/>
+    <dgm:txLinClrLst/>
+    <dgm:txFillClrLst/>
+    <dgm:txEffectClrLst/>
+  </dgm:styleLbl>
+  <dgm:styleLbl name="parChTrans2D1">
+    <dgm:fillClrLst meth="repeat">
+      <a:schemeClr val="accent2"/>
+    </dgm:fillClrLst>
+    <dgm:linClrLst meth="repeat">
+      <a:schemeClr val="lt1"/>
+    </dgm:linClrLst>
+    <dgm:effectClrLst/>
+    <dgm:txLinClrLst/>
+    <dgm:txFillClrLst meth="repeat">
+      <a:schemeClr val="lt1"/>
+    </dgm:txFillClrLst>
+    <dgm:txEffectClrLst/>
+  </dgm:styleLbl>
+  <dgm:styleLbl name="parChTrans2D2">
+    <dgm:fillClrLst meth="repeat">
+      <a:schemeClr val="accent3"/>
+    </dgm:fillClrLst>
+    <dgm:linClrLst meth="repeat">
+      <a:schemeClr val="lt1"/>
+    </dgm:linClrLst>
+    <dgm:effectClrLst/>
+    <dgm:txLinClrLst/>
+    <dgm:txFillClrLst/>
+    <dgm:txEffectClrLst/>
+  </dgm:styleLbl>
+  <dgm:styleLbl name="parChTrans2D3">
+    <dgm:fillClrLst meth="repeat">
+      <a:schemeClr val="accent4"/>
+    </dgm:fillClrLst>
+    <dgm:linClrLst meth="repeat">
+      <a:schemeClr val="lt1"/>
+    </dgm:linClrLst>
+    <dgm:effectClrLst/>
+    <dgm:txLinClrLst/>
+    <dgm:txFillClrLst/>
+    <dgm:txEffectClrLst/>
+  </dgm:styleLbl>
+  <dgm:styleLbl name="parChTrans2D4">
+    <dgm:fillClrLst meth="repeat">
+      <a:schemeClr val="accent5"/>
+    </dgm:fillClrLst>
+    <dgm:linClrLst meth="repeat">
+      <a:schemeClr val="lt1"/>
+    </dgm:linClrLst>
+    <dgm:effectClrLst/>
+    <dgm:txLinClrLst/>
+    <dgm:txFillClrLst meth="repeat">
+      <a:schemeClr val="lt1"/>
+    </dgm:txFillClrLst>
+    <dgm:txEffectClrLst/>
+  </dgm:styleLbl>
+  <dgm:styleLbl name="parChTrans1D1">
+    <dgm:fillClrLst meth="repeat">
+      <a:schemeClr val="accent2"/>
+    </dgm:fillClrLst>
+    <dgm:linClrLst meth="repeat">
+      <a:schemeClr val="accent2"/>
+    </dgm:linClrLst>
+    <dgm:effectClrLst/>
+    <dgm:txLinClrLst/>
+    <dgm:txFillClrLst meth="repeat">
+      <a:schemeClr val="tx1"/>
+    </dgm:txFillClrLst>
+    <dgm:txEffectClrLst/>
+  </dgm:styleLbl>
+  <dgm:styleLbl name="parChTrans1D2">
+    <dgm:fillClrLst meth="repeat">
+      <a:schemeClr val="accent2">
+        <a:tint val="90000"/>
+      </a:schemeClr>
+    </dgm:fillClrLst>
+    <dgm:linClrLst meth="repeat">
+      <a:schemeClr val="accent3"/>
+    </dgm:linClrLst>
+    <dgm:effectClrLst/>
+    <dgm:txLinClrLst/>
+    <dgm:txFillClrLst meth="repeat">
+      <a:schemeClr val="tx1"/>
+    </dgm:txFillClrLst>
+    <dgm:txEffectClrLst/>
+  </dgm:styleLbl>
+  <dgm:styleLbl name="parChTrans1D3">
+    <dgm:fillClrLst meth="repeat">
+      <a:schemeClr val="accent2">
+        <a:tint val="70000"/>
+      </a:schemeClr>
+    </dgm:fillClrLst>
+    <dgm:linClrLst meth="repeat">
+      <a:schemeClr val="accent4"/>
+    </dgm:linClrLst>
+    <dgm:effectClrLst/>
+    <dgm:txLinClrLst/>
+    <dgm:txFillClrLst meth="repeat">
+      <a:schemeClr val="tx1"/>
+    </dgm:txFillClrLst>
+    <dgm:txEffectClrLst/>
+  </dgm:styleLbl>
+  <dgm:styleLbl name="parChTrans1D4">
+    <dgm:fillClrLst meth="repeat">
+      <a:schemeClr val="accent2">
+        <a:tint val="50000"/>
+      </a:schemeClr>
+    </dgm:fillClrLst>
+    <dgm:linClrLst meth="repeat">
+      <a:schemeClr val="accent5"/>
+    </dgm:linClrLst>
+    <dgm:effectClrLst/>
+    <dgm:txLinClrLst/>
+    <dgm:txFillClrLst meth="repeat">
+      <a:schemeClr val="tx1"/>
+    </dgm:txFillClrLst>
+    <dgm:txEffectClrLst/>
+  </dgm:styleLbl>
+  <dgm:styleLbl name="fgAcc1">
+    <dgm:fillClrLst meth="repeat">
+      <a:schemeClr val="lt1">
+        <a:alpha val="90000"/>
+      </a:schemeClr>
+    </dgm:fillClrLst>
+    <dgm:linClrLst>
+      <a:schemeClr val="accent2"/>
+      <a:schemeClr val="accent3"/>
+    </dgm:linClrLst>
+    <dgm:effectClrLst/>
+    <dgm:txLinClrLst/>
+    <dgm:txFillClrLst meth="repeat">
+      <a:schemeClr val="dk1"/>
+    </dgm:txFillClrLst>
+    <dgm:txEffectClrLst/>
+  </dgm:styleLbl>
+  <dgm:styleLbl name="conFgAcc1">
+    <dgm:fillClrLst meth="repeat">
+      <a:schemeClr val="lt1">
+        <a:alpha val="90000"/>
+      </a:schemeClr>
+    </dgm:fillClrLst>
+    <dgm:linClrLst>
+      <a:schemeClr val="accent2"/>
+      <a:schemeClr val="accent3"/>
+    </dgm:linClrLst>
+    <dgm:effectClrLst/>
+    <dgm:txLinClrLst/>
+    <dgm:txFillClrLst meth="repeat">
+      <a:schemeClr val="dk1"/>
+    </dgm:txFillClrLst>
+    <dgm:txEffectClrLst/>
+  </dgm:styleLbl>
+  <dgm:styleLbl name="alignAcc1">
+    <dgm:fillClrLst meth="repeat">
+      <a:schemeClr val="lt1">
+        <a:alpha val="90000"/>
+      </a:schemeClr>
+    </dgm:fillClrLst>
+    <dgm:linClrLst>
+      <a:schemeClr val="accent2"/>
+      <a:schemeClr val="accent3"/>
+    </dgm:linClrLst>
+    <dgm:effectClrLst/>
+    <dgm:txLinClrLst/>
+    <dgm:txFillClrLst meth="repeat">
+      <a:schemeClr val="dk1"/>
+    </dgm:txFillClrLst>
+    <dgm:txEffectClrLst/>
+  </dgm:styleLbl>
+  <dgm:styleLbl name="trAlignAcc1">
+    <dgm:fillClrLst meth="repeat">
+      <a:schemeClr val="lt1">
+        <a:alpha val="40000"/>
+      </a:schemeClr>
+    </dgm:fillClrLst>
+    <dgm:linClrLst meth="repeat">
+      <a:schemeClr val="accent2"/>
+    </dgm:linClrLst>
+    <dgm:effectClrLst/>
+    <dgm:txLinClrLst/>
+    <dgm:txFillClrLst meth="repeat">
+      <a:schemeClr val="dk1"/>
+    </dgm:txFillClrLst>
+    <dgm:txEffectClrLst/>
+  </dgm:styleLbl>
+  <dgm:styleLbl name="bgAcc1">
+    <dgm:fillClrLst meth="repeat">
+      <a:schemeClr val="lt1">
+        <a:alpha val="90000"/>
+      </a:schemeClr>
+    </dgm:fillClrLst>
+    <dgm:linClrLst>
+      <a:schemeClr val="accent2"/>
+      <a:schemeClr val="accent3"/>
+    </dgm:linClrLst>
+    <dgm:effectClrLst/>
+    <dgm:txLinClrLst/>
+    <dgm:txFillClrLst meth="repeat">
+      <a:schemeClr val="dk1"/>
+    </dgm:txFillClrLst>
+    <dgm:txEffectClrLst/>
+  </dgm:styleLbl>
+  <dgm:styleLbl name="solidFgAcc1">
+    <dgm:fillClrLst meth="repeat">
+      <a:schemeClr val="lt1"/>
+    </dgm:fillClrLst>
+    <dgm:linClrLst>
+      <a:schemeClr val="accent2"/>
+      <a:schemeClr val="accent3"/>
+    </dgm:linClrLst>
+    <dgm:effectClrLst/>
+    <dgm:txLinClrLst/>
+    <dgm:txFillClrLst meth="repeat">
+      <a:schemeClr val="dk1"/>
+    </dgm:txFillClrLst>
+    <dgm:txEffectClrLst/>
+  </dgm:styleLbl>
+  <dgm:styleLbl name="solidAlignAcc1">
+    <dgm:fillClrLst meth="repeat">
+      <a:schemeClr val="lt1"/>
+    </dgm:fillClrLst>
+    <dgm:linClrLst>
+      <a:schemeClr val="accent2"/>
+      <a:schemeClr val="accent3"/>
+    </dgm:linClrLst>
+    <dgm:effectClrLst/>
+    <dgm:txLinClrLst/>
+    <dgm:txFillClrLst meth="repeat">
+      <a:schemeClr val="dk1"/>
+    </dgm:txFillClrLst>
+    <dgm:txEffectClrLst/>
+  </dgm:styleLbl>
+  <dgm:styleLbl name="solidBgAcc1">
+    <dgm:fillClrLst meth="repeat">
+      <a:schemeClr val="lt1"/>
+    </dgm:fillClrLst>
+    <dgm:linClrLst>
+      <a:schemeClr val="accent2"/>
+      <a:schemeClr val="accent3"/>
+    </dgm:linClrLst>
+    <dgm:effectClrLst/>
+    <dgm:txLinClrLst/>
+    <dgm:txFillClrLst meth="repeat">
+      <a:schemeClr val="dk1"/>
+    </dgm:txFillClrLst>
+    <dgm:txEffectClrLst/>
+  </dgm:styleLbl>
+  <dgm:styleLbl name="fgAccFollowNode1">
+    <dgm:fillClrLst>
+      <a:schemeClr val="accent2">
+        <a:tint val="40000"/>
+        <a:alpha val="90000"/>
+      </a:schemeClr>
+      <a:schemeClr val="accent3">
+        <a:tint val="40000"/>
+        <a:alpha val="90000"/>
+      </a:schemeClr>
+    </dgm:fillClrLst>
+    <dgm:linClrLst>
+      <a:schemeClr val="accent2">
+        <a:tint val="40000"/>
+        <a:alpha val="90000"/>
+      </a:schemeClr>
+      <a:schemeClr val="accent3">
+        <a:tint val="40000"/>
+        <a:alpha val="90000"/>
+      </a:schemeClr>
+    </dgm:linClrLst>
+    <dgm:effectClrLst/>
+    <dgm:txLinClrLst/>
+    <dgm:txFillClrLst meth="repeat">
+      <a:schemeClr val="dk1"/>
+    </dgm:txFillClrLst>
+    <dgm:txEffectClrLst/>
+  </dgm:styleLbl>
+  <dgm:styleLbl name="alignAccFollowNode1">
+    <dgm:fillClrLst>
+      <a:schemeClr val="accent2">
+        <a:tint val="40000"/>
+        <a:alpha val="90000"/>
+      </a:schemeClr>
+      <a:schemeClr val="accent3">
+        <a:tint val="40000"/>
+        <a:alpha val="90000"/>
+      </a:schemeClr>
+    </dgm:fillClrLst>
+    <dgm:linClrLst>
+      <a:schemeClr val="accent2">
+        <a:tint val="40000"/>
+        <a:alpha val="90000"/>
+      </a:schemeClr>
+      <a:schemeClr val="accent3">
+        <a:tint val="40000"/>
+        <a:alpha val="90000"/>
+      </a:schemeClr>
+    </dgm:linClrLst>
+    <dgm:effectClrLst/>
+    <dgm:txLinClrLst/>
+    <dgm:txFillClrLst meth="repeat">
+      <a:schemeClr val="dk1"/>
+    </dgm:txFillClrLst>
+    <dgm:txEffectClrLst/>
+  </dgm:styleLbl>
+  <dgm:styleLbl name="bgAccFollowNode1">
+    <dgm:fillClrLst>
+      <a:schemeClr val="accent2">
+        <a:tint val="40000"/>
+        <a:alpha val="90000"/>
+      </a:schemeClr>
+      <a:schemeClr val="accent3">
+        <a:tint val="40000"/>
+        <a:alpha val="90000"/>
+      </a:schemeClr>
+    </dgm:fillClrLst>
+    <dgm:linClrLst>
+      <a:schemeClr val="accent2">
+        <a:tint val="40000"/>
+        <a:alpha val="90000"/>
+      </a:schemeClr>
+      <a:schemeClr val="accent3">
+        <a:tint val="40000"/>
+        <a:alpha val="90000"/>
+      </a:schemeClr>
+    </dgm:linClrLst>
+    <dgm:effectClrLst/>
+    <dgm:txLinClrLst/>
+    <dgm:txFillClrLst meth="repeat">
+      <a:schemeClr val="dk1"/>
+    </dgm:txFillClrLst>
+    <dgm:txEffectClrLst/>
+  </dgm:styleLbl>
+  <dgm:styleLbl name="fgAcc0">
+    <dgm:fillClrLst meth="repeat">
+      <a:schemeClr val="lt1">
+        <a:alpha val="90000"/>
+      </a:schemeClr>
+    </dgm:fillClrLst>
+    <dgm:linClrLst>
+      <a:schemeClr val="accent1"/>
+    </dgm:linClrLst>
+    <dgm:effectClrLst/>
+    <dgm:txLinClrLst/>
+    <dgm:txFillClrLst meth="repeat">
+      <a:schemeClr val="dk1"/>
+    </dgm:txFillClrLst>
+    <dgm:txEffectClrLst/>
+  </dgm:styleLbl>
+  <dgm:styleLbl name="fgAcc2">
+    <dgm:fillClrLst meth="repeat">
+      <a:schemeClr val="lt1">
+        <a:alpha val="90000"/>
+      </a:schemeClr>
+    </dgm:fillClrLst>
+    <dgm:linClrLst>
+      <a:schemeClr val="accent3"/>
+    </dgm:linClrLst>
+    <dgm:effectClrLst/>
+    <dgm:txLinClrLst/>
+    <dgm:txFillClrLst meth="repeat">
+      <a:schemeClr val="dk1"/>
+    </dgm:txFillClrLst>
+    <dgm:txEffectClrLst/>
+  </dgm:styleLbl>
+  <dgm:styleLbl name="fgAcc3">
+    <dgm:fillClrLst meth="repeat">
+      <a:schemeClr val="lt1">
+        <a:alpha val="90000"/>
+      </a:schemeClr>
+    </dgm:fillClrLst>
+    <dgm:linClrLst>
+      <a:schemeClr val="accent4"/>
+    </dgm:linClrLst>
+    <dgm:effectClrLst/>
+    <dgm:txLinClrLst/>
+    <dgm:txFillClrLst meth="repeat">
+      <a:schemeClr val="dk1"/>
+    </dgm:txFillClrLst>
+    <dgm:txEffectClrLst/>
+  </dgm:styleLbl>
+  <dgm:styleLbl name="fgAcc4">
+    <dgm:fillClrLst meth="repeat">
+      <a:schemeClr val="lt1">
+        <a:alpha val="90000"/>
+      </a:schemeClr>
+    </dgm:fillClrLst>
+    <dgm:linClrLst>
+      <a:schemeClr val="accent5"/>
+    </dgm:linClrLst>
+    <dgm:effectClrLst/>
+    <dgm:txLinClrLst/>
+    <dgm:txFillClrLst meth="repeat">
+      <a:schemeClr val="dk1"/>
+    </dgm:txFillClrLst>
+    <dgm:txEffectClrLst/>
+  </dgm:styleLbl>
+  <dgm:styleLbl name="bgShp">
+    <dgm:fillClrLst meth="repeat">
+      <a:schemeClr val="accent2">
+        <a:tint val="40000"/>
+      </a:schemeClr>
+    </dgm:fillClrLst>
+    <dgm:linClrLst meth="repeat">
+      <a:schemeClr val="dk1"/>
+    </dgm:linClrLst>
+    <dgm:effectClrLst/>
+    <dgm:txLinClrLst/>
+    <dgm:txFillClrLst meth="repeat">
+      <a:schemeClr val="dk1"/>
+    </dgm:txFillClrLst>
+    <dgm:txEffectClrLst/>
+  </dgm:styleLbl>
+  <dgm:styleLbl name="dkBgShp">
+    <dgm:fillClrLst meth="repeat">
+      <a:schemeClr val="accent2">
+        <a:shade val="90000"/>
+      </a:schemeClr>
+    </dgm:fillClrLst>
+    <dgm:linClrLst meth="repeat">
+      <a:schemeClr val="dk1"/>
+    </dgm:linClrLst>
+    <dgm:effectClrLst/>
+    <dgm:txLinClrLst/>
+    <dgm:txFillClrLst meth="repeat">
+      <a:schemeClr val="lt1"/>
+    </dgm:txFillClrLst>
+    <dgm:txEffectClrLst/>
+  </dgm:styleLbl>
+  <dgm:styleLbl name="trBgShp">
+    <dgm:fillClrLst meth="repeat">
+      <a:schemeClr val="accent2">
+        <a:tint val="50000"/>
+        <a:alpha val="40000"/>
+      </a:schemeClr>
+    </dgm:fillClrLst>
+    <dgm:linClrLst meth="repeat">
+      <a:schemeClr val="accent2"/>
+    </dgm:linClrLst>
+    <dgm:effectClrLst/>
+    <dgm:txLinClrLst/>
+    <dgm:txFillClrLst meth="repeat">
+      <a:schemeClr val="lt1"/>
+    </dgm:txFillClrLst>
+    <dgm:txEffectClrLst/>
+  </dgm:styleLbl>
+  <dgm:styleLbl name="fgShp">
+    <dgm:fillClrLst meth="repeat">
+      <a:schemeClr val="accent2">
+        <a:tint val="40000"/>
       </a:schemeClr>
     </dgm:fillClrLst>
     <dgm:linClrLst meth="repeat">
@@ -3783,6 +4860,302 @@
     <dgm:cxn modelId="{DB5EF685-A6F1-44F0-B689-420E92E67D10}" type="presParOf" srcId="{99BA287A-AD81-4E57-9C2E-94EDF6A67873}" destId="{A600BB7A-F159-4B47-B307-91B6AFE7F166}" srcOrd="0" destOrd="0" presId="urn:microsoft.com/office/officeart/2005/8/layout/hierarchy1"/>
     <dgm:cxn modelId="{36410D7B-E732-4F3D-987F-26BAFB90B1D9}" type="presParOf" srcId="{99BA287A-AD81-4E57-9C2E-94EDF6A67873}" destId="{CE8A9725-0105-48A7-99DB-11E7E474BF72}" srcOrd="1" destOrd="0" presId="urn:microsoft.com/office/officeart/2005/8/layout/hierarchy1"/>
     <dgm:cxn modelId="{561C5DA7-6EFC-4ABB-BEF0-B759CE5A9A63}" type="presParOf" srcId="{B0C7E1E6-3613-45B2-8E8E-B3F3693DE56F}" destId="{D5A19EBC-C58C-4597-BFFB-E3E3AE635E44}" srcOrd="1" destOrd="0" presId="urn:microsoft.com/office/officeart/2005/8/layout/hierarchy1"/>
+  </dgm:cxnLst>
+  <dgm:bg/>
+  <dgm:whole/>
+  <dgm:extLst>
+    <a:ext uri="http://schemas.microsoft.com/office/drawing/2008/diagram">
+      <dsp:dataModelExt xmlns:dsp="http://schemas.microsoft.com/office/drawing/2008/diagram" relId="rId6" minVer="http://schemas.openxmlformats.org/drawingml/2006/diagram"/>
+    </a:ext>
+  </dgm:extLst>
+</dgm:dataModel>
+</file>
+
+<file path=ppt/diagrams/data4.xml><?xml version="1.0" encoding="utf-8"?>
+<dgm:dataModel xmlns:dgm="http://schemas.openxmlformats.org/drawingml/2006/diagram" xmlns:a="http://schemas.openxmlformats.org/drawingml/2006/main">
+  <dgm:ptLst>
+    <dgm:pt modelId="{4A6831B3-5A75-4F0E-A1DA-7AC827A7BDB8}" type="doc">
+      <dgm:prSet loTypeId="urn:microsoft.com/office/officeart/2016/7/layout/BasicLinearProcessNumbered" loCatId="process" qsTypeId="urn:microsoft.com/office/officeart/2005/8/quickstyle/simple2" qsCatId="simple" csTypeId="urn:microsoft.com/office/officeart/2005/8/colors/colorful2" csCatId="colorful"/>
+      <dgm:spPr/>
+      <dgm:t>
+        <a:bodyPr/>
+        <a:lstStyle/>
+        <a:p>
+          <a:endParaRPr lang="en-US"/>
+        </a:p>
+      </dgm:t>
+    </dgm:pt>
+    <dgm:pt modelId="{D8FC3FE4-E97E-45BA-BC1B-DA98206731C7}">
+      <dgm:prSet/>
+      <dgm:spPr/>
+      <dgm:t>
+        <a:bodyPr/>
+        <a:lstStyle/>
+        <a:p>
+          <a:r>
+            <a:rPr lang="en-US"/>
+            <a:t>Use meaningful Class and ID names.</a:t>
+          </a:r>
+        </a:p>
+      </dgm:t>
+    </dgm:pt>
+    <dgm:pt modelId="{37858E59-D97B-4825-8A03-3604F3D2A434}" type="parTrans" cxnId="{2F5B6FEA-382F-4E1A-9269-D0496B492741}">
+      <dgm:prSet/>
+      <dgm:spPr/>
+      <dgm:t>
+        <a:bodyPr/>
+        <a:lstStyle/>
+        <a:p>
+          <a:endParaRPr lang="en-US"/>
+        </a:p>
+      </dgm:t>
+    </dgm:pt>
+    <dgm:pt modelId="{411088A5-8F9A-4D0A-8B8B-CEF921F71BD3}" type="sibTrans" cxnId="{2F5B6FEA-382F-4E1A-9269-D0496B492741}">
+      <dgm:prSet phldrT="1" phldr="0"/>
+      <dgm:spPr/>
+      <dgm:t>
+        <a:bodyPr/>
+        <a:lstStyle/>
+        <a:p>
+          <a:r>
+            <a:rPr lang="en-US"/>
+            <a:t>1</a:t>
+          </a:r>
+        </a:p>
+      </dgm:t>
+    </dgm:pt>
+    <dgm:pt modelId="{C065FDA2-4936-489D-B607-FA5A781DC0BB}">
+      <dgm:prSet/>
+      <dgm:spPr/>
+      <dgm:t>
+        <a:bodyPr/>
+        <a:lstStyle/>
+        <a:p>
+          <a:r>
+            <a:rPr lang="en-US"/>
+            <a:t>Use a consistent HTML structure</a:t>
+          </a:r>
+        </a:p>
+      </dgm:t>
+    </dgm:pt>
+    <dgm:pt modelId="{D693E48B-78D3-4189-A999-A154A4F951B7}" type="parTrans" cxnId="{A7DBC2AE-5F41-4312-80E2-BCB143B240A2}">
+      <dgm:prSet/>
+      <dgm:spPr/>
+      <dgm:t>
+        <a:bodyPr/>
+        <a:lstStyle/>
+        <a:p>
+          <a:endParaRPr lang="en-US"/>
+        </a:p>
+      </dgm:t>
+    </dgm:pt>
+    <dgm:pt modelId="{69A8A12C-A4BA-45EE-A4E6-1A086434B439}" type="sibTrans" cxnId="{A7DBC2AE-5F41-4312-80E2-BCB143B240A2}">
+      <dgm:prSet phldrT="2" phldr="0"/>
+      <dgm:spPr/>
+      <dgm:t>
+        <a:bodyPr/>
+        <a:lstStyle/>
+        <a:p>
+          <a:r>
+            <a:rPr lang="en-US"/>
+            <a:t>2</a:t>
+          </a:r>
+        </a:p>
+      </dgm:t>
+    </dgm:pt>
+    <dgm:pt modelId="{D3980A9D-B871-43BF-8F7D-281C7F18A449}">
+      <dgm:prSet/>
+      <dgm:spPr/>
+      <dgm:t>
+        <a:bodyPr/>
+        <a:lstStyle/>
+        <a:p>
+          <a:r>
+            <a:rPr lang="en-US"/>
+            <a:t>Structure First and Design Second</a:t>
+          </a:r>
+        </a:p>
+      </dgm:t>
+    </dgm:pt>
+    <dgm:pt modelId="{5E7DF109-7E2C-43C7-BABC-639122E47A7D}" type="parTrans" cxnId="{74FF9F1B-5E44-4659-A2D4-04DC530CDD02}">
+      <dgm:prSet/>
+      <dgm:spPr/>
+      <dgm:t>
+        <a:bodyPr/>
+        <a:lstStyle/>
+        <a:p>
+          <a:endParaRPr lang="en-US"/>
+        </a:p>
+      </dgm:t>
+    </dgm:pt>
+    <dgm:pt modelId="{C6235702-788C-4CF0-B24C-60C9300EA997}" type="sibTrans" cxnId="{74FF9F1B-5E44-4659-A2D4-04DC530CDD02}">
+      <dgm:prSet phldrT="3" phldr="0"/>
+      <dgm:spPr/>
+      <dgm:t>
+        <a:bodyPr/>
+        <a:lstStyle/>
+        <a:p>
+          <a:r>
+            <a:rPr lang="en-US"/>
+            <a:t>3</a:t>
+          </a:r>
+        </a:p>
+      </dgm:t>
+    </dgm:pt>
+    <dgm:pt modelId="{0A13755B-EA34-4F8E-91AD-0D55559E0E3B}" type="pres">
+      <dgm:prSet presAssocID="{4A6831B3-5A75-4F0E-A1DA-7AC827A7BDB8}" presName="Name0" presStyleCnt="0">
+        <dgm:presLayoutVars>
+          <dgm:animLvl val="lvl"/>
+          <dgm:resizeHandles val="exact"/>
+        </dgm:presLayoutVars>
+      </dgm:prSet>
+      <dgm:spPr/>
+    </dgm:pt>
+    <dgm:pt modelId="{5DA6DDCF-7E55-41EA-9626-C0CB295305FB}" type="pres">
+      <dgm:prSet presAssocID="{D8FC3FE4-E97E-45BA-BC1B-DA98206731C7}" presName="compositeNode" presStyleCnt="0">
+        <dgm:presLayoutVars>
+          <dgm:bulletEnabled val="1"/>
+        </dgm:presLayoutVars>
+      </dgm:prSet>
+      <dgm:spPr/>
+    </dgm:pt>
+    <dgm:pt modelId="{509E94BF-2BC1-4941-B9EE-98EDF25F0561}" type="pres">
+      <dgm:prSet presAssocID="{D8FC3FE4-E97E-45BA-BC1B-DA98206731C7}" presName="bgRect" presStyleLbl="bgAccFollowNode1" presStyleIdx="0" presStyleCnt="3"/>
+      <dgm:spPr/>
+    </dgm:pt>
+    <dgm:pt modelId="{E3448DC5-1C7C-4DC1-A894-6AE24C11D55B}" type="pres">
+      <dgm:prSet presAssocID="{411088A5-8F9A-4D0A-8B8B-CEF921F71BD3}" presName="sibTransNodeCircle" presStyleLbl="alignNode1" presStyleIdx="0" presStyleCnt="6">
+        <dgm:presLayoutVars>
+          <dgm:chMax val="0"/>
+          <dgm:bulletEnabled/>
+        </dgm:presLayoutVars>
+      </dgm:prSet>
+      <dgm:spPr/>
+    </dgm:pt>
+    <dgm:pt modelId="{149FD6DB-6DAC-4B4B-A227-EDF5AAF1693B}" type="pres">
+      <dgm:prSet presAssocID="{D8FC3FE4-E97E-45BA-BC1B-DA98206731C7}" presName="bottomLine" presStyleLbl="alignNode1" presStyleIdx="1" presStyleCnt="6">
+        <dgm:presLayoutVars/>
+      </dgm:prSet>
+      <dgm:spPr/>
+    </dgm:pt>
+    <dgm:pt modelId="{B539EEE6-8A8B-46C2-B3A3-88331D9A94DA}" type="pres">
+      <dgm:prSet presAssocID="{D8FC3FE4-E97E-45BA-BC1B-DA98206731C7}" presName="nodeText" presStyleLbl="bgAccFollowNode1" presStyleIdx="0" presStyleCnt="3">
+        <dgm:presLayoutVars>
+          <dgm:bulletEnabled val="1"/>
+        </dgm:presLayoutVars>
+      </dgm:prSet>
+      <dgm:spPr/>
+    </dgm:pt>
+    <dgm:pt modelId="{E982764D-1A4C-4CB1-8CDE-DDAC64891C14}" type="pres">
+      <dgm:prSet presAssocID="{411088A5-8F9A-4D0A-8B8B-CEF921F71BD3}" presName="sibTrans" presStyleCnt="0"/>
+      <dgm:spPr/>
+    </dgm:pt>
+    <dgm:pt modelId="{2C951160-A1C4-4735-8479-2CCA034286F6}" type="pres">
+      <dgm:prSet presAssocID="{C065FDA2-4936-489D-B607-FA5A781DC0BB}" presName="compositeNode" presStyleCnt="0">
+        <dgm:presLayoutVars>
+          <dgm:bulletEnabled val="1"/>
+        </dgm:presLayoutVars>
+      </dgm:prSet>
+      <dgm:spPr/>
+    </dgm:pt>
+    <dgm:pt modelId="{BA56FEF2-29AA-40F5-9A1A-C57ECA3F5943}" type="pres">
+      <dgm:prSet presAssocID="{C065FDA2-4936-489D-B607-FA5A781DC0BB}" presName="bgRect" presStyleLbl="bgAccFollowNode1" presStyleIdx="1" presStyleCnt="3"/>
+      <dgm:spPr/>
+    </dgm:pt>
+    <dgm:pt modelId="{9CEEEA7E-03ED-4952-9143-7253A479085B}" type="pres">
+      <dgm:prSet presAssocID="{69A8A12C-A4BA-45EE-A4E6-1A086434B439}" presName="sibTransNodeCircle" presStyleLbl="alignNode1" presStyleIdx="2" presStyleCnt="6">
+        <dgm:presLayoutVars>
+          <dgm:chMax val="0"/>
+          <dgm:bulletEnabled/>
+        </dgm:presLayoutVars>
+      </dgm:prSet>
+      <dgm:spPr/>
+    </dgm:pt>
+    <dgm:pt modelId="{1A26EA35-E7CD-4B77-97EE-452F72DF812B}" type="pres">
+      <dgm:prSet presAssocID="{C065FDA2-4936-489D-B607-FA5A781DC0BB}" presName="bottomLine" presStyleLbl="alignNode1" presStyleIdx="3" presStyleCnt="6">
+        <dgm:presLayoutVars/>
+      </dgm:prSet>
+      <dgm:spPr/>
+    </dgm:pt>
+    <dgm:pt modelId="{24E3BB80-14E2-4BE3-B007-5FE79C3E1C77}" type="pres">
+      <dgm:prSet presAssocID="{C065FDA2-4936-489D-B607-FA5A781DC0BB}" presName="nodeText" presStyleLbl="bgAccFollowNode1" presStyleIdx="1" presStyleCnt="3">
+        <dgm:presLayoutVars>
+          <dgm:bulletEnabled val="1"/>
+        </dgm:presLayoutVars>
+      </dgm:prSet>
+      <dgm:spPr/>
+    </dgm:pt>
+    <dgm:pt modelId="{6EF674F7-B553-4003-A628-58AE8B22FE94}" type="pres">
+      <dgm:prSet presAssocID="{69A8A12C-A4BA-45EE-A4E6-1A086434B439}" presName="sibTrans" presStyleCnt="0"/>
+      <dgm:spPr/>
+    </dgm:pt>
+    <dgm:pt modelId="{AE94E651-63E8-4406-B0D5-963369F43804}" type="pres">
+      <dgm:prSet presAssocID="{D3980A9D-B871-43BF-8F7D-281C7F18A449}" presName="compositeNode" presStyleCnt="0">
+        <dgm:presLayoutVars>
+          <dgm:bulletEnabled val="1"/>
+        </dgm:presLayoutVars>
+      </dgm:prSet>
+      <dgm:spPr/>
+    </dgm:pt>
+    <dgm:pt modelId="{66690595-F66B-4D42-A0FD-4410AB7779C2}" type="pres">
+      <dgm:prSet presAssocID="{D3980A9D-B871-43BF-8F7D-281C7F18A449}" presName="bgRect" presStyleLbl="bgAccFollowNode1" presStyleIdx="2" presStyleCnt="3"/>
+      <dgm:spPr/>
+    </dgm:pt>
+    <dgm:pt modelId="{E64C1D81-DBB8-4314-BEC8-432FF2DCBE19}" type="pres">
+      <dgm:prSet presAssocID="{C6235702-788C-4CF0-B24C-60C9300EA997}" presName="sibTransNodeCircle" presStyleLbl="alignNode1" presStyleIdx="4" presStyleCnt="6">
+        <dgm:presLayoutVars>
+          <dgm:chMax val="0"/>
+          <dgm:bulletEnabled/>
+        </dgm:presLayoutVars>
+      </dgm:prSet>
+      <dgm:spPr/>
+    </dgm:pt>
+    <dgm:pt modelId="{71C4B164-5B9E-4D8B-BFCD-7379A9C3D135}" type="pres">
+      <dgm:prSet presAssocID="{D3980A9D-B871-43BF-8F7D-281C7F18A449}" presName="bottomLine" presStyleLbl="alignNode1" presStyleIdx="5" presStyleCnt="6">
+        <dgm:presLayoutVars/>
+      </dgm:prSet>
+      <dgm:spPr/>
+    </dgm:pt>
+    <dgm:pt modelId="{86E09DB8-CB2B-4432-BFC2-79A222FD69E9}" type="pres">
+      <dgm:prSet presAssocID="{D3980A9D-B871-43BF-8F7D-281C7F18A449}" presName="nodeText" presStyleLbl="bgAccFollowNode1" presStyleIdx="2" presStyleCnt="3">
+        <dgm:presLayoutVars>
+          <dgm:bulletEnabled val="1"/>
+        </dgm:presLayoutVars>
+      </dgm:prSet>
+      <dgm:spPr/>
+    </dgm:pt>
+  </dgm:ptLst>
+  <dgm:cxnLst>
+    <dgm:cxn modelId="{889A550B-B1ED-49BB-9986-F44CF424D52B}" type="presOf" srcId="{D3980A9D-B871-43BF-8F7D-281C7F18A449}" destId="{86E09DB8-CB2B-4432-BFC2-79A222FD69E9}" srcOrd="1" destOrd="0" presId="urn:microsoft.com/office/officeart/2016/7/layout/BasicLinearProcessNumbered"/>
+    <dgm:cxn modelId="{74FF9F1B-5E44-4659-A2D4-04DC530CDD02}" srcId="{4A6831B3-5A75-4F0E-A1DA-7AC827A7BDB8}" destId="{D3980A9D-B871-43BF-8F7D-281C7F18A449}" srcOrd="2" destOrd="0" parTransId="{5E7DF109-7E2C-43C7-BABC-639122E47A7D}" sibTransId="{C6235702-788C-4CF0-B24C-60C9300EA997}"/>
+    <dgm:cxn modelId="{B8D58B60-843C-44E4-A165-CA0480ED02C5}" type="presOf" srcId="{C065FDA2-4936-489D-B607-FA5A781DC0BB}" destId="{BA56FEF2-29AA-40F5-9A1A-C57ECA3F5943}" srcOrd="0" destOrd="0" presId="urn:microsoft.com/office/officeart/2016/7/layout/BasicLinearProcessNumbered"/>
+    <dgm:cxn modelId="{ECA3F842-3D2A-425D-9592-3925B9D8F4D1}" type="presOf" srcId="{411088A5-8F9A-4D0A-8B8B-CEF921F71BD3}" destId="{E3448DC5-1C7C-4DC1-A894-6AE24C11D55B}" srcOrd="0" destOrd="0" presId="urn:microsoft.com/office/officeart/2016/7/layout/BasicLinearProcessNumbered"/>
+    <dgm:cxn modelId="{F1C0E16D-4F12-4776-BBEF-B5D94B238D14}" type="presOf" srcId="{D8FC3FE4-E97E-45BA-BC1B-DA98206731C7}" destId="{509E94BF-2BC1-4941-B9EE-98EDF25F0561}" srcOrd="0" destOrd="0" presId="urn:microsoft.com/office/officeart/2016/7/layout/BasicLinearProcessNumbered"/>
+    <dgm:cxn modelId="{8EAEFB8E-500D-4B8E-A6A2-9B65CD2F10B0}" type="presOf" srcId="{69A8A12C-A4BA-45EE-A4E6-1A086434B439}" destId="{9CEEEA7E-03ED-4952-9143-7253A479085B}" srcOrd="0" destOrd="0" presId="urn:microsoft.com/office/officeart/2016/7/layout/BasicLinearProcessNumbered"/>
+    <dgm:cxn modelId="{A7DBC2AE-5F41-4312-80E2-BCB143B240A2}" srcId="{4A6831B3-5A75-4F0E-A1DA-7AC827A7BDB8}" destId="{C065FDA2-4936-489D-B607-FA5A781DC0BB}" srcOrd="1" destOrd="0" parTransId="{D693E48B-78D3-4189-A999-A154A4F951B7}" sibTransId="{69A8A12C-A4BA-45EE-A4E6-1A086434B439}"/>
+    <dgm:cxn modelId="{4EC737B3-4741-471C-A23F-7C92F523B652}" type="presOf" srcId="{D8FC3FE4-E97E-45BA-BC1B-DA98206731C7}" destId="{B539EEE6-8A8B-46C2-B3A3-88331D9A94DA}" srcOrd="1" destOrd="0" presId="urn:microsoft.com/office/officeart/2016/7/layout/BasicLinearProcessNumbered"/>
+    <dgm:cxn modelId="{ED09ACC2-810A-455B-9888-E7AFFF3960F1}" type="presOf" srcId="{4A6831B3-5A75-4F0E-A1DA-7AC827A7BDB8}" destId="{0A13755B-EA34-4F8E-91AD-0D55559E0E3B}" srcOrd="0" destOrd="0" presId="urn:microsoft.com/office/officeart/2016/7/layout/BasicLinearProcessNumbered"/>
+    <dgm:cxn modelId="{1AD72DDF-AD0D-4886-B179-475E7181BBB3}" type="presOf" srcId="{C6235702-788C-4CF0-B24C-60C9300EA997}" destId="{E64C1D81-DBB8-4314-BEC8-432FF2DCBE19}" srcOrd="0" destOrd="0" presId="urn:microsoft.com/office/officeart/2016/7/layout/BasicLinearProcessNumbered"/>
+    <dgm:cxn modelId="{B0A083DF-BDF2-4C1D-9B8E-D2B60A9CB914}" type="presOf" srcId="{C065FDA2-4936-489D-B607-FA5A781DC0BB}" destId="{24E3BB80-14E2-4BE3-B007-5FE79C3E1C77}" srcOrd="1" destOrd="0" presId="urn:microsoft.com/office/officeart/2016/7/layout/BasicLinearProcessNumbered"/>
+    <dgm:cxn modelId="{2F5B6FEA-382F-4E1A-9269-D0496B492741}" srcId="{4A6831B3-5A75-4F0E-A1DA-7AC827A7BDB8}" destId="{D8FC3FE4-E97E-45BA-BC1B-DA98206731C7}" srcOrd="0" destOrd="0" parTransId="{37858E59-D97B-4825-8A03-3604F3D2A434}" sibTransId="{411088A5-8F9A-4D0A-8B8B-CEF921F71BD3}"/>
+    <dgm:cxn modelId="{063C56FD-06E9-420F-83A4-CA1D10F61906}" type="presOf" srcId="{D3980A9D-B871-43BF-8F7D-281C7F18A449}" destId="{66690595-F66B-4D42-A0FD-4410AB7779C2}" srcOrd="0" destOrd="0" presId="urn:microsoft.com/office/officeart/2016/7/layout/BasicLinearProcessNumbered"/>
+    <dgm:cxn modelId="{10C55164-2D31-4783-94A6-70F7E4965519}" type="presParOf" srcId="{0A13755B-EA34-4F8E-91AD-0D55559E0E3B}" destId="{5DA6DDCF-7E55-41EA-9626-C0CB295305FB}" srcOrd="0" destOrd="0" presId="urn:microsoft.com/office/officeart/2016/7/layout/BasicLinearProcessNumbered"/>
+    <dgm:cxn modelId="{80107D51-5485-4FBE-A72D-27B0F0774555}" type="presParOf" srcId="{5DA6DDCF-7E55-41EA-9626-C0CB295305FB}" destId="{509E94BF-2BC1-4941-B9EE-98EDF25F0561}" srcOrd="0" destOrd="0" presId="urn:microsoft.com/office/officeart/2016/7/layout/BasicLinearProcessNumbered"/>
+    <dgm:cxn modelId="{D509900C-0122-4B3D-AA38-85E3CC2E4B4F}" type="presParOf" srcId="{5DA6DDCF-7E55-41EA-9626-C0CB295305FB}" destId="{E3448DC5-1C7C-4DC1-A894-6AE24C11D55B}" srcOrd="1" destOrd="0" presId="urn:microsoft.com/office/officeart/2016/7/layout/BasicLinearProcessNumbered"/>
+    <dgm:cxn modelId="{47359B65-71FE-4FD7-BD4B-CAEDB9612F3B}" type="presParOf" srcId="{5DA6DDCF-7E55-41EA-9626-C0CB295305FB}" destId="{149FD6DB-6DAC-4B4B-A227-EDF5AAF1693B}" srcOrd="2" destOrd="0" presId="urn:microsoft.com/office/officeart/2016/7/layout/BasicLinearProcessNumbered"/>
+    <dgm:cxn modelId="{054951FB-1917-461D-9191-B1D1EC7D5134}" type="presParOf" srcId="{5DA6DDCF-7E55-41EA-9626-C0CB295305FB}" destId="{B539EEE6-8A8B-46C2-B3A3-88331D9A94DA}" srcOrd="3" destOrd="0" presId="urn:microsoft.com/office/officeart/2016/7/layout/BasicLinearProcessNumbered"/>
+    <dgm:cxn modelId="{19454B12-E1C3-4958-B73F-94A2C479E2FD}" type="presParOf" srcId="{0A13755B-EA34-4F8E-91AD-0D55559E0E3B}" destId="{E982764D-1A4C-4CB1-8CDE-DDAC64891C14}" srcOrd="1" destOrd="0" presId="urn:microsoft.com/office/officeart/2016/7/layout/BasicLinearProcessNumbered"/>
+    <dgm:cxn modelId="{89059225-3CA1-4B92-8705-506B1B306E9A}" type="presParOf" srcId="{0A13755B-EA34-4F8E-91AD-0D55559E0E3B}" destId="{2C951160-A1C4-4735-8479-2CCA034286F6}" srcOrd="2" destOrd="0" presId="urn:microsoft.com/office/officeart/2016/7/layout/BasicLinearProcessNumbered"/>
+    <dgm:cxn modelId="{19A91033-EAD3-44A6-84D8-1D0775AF0B10}" type="presParOf" srcId="{2C951160-A1C4-4735-8479-2CCA034286F6}" destId="{BA56FEF2-29AA-40F5-9A1A-C57ECA3F5943}" srcOrd="0" destOrd="0" presId="urn:microsoft.com/office/officeart/2016/7/layout/BasicLinearProcessNumbered"/>
+    <dgm:cxn modelId="{E7CC4EDD-CE34-45A5-B63C-0D8309435F7E}" type="presParOf" srcId="{2C951160-A1C4-4735-8479-2CCA034286F6}" destId="{9CEEEA7E-03ED-4952-9143-7253A479085B}" srcOrd="1" destOrd="0" presId="urn:microsoft.com/office/officeart/2016/7/layout/BasicLinearProcessNumbered"/>
+    <dgm:cxn modelId="{8024B95D-0D0B-40A2-8E82-680F3D27103E}" type="presParOf" srcId="{2C951160-A1C4-4735-8479-2CCA034286F6}" destId="{1A26EA35-E7CD-4B77-97EE-452F72DF812B}" srcOrd="2" destOrd="0" presId="urn:microsoft.com/office/officeart/2016/7/layout/BasicLinearProcessNumbered"/>
+    <dgm:cxn modelId="{81408D4E-C822-4F8D-ADDB-E2356F47425F}" type="presParOf" srcId="{2C951160-A1C4-4735-8479-2CCA034286F6}" destId="{24E3BB80-14E2-4BE3-B007-5FE79C3E1C77}" srcOrd="3" destOrd="0" presId="urn:microsoft.com/office/officeart/2016/7/layout/BasicLinearProcessNumbered"/>
+    <dgm:cxn modelId="{2E39733A-0116-4DD6-A762-9D99036A03E5}" type="presParOf" srcId="{0A13755B-EA34-4F8E-91AD-0D55559E0E3B}" destId="{6EF674F7-B553-4003-A628-58AE8B22FE94}" srcOrd="3" destOrd="0" presId="urn:microsoft.com/office/officeart/2016/7/layout/BasicLinearProcessNumbered"/>
+    <dgm:cxn modelId="{691EEF2F-D65F-4B9B-A7D2-0A37FECDDE61}" type="presParOf" srcId="{0A13755B-EA34-4F8E-91AD-0D55559E0E3B}" destId="{AE94E651-63E8-4406-B0D5-963369F43804}" srcOrd="4" destOrd="0" presId="urn:microsoft.com/office/officeart/2016/7/layout/BasicLinearProcessNumbered"/>
+    <dgm:cxn modelId="{E285FB1B-5506-481A-A61B-1FEA24ED5926}" type="presParOf" srcId="{AE94E651-63E8-4406-B0D5-963369F43804}" destId="{66690595-F66B-4D42-A0FD-4410AB7779C2}" srcOrd="0" destOrd="0" presId="urn:microsoft.com/office/officeart/2016/7/layout/BasicLinearProcessNumbered"/>
+    <dgm:cxn modelId="{BA86DD84-683F-44D5-B52A-AFABE2BB0B45}" type="presParOf" srcId="{AE94E651-63E8-4406-B0D5-963369F43804}" destId="{E64C1D81-DBB8-4314-BEC8-432FF2DCBE19}" srcOrd="1" destOrd="0" presId="urn:microsoft.com/office/officeart/2016/7/layout/BasicLinearProcessNumbered"/>
+    <dgm:cxn modelId="{C55E884C-AF0C-49E5-8073-71882DAED71C}" type="presParOf" srcId="{AE94E651-63E8-4406-B0D5-963369F43804}" destId="{71C4B164-5B9E-4D8B-BFCD-7379A9C3D135}" srcOrd="2" destOrd="0" presId="urn:microsoft.com/office/officeart/2016/7/layout/BasicLinearProcessNumbered"/>
+    <dgm:cxn modelId="{BF2DA1AF-B692-4820-8184-8D0099D2DE70}" type="presParOf" srcId="{AE94E651-63E8-4406-B0D5-963369F43804}" destId="{86E09DB8-CB2B-4432-BFC2-79A222FD69E9}" srcOrd="3" destOrd="0" presId="urn:microsoft.com/office/officeart/2016/7/layout/BasicLinearProcessNumbered"/>
   </dgm:cxnLst>
   <dgm:bg/>
   <dgm:whole/>
@@ -5259,6 +6632,633 @@
         <a:off x="4819057" y="1613209"/>
         <a:ext cx="1755141" cy="1861614"/>
       </dsp:txXfrm>
+    </dsp:sp>
+  </dsp:spTree>
+</dsp:drawing>
+</file>
+
+<file path=ppt/diagrams/drawing4.xml><?xml version="1.0" encoding="utf-8"?>
+<dsp:drawing xmlns:dgm="http://schemas.openxmlformats.org/drawingml/2006/diagram" xmlns:dsp="http://schemas.microsoft.com/office/drawing/2008/diagram" xmlns:a="http://schemas.openxmlformats.org/drawingml/2006/main">
+  <dsp:spTree>
+    <dsp:nvGrpSpPr>
+      <dsp:cNvPr id="0" name=""/>
+      <dsp:cNvGrpSpPr/>
+    </dsp:nvGrpSpPr>
+    <dsp:grpSpPr/>
+    <dsp:sp modelId="{509E94BF-2BC1-4941-B9EE-98EDF25F0561}">
+      <dsp:nvSpPr>
+        <dsp:cNvPr id="0" name=""/>
+        <dsp:cNvSpPr/>
+      </dsp:nvSpPr>
+      <dsp:spPr>
+        <a:xfrm>
+          <a:off x="0" y="0"/>
+          <a:ext cx="3005666" cy="4093482"/>
+        </a:xfrm>
+        <a:prstGeom prst="rect">
+          <a:avLst/>
+        </a:prstGeom>
+        <a:solidFill>
+          <a:schemeClr val="accent2">
+            <a:tint val="40000"/>
+            <a:alpha val="90000"/>
+            <a:hueOff val="0"/>
+            <a:satOff val="0"/>
+            <a:lumOff val="0"/>
+            <a:alphaOff val="0"/>
+          </a:schemeClr>
+        </a:solidFill>
+        <a:ln w="19050" cap="rnd" cmpd="sng" algn="ctr">
+          <a:solidFill>
+            <a:schemeClr val="accent2">
+              <a:tint val="40000"/>
+              <a:alpha val="90000"/>
+              <a:hueOff val="0"/>
+              <a:satOff val="0"/>
+              <a:lumOff val="0"/>
+              <a:alphaOff val="0"/>
+            </a:schemeClr>
+          </a:solidFill>
+          <a:prstDash val="solid"/>
+        </a:ln>
+        <a:effectLst/>
+      </dsp:spPr>
+      <dsp:style>
+        <a:lnRef idx="2">
+          <a:scrgbClr r="0" g="0" b="0"/>
+        </a:lnRef>
+        <a:fillRef idx="1">
+          <a:scrgbClr r="0" g="0" b="0"/>
+        </a:fillRef>
+        <a:effectRef idx="0">
+          <a:scrgbClr r="0" g="0" b="0"/>
+        </a:effectRef>
+        <a:fontRef idx="minor"/>
+      </dsp:style>
+      <dsp:txBody>
+        <a:bodyPr spcFirstLastPara="0" vert="horz" wrap="square" lIns="234333" tIns="330200" rIns="234333" bIns="330200" numCol="1" spcCol="1270" anchor="t" anchorCtr="0">
+          <a:noAutofit/>
+        </a:bodyPr>
+        <a:lstStyle/>
+        <a:p>
+          <a:pPr marL="0" lvl="0" indent="0" algn="l" defTabSz="1155700">
+            <a:lnSpc>
+              <a:spcPct val="90000"/>
+            </a:lnSpc>
+            <a:spcBef>
+              <a:spcPct val="0"/>
+            </a:spcBef>
+            <a:spcAft>
+              <a:spcPct val="35000"/>
+            </a:spcAft>
+            <a:buNone/>
+          </a:pPr>
+          <a:r>
+            <a:rPr lang="en-US" sz="2600" kern="1200"/>
+            <a:t>Use meaningful Class and ID names.</a:t>
+          </a:r>
+        </a:p>
+      </dsp:txBody>
+      <dsp:txXfrm>
+        <a:off x="0" y="1555523"/>
+        <a:ext cx="3005666" cy="2456089"/>
+      </dsp:txXfrm>
+    </dsp:sp>
+    <dsp:sp modelId="{E3448DC5-1C7C-4DC1-A894-6AE24C11D55B}">
+      <dsp:nvSpPr>
+        <dsp:cNvPr id="0" name=""/>
+        <dsp:cNvSpPr/>
+      </dsp:nvSpPr>
+      <dsp:spPr>
+        <a:xfrm>
+          <a:off x="888810" y="409348"/>
+          <a:ext cx="1228044" cy="1228044"/>
+        </a:xfrm>
+        <a:prstGeom prst="ellipse">
+          <a:avLst/>
+        </a:prstGeom>
+        <a:solidFill>
+          <a:schemeClr val="accent2">
+            <a:hueOff val="0"/>
+            <a:satOff val="0"/>
+            <a:lumOff val="0"/>
+            <a:alphaOff val="0"/>
+          </a:schemeClr>
+        </a:solidFill>
+        <a:ln w="19050" cap="rnd" cmpd="sng" algn="ctr">
+          <a:solidFill>
+            <a:schemeClr val="accent2">
+              <a:hueOff val="0"/>
+              <a:satOff val="0"/>
+              <a:lumOff val="0"/>
+              <a:alphaOff val="0"/>
+            </a:schemeClr>
+          </a:solidFill>
+          <a:prstDash val="solid"/>
+        </a:ln>
+        <a:effectLst/>
+      </dsp:spPr>
+      <dsp:style>
+        <a:lnRef idx="2">
+          <a:scrgbClr r="0" g="0" b="0"/>
+        </a:lnRef>
+        <a:fillRef idx="1">
+          <a:scrgbClr r="0" g="0" b="0"/>
+        </a:fillRef>
+        <a:effectRef idx="1">
+          <a:scrgbClr r="0" g="0" b="0"/>
+        </a:effectRef>
+        <a:fontRef idx="minor">
+          <a:schemeClr val="lt1"/>
+        </a:fontRef>
+      </dsp:style>
+      <dsp:txBody>
+        <a:bodyPr spcFirstLastPara="0" vert="horz" wrap="square" lIns="95743" tIns="12700" rIns="95743" bIns="12700" numCol="1" spcCol="1270" anchor="ctr" anchorCtr="0">
+          <a:noAutofit/>
+        </a:bodyPr>
+        <a:lstStyle/>
+        <a:p>
+          <a:pPr marL="0" lvl="0" indent="0" algn="ctr" defTabSz="2133600">
+            <a:lnSpc>
+              <a:spcPct val="90000"/>
+            </a:lnSpc>
+            <a:spcBef>
+              <a:spcPct val="0"/>
+            </a:spcBef>
+            <a:spcAft>
+              <a:spcPct val="35000"/>
+            </a:spcAft>
+            <a:buNone/>
+          </a:pPr>
+          <a:r>
+            <a:rPr lang="en-US" sz="4800" kern="1200"/>
+            <a:t>1</a:t>
+          </a:r>
+        </a:p>
+      </dsp:txBody>
+      <dsp:txXfrm>
+        <a:off x="1068653" y="589191"/>
+        <a:ext cx="868358" cy="868358"/>
+      </dsp:txXfrm>
+    </dsp:sp>
+    <dsp:sp modelId="{149FD6DB-6DAC-4B4B-A227-EDF5AAF1693B}">
+      <dsp:nvSpPr>
+        <dsp:cNvPr id="0" name=""/>
+        <dsp:cNvSpPr/>
+      </dsp:nvSpPr>
+      <dsp:spPr>
+        <a:xfrm>
+          <a:off x="0" y="4093410"/>
+          <a:ext cx="3005666" cy="72"/>
+        </a:xfrm>
+        <a:prstGeom prst="rect">
+          <a:avLst/>
+        </a:prstGeom>
+        <a:solidFill>
+          <a:schemeClr val="accent2">
+            <a:hueOff val="-592857"/>
+            <a:satOff val="2840"/>
+            <a:lumOff val="2627"/>
+            <a:alphaOff val="0"/>
+          </a:schemeClr>
+        </a:solidFill>
+        <a:ln w="19050" cap="rnd" cmpd="sng" algn="ctr">
+          <a:solidFill>
+            <a:schemeClr val="accent2">
+              <a:hueOff val="-592857"/>
+              <a:satOff val="2840"/>
+              <a:lumOff val="2627"/>
+              <a:alphaOff val="0"/>
+            </a:schemeClr>
+          </a:solidFill>
+          <a:prstDash val="solid"/>
+        </a:ln>
+        <a:effectLst/>
+      </dsp:spPr>
+      <dsp:style>
+        <a:lnRef idx="2">
+          <a:scrgbClr r="0" g="0" b="0"/>
+        </a:lnRef>
+        <a:fillRef idx="1">
+          <a:scrgbClr r="0" g="0" b="0"/>
+        </a:fillRef>
+        <a:effectRef idx="1">
+          <a:scrgbClr r="0" g="0" b="0"/>
+        </a:effectRef>
+        <a:fontRef idx="minor">
+          <a:schemeClr val="lt1"/>
+        </a:fontRef>
+      </dsp:style>
+    </dsp:sp>
+    <dsp:sp modelId="{BA56FEF2-29AA-40F5-9A1A-C57ECA3F5943}">
+      <dsp:nvSpPr>
+        <dsp:cNvPr id="0" name=""/>
+        <dsp:cNvSpPr/>
+      </dsp:nvSpPr>
+      <dsp:spPr>
+        <a:xfrm>
+          <a:off x="3306233" y="0"/>
+          <a:ext cx="3005666" cy="4093482"/>
+        </a:xfrm>
+        <a:prstGeom prst="rect">
+          <a:avLst/>
+        </a:prstGeom>
+        <a:solidFill>
+          <a:schemeClr val="accent2">
+            <a:tint val="40000"/>
+            <a:alpha val="90000"/>
+            <a:hueOff val="-2045920"/>
+            <a:satOff val="22554"/>
+            <a:lumOff val="2148"/>
+            <a:alphaOff val="0"/>
+          </a:schemeClr>
+        </a:solidFill>
+        <a:ln w="19050" cap="rnd" cmpd="sng" algn="ctr">
+          <a:solidFill>
+            <a:schemeClr val="accent2">
+              <a:tint val="40000"/>
+              <a:alpha val="90000"/>
+              <a:hueOff val="-2045920"/>
+              <a:satOff val="22554"/>
+              <a:lumOff val="2148"/>
+              <a:alphaOff val="0"/>
+            </a:schemeClr>
+          </a:solidFill>
+          <a:prstDash val="solid"/>
+        </a:ln>
+        <a:effectLst/>
+      </dsp:spPr>
+      <dsp:style>
+        <a:lnRef idx="2">
+          <a:scrgbClr r="0" g="0" b="0"/>
+        </a:lnRef>
+        <a:fillRef idx="1">
+          <a:scrgbClr r="0" g="0" b="0"/>
+        </a:fillRef>
+        <a:effectRef idx="0">
+          <a:scrgbClr r="0" g="0" b="0"/>
+        </a:effectRef>
+        <a:fontRef idx="minor"/>
+      </dsp:style>
+      <dsp:txBody>
+        <a:bodyPr spcFirstLastPara="0" vert="horz" wrap="square" lIns="234333" tIns="330200" rIns="234333" bIns="330200" numCol="1" spcCol="1270" anchor="t" anchorCtr="0">
+          <a:noAutofit/>
+        </a:bodyPr>
+        <a:lstStyle/>
+        <a:p>
+          <a:pPr marL="0" lvl="0" indent="0" algn="l" defTabSz="1155700">
+            <a:lnSpc>
+              <a:spcPct val="90000"/>
+            </a:lnSpc>
+            <a:spcBef>
+              <a:spcPct val="0"/>
+            </a:spcBef>
+            <a:spcAft>
+              <a:spcPct val="35000"/>
+            </a:spcAft>
+            <a:buNone/>
+          </a:pPr>
+          <a:r>
+            <a:rPr lang="en-US" sz="2600" kern="1200"/>
+            <a:t>Use a consistent HTML structure</a:t>
+          </a:r>
+        </a:p>
+      </dsp:txBody>
+      <dsp:txXfrm>
+        <a:off x="3306233" y="1555523"/>
+        <a:ext cx="3005666" cy="2456089"/>
+      </dsp:txXfrm>
+    </dsp:sp>
+    <dsp:sp modelId="{9CEEEA7E-03ED-4952-9143-7253A479085B}">
+      <dsp:nvSpPr>
+        <dsp:cNvPr id="0" name=""/>
+        <dsp:cNvSpPr/>
+      </dsp:nvSpPr>
+      <dsp:spPr>
+        <a:xfrm>
+          <a:off x="4195044" y="409348"/>
+          <a:ext cx="1228044" cy="1228044"/>
+        </a:xfrm>
+        <a:prstGeom prst="ellipse">
+          <a:avLst/>
+        </a:prstGeom>
+        <a:solidFill>
+          <a:schemeClr val="accent2">
+            <a:hueOff val="-1185714"/>
+            <a:satOff val="5680"/>
+            <a:lumOff val="5255"/>
+            <a:alphaOff val="0"/>
+          </a:schemeClr>
+        </a:solidFill>
+        <a:ln w="19050" cap="rnd" cmpd="sng" algn="ctr">
+          <a:solidFill>
+            <a:schemeClr val="accent2">
+              <a:hueOff val="-1185714"/>
+              <a:satOff val="5680"/>
+              <a:lumOff val="5255"/>
+              <a:alphaOff val="0"/>
+            </a:schemeClr>
+          </a:solidFill>
+          <a:prstDash val="solid"/>
+        </a:ln>
+        <a:effectLst/>
+      </dsp:spPr>
+      <dsp:style>
+        <a:lnRef idx="2">
+          <a:scrgbClr r="0" g="0" b="0"/>
+        </a:lnRef>
+        <a:fillRef idx="1">
+          <a:scrgbClr r="0" g="0" b="0"/>
+        </a:fillRef>
+        <a:effectRef idx="1">
+          <a:scrgbClr r="0" g="0" b="0"/>
+        </a:effectRef>
+        <a:fontRef idx="minor">
+          <a:schemeClr val="lt1"/>
+        </a:fontRef>
+      </dsp:style>
+      <dsp:txBody>
+        <a:bodyPr spcFirstLastPara="0" vert="horz" wrap="square" lIns="95743" tIns="12700" rIns="95743" bIns="12700" numCol="1" spcCol="1270" anchor="ctr" anchorCtr="0">
+          <a:noAutofit/>
+        </a:bodyPr>
+        <a:lstStyle/>
+        <a:p>
+          <a:pPr marL="0" lvl="0" indent="0" algn="ctr" defTabSz="2133600">
+            <a:lnSpc>
+              <a:spcPct val="90000"/>
+            </a:lnSpc>
+            <a:spcBef>
+              <a:spcPct val="0"/>
+            </a:spcBef>
+            <a:spcAft>
+              <a:spcPct val="35000"/>
+            </a:spcAft>
+            <a:buNone/>
+          </a:pPr>
+          <a:r>
+            <a:rPr lang="en-US" sz="4800" kern="1200"/>
+            <a:t>2</a:t>
+          </a:r>
+        </a:p>
+      </dsp:txBody>
+      <dsp:txXfrm>
+        <a:off x="4374887" y="589191"/>
+        <a:ext cx="868358" cy="868358"/>
+      </dsp:txXfrm>
+    </dsp:sp>
+    <dsp:sp modelId="{1A26EA35-E7CD-4B77-97EE-452F72DF812B}">
+      <dsp:nvSpPr>
+        <dsp:cNvPr id="0" name=""/>
+        <dsp:cNvSpPr/>
+      </dsp:nvSpPr>
+      <dsp:spPr>
+        <a:xfrm>
+          <a:off x="3306233" y="4093410"/>
+          <a:ext cx="3005666" cy="72"/>
+        </a:xfrm>
+        <a:prstGeom prst="rect">
+          <a:avLst/>
+        </a:prstGeom>
+        <a:solidFill>
+          <a:schemeClr val="accent2">
+            <a:hueOff val="-1778572"/>
+            <a:satOff val="8520"/>
+            <a:lumOff val="7882"/>
+            <a:alphaOff val="0"/>
+          </a:schemeClr>
+        </a:solidFill>
+        <a:ln w="19050" cap="rnd" cmpd="sng" algn="ctr">
+          <a:solidFill>
+            <a:schemeClr val="accent2">
+              <a:hueOff val="-1778572"/>
+              <a:satOff val="8520"/>
+              <a:lumOff val="7882"/>
+              <a:alphaOff val="0"/>
+            </a:schemeClr>
+          </a:solidFill>
+          <a:prstDash val="solid"/>
+        </a:ln>
+        <a:effectLst/>
+      </dsp:spPr>
+      <dsp:style>
+        <a:lnRef idx="2">
+          <a:scrgbClr r="0" g="0" b="0"/>
+        </a:lnRef>
+        <a:fillRef idx="1">
+          <a:scrgbClr r="0" g="0" b="0"/>
+        </a:fillRef>
+        <a:effectRef idx="1">
+          <a:scrgbClr r="0" g="0" b="0"/>
+        </a:effectRef>
+        <a:fontRef idx="minor">
+          <a:schemeClr val="lt1"/>
+        </a:fontRef>
+      </dsp:style>
+    </dsp:sp>
+    <dsp:sp modelId="{66690595-F66B-4D42-A0FD-4410AB7779C2}">
+      <dsp:nvSpPr>
+        <dsp:cNvPr id="0" name=""/>
+        <dsp:cNvSpPr/>
+      </dsp:nvSpPr>
+      <dsp:spPr>
+        <a:xfrm>
+          <a:off x="6612466" y="0"/>
+          <a:ext cx="3005666" cy="4093482"/>
+        </a:xfrm>
+        <a:prstGeom prst="rect">
+          <a:avLst/>
+        </a:prstGeom>
+        <a:solidFill>
+          <a:schemeClr val="accent2">
+            <a:tint val="40000"/>
+            <a:alpha val="90000"/>
+            <a:hueOff val="-4091839"/>
+            <a:satOff val="45107"/>
+            <a:lumOff val="4296"/>
+            <a:alphaOff val="0"/>
+          </a:schemeClr>
+        </a:solidFill>
+        <a:ln w="19050" cap="rnd" cmpd="sng" algn="ctr">
+          <a:solidFill>
+            <a:schemeClr val="accent2">
+              <a:tint val="40000"/>
+              <a:alpha val="90000"/>
+              <a:hueOff val="-4091839"/>
+              <a:satOff val="45107"/>
+              <a:lumOff val="4296"/>
+              <a:alphaOff val="0"/>
+            </a:schemeClr>
+          </a:solidFill>
+          <a:prstDash val="solid"/>
+        </a:ln>
+        <a:effectLst/>
+      </dsp:spPr>
+      <dsp:style>
+        <a:lnRef idx="2">
+          <a:scrgbClr r="0" g="0" b="0"/>
+        </a:lnRef>
+        <a:fillRef idx="1">
+          <a:scrgbClr r="0" g="0" b="0"/>
+        </a:fillRef>
+        <a:effectRef idx="0">
+          <a:scrgbClr r="0" g="0" b="0"/>
+        </a:effectRef>
+        <a:fontRef idx="minor"/>
+      </dsp:style>
+      <dsp:txBody>
+        <a:bodyPr spcFirstLastPara="0" vert="horz" wrap="square" lIns="234333" tIns="330200" rIns="234333" bIns="330200" numCol="1" spcCol="1270" anchor="t" anchorCtr="0">
+          <a:noAutofit/>
+        </a:bodyPr>
+        <a:lstStyle/>
+        <a:p>
+          <a:pPr marL="0" lvl="0" indent="0" algn="l" defTabSz="1155700">
+            <a:lnSpc>
+              <a:spcPct val="90000"/>
+            </a:lnSpc>
+            <a:spcBef>
+              <a:spcPct val="0"/>
+            </a:spcBef>
+            <a:spcAft>
+              <a:spcPct val="35000"/>
+            </a:spcAft>
+            <a:buNone/>
+          </a:pPr>
+          <a:r>
+            <a:rPr lang="en-US" sz="2600" kern="1200"/>
+            <a:t>Structure First and Design Second</a:t>
+          </a:r>
+        </a:p>
+      </dsp:txBody>
+      <dsp:txXfrm>
+        <a:off x="6612466" y="1555523"/>
+        <a:ext cx="3005666" cy="2456089"/>
+      </dsp:txXfrm>
+    </dsp:sp>
+    <dsp:sp modelId="{E64C1D81-DBB8-4314-BEC8-432FF2DCBE19}">
+      <dsp:nvSpPr>
+        <dsp:cNvPr id="0" name=""/>
+        <dsp:cNvSpPr/>
+      </dsp:nvSpPr>
+      <dsp:spPr>
+        <a:xfrm>
+          <a:off x="7501277" y="409348"/>
+          <a:ext cx="1228044" cy="1228044"/>
+        </a:xfrm>
+        <a:prstGeom prst="ellipse">
+          <a:avLst/>
+        </a:prstGeom>
+        <a:solidFill>
+          <a:schemeClr val="accent2">
+            <a:hueOff val="-2371429"/>
+            <a:satOff val="11360"/>
+            <a:lumOff val="10510"/>
+            <a:alphaOff val="0"/>
+          </a:schemeClr>
+        </a:solidFill>
+        <a:ln w="19050" cap="rnd" cmpd="sng" algn="ctr">
+          <a:solidFill>
+            <a:schemeClr val="accent2">
+              <a:hueOff val="-2371429"/>
+              <a:satOff val="11360"/>
+              <a:lumOff val="10510"/>
+              <a:alphaOff val="0"/>
+            </a:schemeClr>
+          </a:solidFill>
+          <a:prstDash val="solid"/>
+        </a:ln>
+        <a:effectLst/>
+      </dsp:spPr>
+      <dsp:style>
+        <a:lnRef idx="2">
+          <a:scrgbClr r="0" g="0" b="0"/>
+        </a:lnRef>
+        <a:fillRef idx="1">
+          <a:scrgbClr r="0" g="0" b="0"/>
+        </a:fillRef>
+        <a:effectRef idx="1">
+          <a:scrgbClr r="0" g="0" b="0"/>
+        </a:effectRef>
+        <a:fontRef idx="minor">
+          <a:schemeClr val="lt1"/>
+        </a:fontRef>
+      </dsp:style>
+      <dsp:txBody>
+        <a:bodyPr spcFirstLastPara="0" vert="horz" wrap="square" lIns="95743" tIns="12700" rIns="95743" bIns="12700" numCol="1" spcCol="1270" anchor="ctr" anchorCtr="0">
+          <a:noAutofit/>
+        </a:bodyPr>
+        <a:lstStyle/>
+        <a:p>
+          <a:pPr marL="0" lvl="0" indent="0" algn="ctr" defTabSz="2133600">
+            <a:lnSpc>
+              <a:spcPct val="90000"/>
+            </a:lnSpc>
+            <a:spcBef>
+              <a:spcPct val="0"/>
+            </a:spcBef>
+            <a:spcAft>
+              <a:spcPct val="35000"/>
+            </a:spcAft>
+            <a:buNone/>
+          </a:pPr>
+          <a:r>
+            <a:rPr lang="en-US" sz="4800" kern="1200"/>
+            <a:t>3</a:t>
+          </a:r>
+        </a:p>
+      </dsp:txBody>
+      <dsp:txXfrm>
+        <a:off x="7681120" y="589191"/>
+        <a:ext cx="868358" cy="868358"/>
+      </dsp:txXfrm>
+    </dsp:sp>
+    <dsp:sp modelId="{71C4B164-5B9E-4D8B-BFCD-7379A9C3D135}">
+      <dsp:nvSpPr>
+        <dsp:cNvPr id="0" name=""/>
+        <dsp:cNvSpPr/>
+      </dsp:nvSpPr>
+      <dsp:spPr>
+        <a:xfrm>
+          <a:off x="6612466" y="4093410"/>
+          <a:ext cx="3005666" cy="72"/>
+        </a:xfrm>
+        <a:prstGeom prst="rect">
+          <a:avLst/>
+        </a:prstGeom>
+        <a:solidFill>
+          <a:schemeClr val="accent2">
+            <a:hueOff val="-2964286"/>
+            <a:satOff val="14200"/>
+            <a:lumOff val="13137"/>
+            <a:alphaOff val="0"/>
+          </a:schemeClr>
+        </a:solidFill>
+        <a:ln w="19050" cap="rnd" cmpd="sng" algn="ctr">
+          <a:solidFill>
+            <a:schemeClr val="accent2">
+              <a:hueOff val="-2964286"/>
+              <a:satOff val="14200"/>
+              <a:lumOff val="13137"/>
+              <a:alphaOff val="0"/>
+            </a:schemeClr>
+          </a:solidFill>
+          <a:prstDash val="solid"/>
+        </a:ln>
+        <a:effectLst/>
+      </dsp:spPr>
+      <dsp:style>
+        <a:lnRef idx="2">
+          <a:scrgbClr r="0" g="0" b="0"/>
+        </a:lnRef>
+        <a:fillRef idx="1">
+          <a:scrgbClr r="0" g="0" b="0"/>
+        </a:fillRef>
+        <a:effectRef idx="1">
+          <a:scrgbClr r="0" g="0" b="0"/>
+        </a:effectRef>
+        <a:fontRef idx="minor">
+          <a:schemeClr val="lt1"/>
+        </a:fontRef>
+      </dsp:style>
     </dsp:sp>
   </dsp:spTree>
 </dsp:drawing>
@@ -6856,6 +8856,283 @@
 </dgm:layoutDef>
 </file>
 
+<file path=ppt/diagrams/layout4.xml><?xml version="1.0" encoding="utf-8"?>
+<dgm:layoutDef xmlns:dgm="http://schemas.openxmlformats.org/drawingml/2006/diagram" xmlns:a="http://schemas.openxmlformats.org/drawingml/2006/main" uniqueId="urn:microsoft.com/office/officeart/2016/7/layout/BasicLinearProcessNumbered">
+  <dgm:title val="Basic Linear Process Numbered"/>
+  <dgm:desc val="Used to show a progression; a timeline; sequential steps in a task, process, or workflow; or to emphasize movement or direction. Automatic numbers have been introduced to show the steps of the process which appears in a circle. Level 1 and Level 2 text appear in a rectangle."/>
+  <dgm:catLst>
+    <dgm:cat type="process" pri="500"/>
+  </dgm:catLst>
+  <dgm:sampData>
+    <dgm:dataModel>
+      <dgm:ptLst>
+        <dgm:pt modelId="0" type="doc"/>
+        <dgm:pt modelId="1">
+          <dgm:prSet phldr="1"/>
+        </dgm:pt>
+        <dgm:pt modelId="11">
+          <dgm:prSet phldr="1"/>
+        </dgm:pt>
+        <dgm:pt modelId="2">
+          <dgm:prSet phldr="1"/>
+        </dgm:pt>
+        <dgm:pt modelId="21">
+          <dgm:prSet phldr="1"/>
+        </dgm:pt>
+        <dgm:pt modelId="3">
+          <dgm:prSet phldr="1"/>
+        </dgm:pt>
+        <dgm:pt modelId="31">
+          <dgm:prSet phldr="1"/>
+        </dgm:pt>
+        <dgm:pt modelId="101" type="sibTrans" cxnId="4">
+          <dgm:prSet phldrT="1"/>
+          <dgm:t>
+            <a:bodyPr/>
+            <a:lstStyle/>
+            <a:p>
+              <a:r>
+                <a:t>1</a:t>
+              </a:r>
+            </a:p>
+          </dgm:t>
+        </dgm:pt>
+        <dgm:pt modelId="201" type="sibTrans" cxnId="5">
+          <dgm:prSet phldrT="2"/>
+          <dgm:t>
+            <a:bodyPr/>
+            <a:lstStyle/>
+            <a:p>
+              <a:r>
+                <a:t>2</a:t>
+              </a:r>
+            </a:p>
+          </dgm:t>
+        </dgm:pt>
+        <dgm:pt modelId="301" type="sibTrans" cxnId="6">
+          <dgm:prSet phldrT="3"/>
+          <dgm:t>
+            <a:bodyPr/>
+            <a:lstStyle/>
+            <a:p>
+              <a:r>
+                <a:t>3</a:t>
+              </a:r>
+            </a:p>
+          </dgm:t>
+        </dgm:pt>
+      </dgm:ptLst>
+      <dgm:cxnLst>
+        <dgm:cxn modelId="4" srcId="0" destId="1" srcOrd="0" destOrd="0" sibTransId="101"/>
+        <dgm:cxn modelId="5" srcId="0" destId="2" srcOrd="1" destOrd="0" sibTransId="201"/>
+        <dgm:cxn modelId="6" srcId="0" destId="3" srcOrd="2" destOrd="0" sibTransId="301"/>
+        <dgm:cxn modelId="13" srcId="1" destId="11" srcOrd="0" destOrd="0"/>
+        <dgm:cxn modelId="23" srcId="2" destId="21" srcOrd="0" destOrd="0"/>
+        <dgm:cxn modelId="33" srcId="3" destId="31" srcOrd="0" destOrd="0"/>
+      </dgm:cxnLst>
+      <dgm:bg/>
+      <dgm:whole/>
+    </dgm:dataModel>
+  </dgm:sampData>
+  <dgm:styleData>
+    <dgm:dataModel>
+      <dgm:ptLst>
+        <dgm:pt modelId="0" type="doc"/>
+        <dgm:pt modelId="1"/>
+        <dgm:pt modelId="11"/>
+        <dgm:pt modelId="2"/>
+        <dgm:pt modelId="21"/>
+      </dgm:ptLst>
+      <dgm:cxnLst>
+        <dgm:cxn modelId="4" srcId="0" destId="1" srcOrd="0" destOrd="0"/>
+        <dgm:cxn modelId="5" srcId="0" destId="2" srcOrd="1" destOrd="0"/>
+        <dgm:cxn modelId="13" srcId="1" destId="11" srcOrd="0" destOrd="0"/>
+        <dgm:cxn modelId="23" srcId="2" destId="21" srcOrd="0" destOrd="0"/>
+      </dgm:cxnLst>
+      <dgm:bg/>
+      <dgm:whole/>
+    </dgm:dataModel>
+  </dgm:styleData>
+  <dgm:clrData>
+    <dgm:dataModel>
+      <dgm:ptLst>
+        <dgm:pt modelId="0" type="doc"/>
+        <dgm:pt modelId="1"/>
+        <dgm:pt modelId="11"/>
+        <dgm:pt modelId="2"/>
+        <dgm:pt modelId="21"/>
+        <dgm:pt modelId="3"/>
+        <dgm:pt modelId="31"/>
+        <dgm:pt modelId="4"/>
+        <dgm:pt modelId="41"/>
+      </dgm:ptLst>
+      <dgm:cxnLst>
+        <dgm:cxn modelId="5" srcId="0" destId="1" srcOrd="0" destOrd="0"/>
+        <dgm:cxn modelId="6" srcId="0" destId="2" srcOrd="1" destOrd="0"/>
+        <dgm:cxn modelId="7" srcId="0" destId="3" srcOrd="2" destOrd="0"/>
+        <dgm:cxn modelId="8" srcId="0" destId="4" srcOrd="3" destOrd="0"/>
+        <dgm:cxn modelId="13" srcId="1" destId="11" srcOrd="0" destOrd="0"/>
+        <dgm:cxn modelId="23" srcId="2" destId="21" srcOrd="0" destOrd="0"/>
+        <dgm:cxn modelId="33" srcId="3" destId="31" srcOrd="0" destOrd="0"/>
+        <dgm:cxn modelId="43" srcId="4" destId="41" srcOrd="0" destOrd="0"/>
+      </dgm:cxnLst>
+      <dgm:bg/>
+      <dgm:whole/>
+    </dgm:dataModel>
+  </dgm:clrData>
+  <dgm:layoutNode name="Name0">
+    <dgm:varLst>
+      <dgm:animLvl val="lvl"/>
+      <dgm:resizeHandles val="exact"/>
+    </dgm:varLst>
+    <dgm:alg type="lin">
+      <dgm:param type="linDir" val="fromL"/>
+      <dgm:param type="nodeVertAlign" val="t"/>
+    </dgm:alg>
+    <dgm:shape xmlns:r="http://schemas.openxmlformats.org/officeDocument/2006/relationships" r:blip="">
+      <dgm:adjLst/>
+    </dgm:shape>
+    <dgm:presOf/>
+    <dgm:constrLst>
+      <dgm:constr type="h" for="ch" forName="compositeNode" refType="h"/>
+      <dgm:constr type="w" for="ch" forName="compositeNode" refType="w"/>
+      <dgm:constr type="w" for="des" forName="simulatedConn" refType="w" refFor="ch" refForName="compositeNode" fact="0.15"/>
+      <dgm:constr type="h" for="des" forName="simulatedConn" refType="w" refFor="des" refForName="simulatedConn"/>
+      <dgm:constr type="h" for="des" forName="vSp1" refType="w" refFor="ch" refForName="compositeNode" fact="0.8"/>
+      <dgm:constr type="h" for="des" forName="vSp2" refType="w" refFor="ch" refForName="compositeNode" fact="0.07"/>
+      <dgm:constr type="w" for="ch" forName="vProcSp" refType="w" refFor="des" refForName="simulatedConn" op="equ"/>
+      <dgm:constr type="h" for="ch" forName="vProcSp" refType="h" refFor="ch" refForName="compositeNode" op="equ"/>
+      <dgm:constr type="w" for="ch" forName="sibTrans" refType="w" refFor="ch" refForName="compositeNode" fact="0.1"/>
+      <dgm:constr type="primFontSz" for="des" forName="sibTransNodeCircle" op="equ"/>
+      <dgm:constr type="primFontSz" for="des" forName="nodeText" op="equ"/>
+      <dgm:constr type="h" for="des" forName="sibTransNodeCircle" op="equ"/>
+      <dgm:constr type="w" for="des" forName="sibTransNodeCircle" op="equ"/>
+    </dgm:constrLst>
+    <dgm:ruleLst>
+      <dgm:rule type="h" val="NaN" fact="1.2" max="NaN"/>
+    </dgm:ruleLst>
+    <dgm:forEach name="Name4" axis="ch" ptType="node">
+      <dgm:layoutNode name="compositeNode">
+        <dgm:varLst>
+          <dgm:bulletEnabled val="1"/>
+        </dgm:varLst>
+        <dgm:alg type="composite"/>
+        <dgm:constrLst>
+          <dgm:constr type="h" refType="w" op="lte" fact="1.4"/>
+          <dgm:constr type="w" for="ch" forName="bgRect" refType="w"/>
+          <dgm:constr type="h" for="ch" forName="bgRect" refType="h"/>
+          <dgm:constr type="t" for="ch" forName="bgRect"/>
+          <dgm:constr type="l" for="ch" forName="bgRect"/>
+          <dgm:constr type="h" for="ch" forName="sibTransNodeCircle" refType="h" refFor="ch" refForName="bgRect" fact="0.3"/>
+          <dgm:constr type="w" for="ch" forName="sibTransNodeCircle" refType="h" refFor="ch" refForName="sibTransNodeCircle"/>
+          <dgm:constr type="ctrX" for="ch" forName="sibTransNodeCircle" refType="w" fact="0.5"/>
+          <dgm:constr type="ctrY" for="ch" forName="sibTransNodeCircle" refType="h" fact="0.25"/>
+          <dgm:constr type="r" for="ch" forName="nodeText" refType="r" refFor="ch" refForName="bgRect"/>
+          <dgm:constr type="h" for="ch" forName="nodeText" refType="h" refFor="ch" refForName="bgRect" fact="0.6"/>
+          <dgm:constr type="t" for="ch" forName="nodeText" refType="h" refFor="ch" refForName="bgRect" fact="0.38"/>
+          <dgm:constr type="b" for="ch" forName="bottomLine" refType="b" refFor="ch" refForName="bgRect"/>
+          <dgm:constr type="w" for="ch" forName="bottomLine" refType="w" refFor="ch" refForName="bgRect"/>
+          <dgm:constr type="h" for="ch" forName="bottomLine" val="0.002"/>
+        </dgm:constrLst>
+        <dgm:ruleLst/>
+        <dgm:layoutNode name="bgRect" styleLbl="bgAccFollowNode1">
+          <dgm:alg type="sp"/>
+          <dgm:shape xmlns:r="http://schemas.openxmlformats.org/officeDocument/2006/relationships" type="rect" r:blip="">
+            <dgm:adjLst/>
+          </dgm:shape>
+          <dgm:presOf axis="self"/>
+          <dgm:constrLst/>
+          <dgm:ruleLst/>
+        </dgm:layoutNode>
+        <dgm:forEach name="Name19" axis="followSib" ptType="sibTrans" hideLastTrans="0" cnt="1">
+          <dgm:layoutNode name="sibTransNodeCircle" styleLbl="alignNode1">
+            <dgm:varLst>
+              <dgm:chMax val="0"/>
+              <dgm:bulletEnabled/>
+            </dgm:varLst>
+            <dgm:presOf axis="self" ptType="sibTrans"/>
+            <dgm:alg type="tx">
+              <dgm:param type="txAnchorVert" val="mid"/>
+              <dgm:param type="txAnchorHorzCh" val="ctr"/>
+            </dgm:alg>
+            <dgm:shape xmlns:r="http://schemas.openxmlformats.org/officeDocument/2006/relationships" type="ellipse" r:blip="">
+              <dgm:adjLst/>
+            </dgm:shape>
+            <dgm:constrLst>
+              <dgm:constr type="w" refType="h" op="lte"/>
+              <dgm:constr type="primFontSz" val="48"/>
+              <dgm:constr type="tMarg" val="1"/>
+              <dgm:constr type="lMarg" refType="w" fact="0.221"/>
+              <dgm:constr type="rMarg" refType="w" fact="0.221"/>
+              <dgm:constr type="bMarg" val="1"/>
+            </dgm:constrLst>
+            <dgm:ruleLst>
+              <dgm:rule type="primFontSz" val="14" fact="NaN" max="NaN"/>
+            </dgm:ruleLst>
+          </dgm:layoutNode>
+        </dgm:forEach>
+        <dgm:layoutNode name="bottomLine" styleLbl="alignNode1">
+          <dgm:varLst/>
+          <dgm:presOf/>
+          <dgm:alg type="sp"/>
+          <dgm:shape xmlns:r="http://schemas.openxmlformats.org/officeDocument/2006/relationships" type="rect" r:blip="">
+            <dgm:adjLst/>
+          </dgm:shape>
+          <dgm:constrLst/>
+          <dgm:ruleLst/>
+        </dgm:layoutNode>
+        <dgm:layoutNode name="nodeText" styleLbl="bgAccFollowNode1" moveWith="bgRect">
+          <dgm:varLst>
+            <dgm:bulletEnabled val="1"/>
+          </dgm:varLst>
+          <dgm:alg type="tx">
+            <dgm:param type="parTxLTRAlign" val="l"/>
+            <dgm:param type="parTxRTLAlign" val="r"/>
+            <dgm:param type="txAnchorVert" val="t"/>
+          </dgm:alg>
+          <dgm:shape xmlns:r="http://schemas.openxmlformats.org/officeDocument/2006/relationships" type="rect" r:blip="" zOrderOff="-1" hideGeom="1">
+            <dgm:adjLst/>
+          </dgm:shape>
+          <dgm:presOf axis="desOrSelf" ptType="node"/>
+          <dgm:constrLst>
+            <dgm:constr type="primFontSz" val="26"/>
+            <dgm:constr type="tMarg" val="26"/>
+            <dgm:constr type="lMarg" refType="w" fact="0.221"/>
+            <dgm:constr type="rMarg" refType="w" fact="0.221"/>
+            <dgm:constr type="bMarg" val="26"/>
+          </dgm:constrLst>
+          <dgm:ruleLst>
+            <dgm:rule type="primFontSz" val="11" fact="NaN" max="NaN"/>
+          </dgm:ruleLst>
+        </dgm:layoutNode>
+      </dgm:layoutNode>
+      <dgm:forEach name="Name14" axis="followSib" ptType="sibTrans" cnt="1">
+        <dgm:layoutNode name="sibTrans">
+          <dgm:alg type="sp"/>
+          <dgm:shape xmlns:r="http://schemas.openxmlformats.org/officeDocument/2006/relationships" r:blip="">
+            <dgm:adjLst/>
+          </dgm:shape>
+          <dgm:presOf/>
+          <dgm:constrLst/>
+          <dgm:ruleLst/>
+        </dgm:layoutNode>
+      </dgm:forEach>
+    </dgm:forEach>
+  </dgm:layoutNode>
+  <dgm:extLst>
+    <a:ext uri="{4F341089-5ED1-44EC-B178-C955D00A3D55}">
+      <dgm1611:autoBuNodeInfoLst xmlns:dgm1611="http://schemas.microsoft.com/office/drawing/2016/11/diagram">
+        <dgm1611:autoBuNodeInfo lvl="1" ptType="sibTrans">
+          <dgm1611:buPr prefix="" leadZeros="0">
+            <a:buAutoNum type="arabicParenBoth"/>
+          </dgm1611:buPr>
+        </dgm1611:autoBuNodeInfo>
+      </dgm1611:autoBuNodeInfoLst>
+    </a:ext>
+  </dgm:extLst>
+</dgm:layoutDef>
+</file>
+
 <file path=ppt/diagrams/quickStyle1.xml><?xml version="1.0" encoding="utf-8"?>
 <dgm:styleDef xmlns:dgm="http://schemas.openxmlformats.org/drawingml/2006/diagram" xmlns:a="http://schemas.openxmlformats.org/drawingml/2006/main" uniqueId="urn:microsoft.com/office/officeart/2005/8/quickstyle/simple5">
   <dgm:title val=""/>
@@ -9930,6 +12207,1040 @@
         <a:scrgbClr r="0" g="0" b="0"/>
       </a:fillRef>
       <a:effectRef idx="0">
+        <a:scrgbClr r="0" g="0" b="0"/>
+      </a:effectRef>
+      <a:fontRef idx="minor"/>
+    </dgm:style>
+  </dgm:styleLbl>
+  <dgm:styleLbl name="revTx">
+    <dgm:scene3d>
+      <a:camera prst="orthographicFront"/>
+      <a:lightRig rig="threePt" dir="t"/>
+    </dgm:scene3d>
+    <dgm:sp3d/>
+    <dgm:txPr/>
+    <dgm:style>
+      <a:lnRef idx="0">
+        <a:scrgbClr r="0" g="0" b="0"/>
+      </a:lnRef>
+      <a:fillRef idx="0">
+        <a:scrgbClr r="0" g="0" b="0"/>
+      </a:fillRef>
+      <a:effectRef idx="0">
+        <a:scrgbClr r="0" g="0" b="0"/>
+      </a:effectRef>
+      <a:fontRef idx="minor"/>
+    </dgm:style>
+  </dgm:styleLbl>
+</dgm:styleDef>
+</file>
+
+<file path=ppt/diagrams/quickStyle4.xml><?xml version="1.0" encoding="utf-8"?>
+<dgm:styleDef xmlns:dgm="http://schemas.openxmlformats.org/drawingml/2006/diagram" xmlns:a="http://schemas.openxmlformats.org/drawingml/2006/main" uniqueId="urn:microsoft.com/office/officeart/2005/8/quickstyle/simple2">
+  <dgm:title val=""/>
+  <dgm:desc val=""/>
+  <dgm:catLst>
+    <dgm:cat type="simple" pri="10200"/>
+  </dgm:catLst>
+  <dgm:scene3d>
+    <a:camera prst="orthographicFront"/>
+    <a:lightRig rig="threePt" dir="t"/>
+  </dgm:scene3d>
+  <dgm:styleLbl name="node0">
+    <dgm:scene3d>
+      <a:camera prst="orthographicFront"/>
+      <a:lightRig rig="threePt" dir="t"/>
+    </dgm:scene3d>
+    <dgm:sp3d/>
+    <dgm:txPr/>
+    <dgm:style>
+      <a:lnRef idx="3">
+        <a:scrgbClr r="0" g="0" b="0"/>
+      </a:lnRef>
+      <a:fillRef idx="1">
+        <a:scrgbClr r="0" g="0" b="0"/>
+      </a:fillRef>
+      <a:effectRef idx="1">
+        <a:scrgbClr r="0" g="0" b="0"/>
+      </a:effectRef>
+      <a:fontRef idx="minor">
+        <a:schemeClr val="lt1"/>
+      </a:fontRef>
+    </dgm:style>
+  </dgm:styleLbl>
+  <dgm:styleLbl name="lnNode1">
+    <dgm:scene3d>
+      <a:camera prst="orthographicFront"/>
+      <a:lightRig rig="threePt" dir="t"/>
+    </dgm:scene3d>
+    <dgm:sp3d/>
+    <dgm:txPr/>
+    <dgm:style>
+      <a:lnRef idx="3">
+        <a:scrgbClr r="0" g="0" b="0"/>
+      </a:lnRef>
+      <a:fillRef idx="1">
+        <a:scrgbClr r="0" g="0" b="0"/>
+      </a:fillRef>
+      <a:effectRef idx="1">
+        <a:scrgbClr r="0" g="0" b="0"/>
+      </a:effectRef>
+      <a:fontRef idx="minor">
+        <a:schemeClr val="lt1"/>
+      </a:fontRef>
+    </dgm:style>
+  </dgm:styleLbl>
+  <dgm:styleLbl name="vennNode1">
+    <dgm:scene3d>
+      <a:camera prst="orthographicFront"/>
+      <a:lightRig rig="threePt" dir="t"/>
+    </dgm:scene3d>
+    <dgm:sp3d/>
+    <dgm:txPr/>
+    <dgm:style>
+      <a:lnRef idx="3">
+        <a:scrgbClr r="0" g="0" b="0"/>
+      </a:lnRef>
+      <a:fillRef idx="1">
+        <a:scrgbClr r="0" g="0" b="0"/>
+      </a:fillRef>
+      <a:effectRef idx="0">
+        <a:scrgbClr r="0" g="0" b="0"/>
+      </a:effectRef>
+      <a:fontRef idx="minor">
+        <a:schemeClr val="tx1"/>
+      </a:fontRef>
+    </dgm:style>
+  </dgm:styleLbl>
+  <dgm:styleLbl name="alignNode1">
+    <dgm:scene3d>
+      <a:camera prst="orthographicFront"/>
+      <a:lightRig rig="threePt" dir="t"/>
+    </dgm:scene3d>
+    <dgm:sp3d/>
+    <dgm:txPr/>
+    <dgm:style>
+      <a:lnRef idx="2">
+        <a:scrgbClr r="0" g="0" b="0"/>
+      </a:lnRef>
+      <a:fillRef idx="1">
+        <a:scrgbClr r="0" g="0" b="0"/>
+      </a:fillRef>
+      <a:effectRef idx="1">
+        <a:scrgbClr r="0" g="0" b="0"/>
+      </a:effectRef>
+      <a:fontRef idx="minor">
+        <a:schemeClr val="lt1"/>
+      </a:fontRef>
+    </dgm:style>
+  </dgm:styleLbl>
+  <dgm:styleLbl name="node1">
+    <dgm:scene3d>
+      <a:camera prst="orthographicFront"/>
+      <a:lightRig rig="threePt" dir="t"/>
+    </dgm:scene3d>
+    <dgm:sp3d/>
+    <dgm:txPr/>
+    <dgm:style>
+      <a:lnRef idx="3">
+        <a:scrgbClr r="0" g="0" b="0"/>
+      </a:lnRef>
+      <a:fillRef idx="1">
+        <a:scrgbClr r="0" g="0" b="0"/>
+      </a:fillRef>
+      <a:effectRef idx="1">
+        <a:scrgbClr r="0" g="0" b="0"/>
+      </a:effectRef>
+      <a:fontRef idx="minor">
+        <a:schemeClr val="lt1"/>
+      </a:fontRef>
+    </dgm:style>
+  </dgm:styleLbl>
+  <dgm:styleLbl name="node2">
+    <dgm:scene3d>
+      <a:camera prst="orthographicFront"/>
+      <a:lightRig rig="threePt" dir="t"/>
+    </dgm:scene3d>
+    <dgm:sp3d/>
+    <dgm:txPr/>
+    <dgm:style>
+      <a:lnRef idx="3">
+        <a:scrgbClr r="0" g="0" b="0"/>
+      </a:lnRef>
+      <a:fillRef idx="1">
+        <a:scrgbClr r="0" g="0" b="0"/>
+      </a:fillRef>
+      <a:effectRef idx="1">
+        <a:scrgbClr r="0" g="0" b="0"/>
+      </a:effectRef>
+      <a:fontRef idx="minor">
+        <a:schemeClr val="lt1"/>
+      </a:fontRef>
+    </dgm:style>
+  </dgm:styleLbl>
+  <dgm:styleLbl name="node3">
+    <dgm:scene3d>
+      <a:camera prst="orthographicFront"/>
+      <a:lightRig rig="threePt" dir="t"/>
+    </dgm:scene3d>
+    <dgm:sp3d/>
+    <dgm:txPr/>
+    <dgm:style>
+      <a:lnRef idx="3">
+        <a:scrgbClr r="0" g="0" b="0"/>
+      </a:lnRef>
+      <a:fillRef idx="1">
+        <a:scrgbClr r="0" g="0" b="0"/>
+      </a:fillRef>
+      <a:effectRef idx="1">
+        <a:scrgbClr r="0" g="0" b="0"/>
+      </a:effectRef>
+      <a:fontRef idx="minor">
+        <a:schemeClr val="lt1"/>
+      </a:fontRef>
+    </dgm:style>
+  </dgm:styleLbl>
+  <dgm:styleLbl name="node4">
+    <dgm:scene3d>
+      <a:camera prst="orthographicFront"/>
+      <a:lightRig rig="threePt" dir="t"/>
+    </dgm:scene3d>
+    <dgm:sp3d/>
+    <dgm:txPr/>
+    <dgm:style>
+      <a:lnRef idx="3">
+        <a:scrgbClr r="0" g="0" b="0"/>
+      </a:lnRef>
+      <a:fillRef idx="1">
+        <a:scrgbClr r="0" g="0" b="0"/>
+      </a:fillRef>
+      <a:effectRef idx="1">
+        <a:scrgbClr r="0" g="0" b="0"/>
+      </a:effectRef>
+      <a:fontRef idx="minor">
+        <a:schemeClr val="lt1"/>
+      </a:fontRef>
+    </dgm:style>
+  </dgm:styleLbl>
+  <dgm:styleLbl name="fgImgPlace1">
+    <dgm:scene3d>
+      <a:camera prst="orthographicFront"/>
+      <a:lightRig rig="threePt" dir="t"/>
+    </dgm:scene3d>
+    <dgm:sp3d/>
+    <dgm:txPr/>
+    <dgm:style>
+      <a:lnRef idx="3">
+        <a:scrgbClr r="0" g="0" b="0"/>
+      </a:lnRef>
+      <a:fillRef idx="1">
+        <a:scrgbClr r="0" g="0" b="0"/>
+      </a:fillRef>
+      <a:effectRef idx="1">
+        <a:scrgbClr r="0" g="0" b="0"/>
+      </a:effectRef>
+      <a:fontRef idx="minor"/>
+    </dgm:style>
+  </dgm:styleLbl>
+  <dgm:styleLbl name="alignImgPlace1">
+    <dgm:scene3d>
+      <a:camera prst="orthographicFront"/>
+      <a:lightRig rig="threePt" dir="t"/>
+    </dgm:scene3d>
+    <dgm:sp3d/>
+    <dgm:txPr/>
+    <dgm:style>
+      <a:lnRef idx="3">
+        <a:scrgbClr r="0" g="0" b="0"/>
+      </a:lnRef>
+      <a:fillRef idx="1">
+        <a:scrgbClr r="0" g="0" b="0"/>
+      </a:fillRef>
+      <a:effectRef idx="1">
+        <a:scrgbClr r="0" g="0" b="0"/>
+      </a:effectRef>
+      <a:fontRef idx="minor"/>
+    </dgm:style>
+  </dgm:styleLbl>
+  <dgm:styleLbl name="bgImgPlace1">
+    <dgm:scene3d>
+      <a:camera prst="orthographicFront"/>
+      <a:lightRig rig="threePt" dir="t"/>
+    </dgm:scene3d>
+    <dgm:sp3d/>
+    <dgm:txPr/>
+    <dgm:style>
+      <a:lnRef idx="3">
+        <a:scrgbClr r="0" g="0" b="0"/>
+      </a:lnRef>
+      <a:fillRef idx="1">
+        <a:scrgbClr r="0" g="0" b="0"/>
+      </a:fillRef>
+      <a:effectRef idx="1">
+        <a:scrgbClr r="0" g="0" b="0"/>
+      </a:effectRef>
+      <a:fontRef idx="minor"/>
+    </dgm:style>
+  </dgm:styleLbl>
+  <dgm:styleLbl name="sibTrans2D1">
+    <dgm:scene3d>
+      <a:camera prst="orthographicFront"/>
+      <a:lightRig rig="threePt" dir="t"/>
+    </dgm:scene3d>
+    <dgm:sp3d/>
+    <dgm:txPr/>
+    <dgm:style>
+      <a:lnRef idx="0">
+        <a:scrgbClr r="0" g="0" b="0"/>
+      </a:lnRef>
+      <a:fillRef idx="1">
+        <a:scrgbClr r="0" g="0" b="0"/>
+      </a:fillRef>
+      <a:effectRef idx="1">
+        <a:scrgbClr r="0" g="0" b="0"/>
+      </a:effectRef>
+      <a:fontRef idx="minor">
+        <a:schemeClr val="lt1"/>
+      </a:fontRef>
+    </dgm:style>
+  </dgm:styleLbl>
+  <dgm:styleLbl name="fgSibTrans2D1">
+    <dgm:scene3d>
+      <a:camera prst="orthographicFront"/>
+      <a:lightRig rig="threePt" dir="t"/>
+    </dgm:scene3d>
+    <dgm:sp3d/>
+    <dgm:txPr/>
+    <dgm:style>
+      <a:lnRef idx="0">
+        <a:scrgbClr r="0" g="0" b="0"/>
+      </a:lnRef>
+      <a:fillRef idx="1">
+        <a:scrgbClr r="0" g="0" b="0"/>
+      </a:fillRef>
+      <a:effectRef idx="1">
+        <a:scrgbClr r="0" g="0" b="0"/>
+      </a:effectRef>
+      <a:fontRef idx="minor">
+        <a:schemeClr val="lt1"/>
+      </a:fontRef>
+    </dgm:style>
+  </dgm:styleLbl>
+  <dgm:styleLbl name="bgSibTrans2D1">
+    <dgm:scene3d>
+      <a:camera prst="orthographicFront"/>
+      <a:lightRig rig="threePt" dir="t"/>
+    </dgm:scene3d>
+    <dgm:sp3d/>
+    <dgm:txPr/>
+    <dgm:style>
+      <a:lnRef idx="0">
+        <a:scrgbClr r="0" g="0" b="0"/>
+      </a:lnRef>
+      <a:fillRef idx="1">
+        <a:scrgbClr r="0" g="0" b="0"/>
+      </a:fillRef>
+      <a:effectRef idx="1">
+        <a:scrgbClr r="0" g="0" b="0"/>
+      </a:effectRef>
+      <a:fontRef idx="minor">
+        <a:schemeClr val="lt1"/>
+      </a:fontRef>
+    </dgm:style>
+  </dgm:styleLbl>
+  <dgm:styleLbl name="sibTrans1D1">
+    <dgm:scene3d>
+      <a:camera prst="orthographicFront"/>
+      <a:lightRig rig="threePt" dir="t"/>
+    </dgm:scene3d>
+    <dgm:sp3d/>
+    <dgm:txPr/>
+    <dgm:style>
+      <a:lnRef idx="1">
+        <a:scrgbClr r="0" g="0" b="0"/>
+      </a:lnRef>
+      <a:fillRef idx="0">
+        <a:scrgbClr r="0" g="0" b="0"/>
+      </a:fillRef>
+      <a:effectRef idx="0">
+        <a:scrgbClr r="0" g="0" b="0"/>
+      </a:effectRef>
+      <a:fontRef idx="minor"/>
+    </dgm:style>
+  </dgm:styleLbl>
+  <dgm:styleLbl name="callout">
+    <dgm:scene3d>
+      <a:camera prst="orthographicFront"/>
+      <a:lightRig rig="threePt" dir="t"/>
+    </dgm:scene3d>
+    <dgm:sp3d/>
+    <dgm:txPr/>
+    <dgm:style>
+      <a:lnRef idx="2">
+        <a:scrgbClr r="0" g="0" b="0"/>
+      </a:lnRef>
+      <a:fillRef idx="1">
+        <a:scrgbClr r="0" g="0" b="0"/>
+      </a:fillRef>
+      <a:effectRef idx="1">
+        <a:scrgbClr r="0" g="0" b="0"/>
+      </a:effectRef>
+      <a:fontRef idx="minor"/>
+    </dgm:style>
+  </dgm:styleLbl>
+  <dgm:styleLbl name="asst0">
+    <dgm:scene3d>
+      <a:camera prst="orthographicFront"/>
+      <a:lightRig rig="threePt" dir="t"/>
+    </dgm:scene3d>
+    <dgm:sp3d/>
+    <dgm:txPr/>
+    <dgm:style>
+      <a:lnRef idx="3">
+        <a:scrgbClr r="0" g="0" b="0"/>
+      </a:lnRef>
+      <a:fillRef idx="1">
+        <a:scrgbClr r="0" g="0" b="0"/>
+      </a:fillRef>
+      <a:effectRef idx="1">
+        <a:scrgbClr r="0" g="0" b="0"/>
+      </a:effectRef>
+      <a:fontRef idx="minor">
+        <a:schemeClr val="lt1"/>
+      </a:fontRef>
+    </dgm:style>
+  </dgm:styleLbl>
+  <dgm:styleLbl name="asst1">
+    <dgm:scene3d>
+      <a:camera prst="orthographicFront"/>
+      <a:lightRig rig="threePt" dir="t"/>
+    </dgm:scene3d>
+    <dgm:sp3d/>
+    <dgm:txPr/>
+    <dgm:style>
+      <a:lnRef idx="3">
+        <a:scrgbClr r="0" g="0" b="0"/>
+      </a:lnRef>
+      <a:fillRef idx="1">
+        <a:scrgbClr r="0" g="0" b="0"/>
+      </a:fillRef>
+      <a:effectRef idx="1">
+        <a:scrgbClr r="0" g="0" b="0"/>
+      </a:effectRef>
+      <a:fontRef idx="minor">
+        <a:schemeClr val="lt1"/>
+      </a:fontRef>
+    </dgm:style>
+  </dgm:styleLbl>
+  <dgm:styleLbl name="asst2">
+    <dgm:scene3d>
+      <a:camera prst="orthographicFront"/>
+      <a:lightRig rig="threePt" dir="t"/>
+    </dgm:scene3d>
+    <dgm:sp3d/>
+    <dgm:txPr/>
+    <dgm:style>
+      <a:lnRef idx="3">
+        <a:scrgbClr r="0" g="0" b="0"/>
+      </a:lnRef>
+      <a:fillRef idx="1">
+        <a:scrgbClr r="0" g="0" b="0"/>
+      </a:fillRef>
+      <a:effectRef idx="1">
+        <a:scrgbClr r="0" g="0" b="0"/>
+      </a:effectRef>
+      <a:fontRef idx="minor">
+        <a:schemeClr val="lt1"/>
+      </a:fontRef>
+    </dgm:style>
+  </dgm:styleLbl>
+  <dgm:styleLbl name="asst3">
+    <dgm:scene3d>
+      <a:camera prst="orthographicFront"/>
+      <a:lightRig rig="threePt" dir="t"/>
+    </dgm:scene3d>
+    <dgm:sp3d/>
+    <dgm:txPr/>
+    <dgm:style>
+      <a:lnRef idx="3">
+        <a:scrgbClr r="0" g="0" b="0"/>
+      </a:lnRef>
+      <a:fillRef idx="1">
+        <a:scrgbClr r="0" g="0" b="0"/>
+      </a:fillRef>
+      <a:effectRef idx="1">
+        <a:scrgbClr r="0" g="0" b="0"/>
+      </a:effectRef>
+      <a:fontRef idx="minor">
+        <a:schemeClr val="lt1"/>
+      </a:fontRef>
+    </dgm:style>
+  </dgm:styleLbl>
+  <dgm:styleLbl name="asst4">
+    <dgm:scene3d>
+      <a:camera prst="orthographicFront"/>
+      <a:lightRig rig="threePt" dir="t"/>
+    </dgm:scene3d>
+    <dgm:sp3d/>
+    <dgm:txPr/>
+    <dgm:style>
+      <a:lnRef idx="3">
+        <a:scrgbClr r="0" g="0" b="0"/>
+      </a:lnRef>
+      <a:fillRef idx="1">
+        <a:scrgbClr r="0" g="0" b="0"/>
+      </a:fillRef>
+      <a:effectRef idx="1">
+        <a:scrgbClr r="0" g="0" b="0"/>
+      </a:effectRef>
+      <a:fontRef idx="minor">
+        <a:schemeClr val="lt1"/>
+      </a:fontRef>
+    </dgm:style>
+  </dgm:styleLbl>
+  <dgm:styleLbl name="parChTrans2D1">
+    <dgm:scene3d>
+      <a:camera prst="orthographicFront"/>
+      <a:lightRig rig="threePt" dir="t"/>
+    </dgm:scene3d>
+    <dgm:sp3d/>
+    <dgm:txPr/>
+    <dgm:style>
+      <a:lnRef idx="3">
+        <a:scrgbClr r="0" g="0" b="0"/>
+      </a:lnRef>
+      <a:fillRef idx="1">
+        <a:scrgbClr r="0" g="0" b="0"/>
+      </a:fillRef>
+      <a:effectRef idx="1">
+        <a:scrgbClr r="0" g="0" b="0"/>
+      </a:effectRef>
+      <a:fontRef idx="minor">
+        <a:schemeClr val="lt1"/>
+      </a:fontRef>
+    </dgm:style>
+  </dgm:styleLbl>
+  <dgm:styleLbl name="parChTrans2D2">
+    <dgm:scene3d>
+      <a:camera prst="orthographicFront"/>
+      <a:lightRig rig="threePt" dir="t"/>
+    </dgm:scene3d>
+    <dgm:sp3d/>
+    <dgm:txPr/>
+    <dgm:style>
+      <a:lnRef idx="3">
+        <a:scrgbClr r="0" g="0" b="0"/>
+      </a:lnRef>
+      <a:fillRef idx="1">
+        <a:scrgbClr r="0" g="0" b="0"/>
+      </a:fillRef>
+      <a:effectRef idx="1">
+        <a:scrgbClr r="0" g="0" b="0"/>
+      </a:effectRef>
+      <a:fontRef idx="minor">
+        <a:schemeClr val="lt1"/>
+      </a:fontRef>
+    </dgm:style>
+  </dgm:styleLbl>
+  <dgm:styleLbl name="parChTrans2D3">
+    <dgm:scene3d>
+      <a:camera prst="orthographicFront"/>
+      <a:lightRig rig="threePt" dir="t"/>
+    </dgm:scene3d>
+    <dgm:sp3d/>
+    <dgm:txPr/>
+    <dgm:style>
+      <a:lnRef idx="3">
+        <a:scrgbClr r="0" g="0" b="0"/>
+      </a:lnRef>
+      <a:fillRef idx="1">
+        <a:scrgbClr r="0" g="0" b="0"/>
+      </a:fillRef>
+      <a:effectRef idx="1">
+        <a:scrgbClr r="0" g="0" b="0"/>
+      </a:effectRef>
+      <a:fontRef idx="minor">
+        <a:schemeClr val="lt1"/>
+      </a:fontRef>
+    </dgm:style>
+  </dgm:styleLbl>
+  <dgm:styleLbl name="parChTrans2D4">
+    <dgm:scene3d>
+      <a:camera prst="orthographicFront"/>
+      <a:lightRig rig="threePt" dir="t"/>
+    </dgm:scene3d>
+    <dgm:sp3d/>
+    <dgm:txPr/>
+    <dgm:style>
+      <a:lnRef idx="3">
+        <a:scrgbClr r="0" g="0" b="0"/>
+      </a:lnRef>
+      <a:fillRef idx="1">
+        <a:scrgbClr r="0" g="0" b="0"/>
+      </a:fillRef>
+      <a:effectRef idx="1">
+        <a:scrgbClr r="0" g="0" b="0"/>
+      </a:effectRef>
+      <a:fontRef idx="minor">
+        <a:schemeClr val="lt1"/>
+      </a:fontRef>
+    </dgm:style>
+  </dgm:styleLbl>
+  <dgm:styleLbl name="parChTrans1D1">
+    <dgm:scene3d>
+      <a:camera prst="orthographicFront"/>
+      <a:lightRig rig="threePt" dir="t"/>
+    </dgm:scene3d>
+    <dgm:sp3d/>
+    <dgm:txPr/>
+    <dgm:style>
+      <a:lnRef idx="2">
+        <a:scrgbClr r="0" g="0" b="0"/>
+      </a:lnRef>
+      <a:fillRef idx="0">
+        <a:scrgbClr r="0" g="0" b="0"/>
+      </a:fillRef>
+      <a:effectRef idx="0">
+        <a:scrgbClr r="0" g="0" b="0"/>
+      </a:effectRef>
+      <a:fontRef idx="minor"/>
+    </dgm:style>
+  </dgm:styleLbl>
+  <dgm:styleLbl name="parChTrans1D2">
+    <dgm:scene3d>
+      <a:camera prst="orthographicFront"/>
+      <a:lightRig rig="threePt" dir="t"/>
+    </dgm:scene3d>
+    <dgm:sp3d/>
+    <dgm:txPr/>
+    <dgm:style>
+      <a:lnRef idx="2">
+        <a:scrgbClr r="0" g="0" b="0"/>
+      </a:lnRef>
+      <a:fillRef idx="0">
+        <a:scrgbClr r="0" g="0" b="0"/>
+      </a:fillRef>
+      <a:effectRef idx="0">
+        <a:scrgbClr r="0" g="0" b="0"/>
+      </a:effectRef>
+      <a:fontRef idx="minor"/>
+    </dgm:style>
+  </dgm:styleLbl>
+  <dgm:styleLbl name="parChTrans1D3">
+    <dgm:scene3d>
+      <a:camera prst="orthographicFront"/>
+      <a:lightRig rig="threePt" dir="t"/>
+    </dgm:scene3d>
+    <dgm:sp3d/>
+    <dgm:txPr/>
+    <dgm:style>
+      <a:lnRef idx="2">
+        <a:scrgbClr r="0" g="0" b="0"/>
+      </a:lnRef>
+      <a:fillRef idx="0">
+        <a:scrgbClr r="0" g="0" b="0"/>
+      </a:fillRef>
+      <a:effectRef idx="0">
+        <a:scrgbClr r="0" g="0" b="0"/>
+      </a:effectRef>
+      <a:fontRef idx="minor"/>
+    </dgm:style>
+  </dgm:styleLbl>
+  <dgm:styleLbl name="parChTrans1D4">
+    <dgm:scene3d>
+      <a:camera prst="orthographicFront"/>
+      <a:lightRig rig="threePt" dir="t"/>
+    </dgm:scene3d>
+    <dgm:sp3d/>
+    <dgm:txPr/>
+    <dgm:style>
+      <a:lnRef idx="2">
+        <a:scrgbClr r="0" g="0" b="0"/>
+      </a:lnRef>
+      <a:fillRef idx="0">
+        <a:scrgbClr r="0" g="0" b="0"/>
+      </a:fillRef>
+      <a:effectRef idx="0">
+        <a:scrgbClr r="0" g="0" b="0"/>
+      </a:effectRef>
+      <a:fontRef idx="minor"/>
+    </dgm:style>
+  </dgm:styleLbl>
+  <dgm:styleLbl name="fgAcc1">
+    <dgm:scene3d>
+      <a:camera prst="orthographicFront"/>
+      <a:lightRig rig="threePt" dir="t"/>
+    </dgm:scene3d>
+    <dgm:sp3d/>
+    <dgm:txPr/>
+    <dgm:style>
+      <a:lnRef idx="2">
+        <a:scrgbClr r="0" g="0" b="0"/>
+      </a:lnRef>
+      <a:fillRef idx="1">
+        <a:scrgbClr r="0" g="0" b="0"/>
+      </a:fillRef>
+      <a:effectRef idx="0">
+        <a:scrgbClr r="0" g="0" b="0"/>
+      </a:effectRef>
+      <a:fontRef idx="minor"/>
+    </dgm:style>
+  </dgm:styleLbl>
+  <dgm:styleLbl name="conFgAcc1">
+    <dgm:scene3d>
+      <a:camera prst="orthographicFront"/>
+      <a:lightRig rig="threePt" dir="t"/>
+    </dgm:scene3d>
+    <dgm:sp3d/>
+    <dgm:txPr/>
+    <dgm:style>
+      <a:lnRef idx="2">
+        <a:scrgbClr r="0" g="0" b="0"/>
+      </a:lnRef>
+      <a:fillRef idx="1">
+        <a:scrgbClr r="0" g="0" b="0"/>
+      </a:fillRef>
+      <a:effectRef idx="0">
+        <a:scrgbClr r="0" g="0" b="0"/>
+      </a:effectRef>
+      <a:fontRef idx="minor"/>
+    </dgm:style>
+  </dgm:styleLbl>
+  <dgm:styleLbl name="alignAcc1">
+    <dgm:scene3d>
+      <a:camera prst="orthographicFront"/>
+      <a:lightRig rig="threePt" dir="t"/>
+    </dgm:scene3d>
+    <dgm:sp3d/>
+    <dgm:txPr/>
+    <dgm:style>
+      <a:lnRef idx="2">
+        <a:scrgbClr r="0" g="0" b="0"/>
+      </a:lnRef>
+      <a:fillRef idx="1">
+        <a:scrgbClr r="0" g="0" b="0"/>
+      </a:fillRef>
+      <a:effectRef idx="0">
+        <a:scrgbClr r="0" g="0" b="0"/>
+      </a:effectRef>
+      <a:fontRef idx="minor"/>
+    </dgm:style>
+  </dgm:styleLbl>
+  <dgm:styleLbl name="trAlignAcc1">
+    <dgm:scene3d>
+      <a:camera prst="orthographicFront"/>
+      <a:lightRig rig="threePt" dir="t"/>
+    </dgm:scene3d>
+    <dgm:sp3d/>
+    <dgm:txPr/>
+    <dgm:style>
+      <a:lnRef idx="1">
+        <a:scrgbClr r="0" g="0" b="0"/>
+      </a:lnRef>
+      <a:fillRef idx="1">
+        <a:scrgbClr r="0" g="0" b="0"/>
+      </a:fillRef>
+      <a:effectRef idx="0">
+        <a:scrgbClr r="0" g="0" b="0"/>
+      </a:effectRef>
+      <a:fontRef idx="minor"/>
+    </dgm:style>
+  </dgm:styleLbl>
+  <dgm:styleLbl name="bgAcc1">
+    <dgm:scene3d>
+      <a:camera prst="orthographicFront"/>
+      <a:lightRig rig="threePt" dir="t"/>
+    </dgm:scene3d>
+    <dgm:sp3d/>
+    <dgm:txPr/>
+    <dgm:style>
+      <a:lnRef idx="2">
+        <a:scrgbClr r="0" g="0" b="0"/>
+      </a:lnRef>
+      <a:fillRef idx="1">
+        <a:scrgbClr r="0" g="0" b="0"/>
+      </a:fillRef>
+      <a:effectRef idx="0">
+        <a:scrgbClr r="0" g="0" b="0"/>
+      </a:effectRef>
+      <a:fontRef idx="minor"/>
+    </dgm:style>
+  </dgm:styleLbl>
+  <dgm:styleLbl name="solidFgAcc1">
+    <dgm:scene3d>
+      <a:camera prst="orthographicFront"/>
+      <a:lightRig rig="threePt" dir="t"/>
+    </dgm:scene3d>
+    <dgm:sp3d/>
+    <dgm:txPr/>
+    <dgm:style>
+      <a:lnRef idx="2">
+        <a:scrgbClr r="0" g="0" b="0"/>
+      </a:lnRef>
+      <a:fillRef idx="1">
+        <a:scrgbClr r="0" g="0" b="0"/>
+      </a:fillRef>
+      <a:effectRef idx="0">
+        <a:scrgbClr r="0" g="0" b="0"/>
+      </a:effectRef>
+      <a:fontRef idx="minor"/>
+    </dgm:style>
+  </dgm:styleLbl>
+  <dgm:styleLbl name="solidAlignAcc1">
+    <dgm:scene3d>
+      <a:camera prst="orthographicFront"/>
+      <a:lightRig rig="threePt" dir="t"/>
+    </dgm:scene3d>
+    <dgm:sp3d/>
+    <dgm:txPr/>
+    <dgm:style>
+      <a:lnRef idx="2">
+        <a:scrgbClr r="0" g="0" b="0"/>
+      </a:lnRef>
+      <a:fillRef idx="1">
+        <a:scrgbClr r="0" g="0" b="0"/>
+      </a:fillRef>
+      <a:effectRef idx="0">
+        <a:scrgbClr r="0" g="0" b="0"/>
+      </a:effectRef>
+      <a:fontRef idx="minor"/>
+    </dgm:style>
+  </dgm:styleLbl>
+  <dgm:styleLbl name="solidBgAcc1">
+    <dgm:scene3d>
+      <a:camera prst="orthographicFront"/>
+      <a:lightRig rig="threePt" dir="t"/>
+    </dgm:scene3d>
+    <dgm:sp3d/>
+    <dgm:txPr/>
+    <dgm:style>
+      <a:lnRef idx="2">
+        <a:scrgbClr r="0" g="0" b="0"/>
+      </a:lnRef>
+      <a:fillRef idx="1">
+        <a:scrgbClr r="0" g="0" b="0"/>
+      </a:fillRef>
+      <a:effectRef idx="0">
+        <a:scrgbClr r="0" g="0" b="0"/>
+      </a:effectRef>
+      <a:fontRef idx="minor"/>
+    </dgm:style>
+  </dgm:styleLbl>
+  <dgm:styleLbl name="fgAccFollowNode1">
+    <dgm:scene3d>
+      <a:camera prst="orthographicFront"/>
+      <a:lightRig rig="threePt" dir="t"/>
+    </dgm:scene3d>
+    <dgm:sp3d/>
+    <dgm:txPr/>
+    <dgm:style>
+      <a:lnRef idx="2">
+        <a:scrgbClr r="0" g="0" b="0"/>
+      </a:lnRef>
+      <a:fillRef idx="1">
+        <a:scrgbClr r="0" g="0" b="0"/>
+      </a:fillRef>
+      <a:effectRef idx="0">
+        <a:scrgbClr r="0" g="0" b="0"/>
+      </a:effectRef>
+      <a:fontRef idx="minor"/>
+    </dgm:style>
+  </dgm:styleLbl>
+  <dgm:styleLbl name="alignAccFollowNode1">
+    <dgm:scene3d>
+      <a:camera prst="orthographicFront"/>
+      <a:lightRig rig="threePt" dir="t"/>
+    </dgm:scene3d>
+    <dgm:sp3d/>
+    <dgm:txPr/>
+    <dgm:style>
+      <a:lnRef idx="2">
+        <a:scrgbClr r="0" g="0" b="0"/>
+      </a:lnRef>
+      <a:fillRef idx="1">
+        <a:scrgbClr r="0" g="0" b="0"/>
+      </a:fillRef>
+      <a:effectRef idx="0">
+        <a:scrgbClr r="0" g="0" b="0"/>
+      </a:effectRef>
+      <a:fontRef idx="minor"/>
+    </dgm:style>
+  </dgm:styleLbl>
+  <dgm:styleLbl name="bgAccFollowNode1">
+    <dgm:scene3d>
+      <a:camera prst="orthographicFront"/>
+      <a:lightRig rig="threePt" dir="t"/>
+    </dgm:scene3d>
+    <dgm:sp3d/>
+    <dgm:txPr/>
+    <dgm:style>
+      <a:lnRef idx="2">
+        <a:scrgbClr r="0" g="0" b="0"/>
+      </a:lnRef>
+      <a:fillRef idx="1">
+        <a:scrgbClr r="0" g="0" b="0"/>
+      </a:fillRef>
+      <a:effectRef idx="0">
+        <a:scrgbClr r="0" g="0" b="0"/>
+      </a:effectRef>
+      <a:fontRef idx="minor"/>
+    </dgm:style>
+  </dgm:styleLbl>
+  <dgm:styleLbl name="fgAcc0">
+    <dgm:scene3d>
+      <a:camera prst="orthographicFront"/>
+      <a:lightRig rig="threePt" dir="t"/>
+    </dgm:scene3d>
+    <dgm:sp3d/>
+    <dgm:txPr/>
+    <dgm:style>
+      <a:lnRef idx="2">
+        <a:scrgbClr r="0" g="0" b="0"/>
+      </a:lnRef>
+      <a:fillRef idx="1">
+        <a:scrgbClr r="0" g="0" b="0"/>
+      </a:fillRef>
+      <a:effectRef idx="0">
+        <a:scrgbClr r="0" g="0" b="0"/>
+      </a:effectRef>
+      <a:fontRef idx="minor"/>
+    </dgm:style>
+  </dgm:styleLbl>
+  <dgm:styleLbl name="fgAcc2">
+    <dgm:scene3d>
+      <a:camera prst="orthographicFront"/>
+      <a:lightRig rig="threePt" dir="t"/>
+    </dgm:scene3d>
+    <dgm:sp3d/>
+    <dgm:txPr/>
+    <dgm:style>
+      <a:lnRef idx="2">
+        <a:scrgbClr r="0" g="0" b="0"/>
+      </a:lnRef>
+      <a:fillRef idx="1">
+        <a:scrgbClr r="0" g="0" b="0"/>
+      </a:fillRef>
+      <a:effectRef idx="0">
+        <a:scrgbClr r="0" g="0" b="0"/>
+      </a:effectRef>
+      <a:fontRef idx="minor"/>
+    </dgm:style>
+  </dgm:styleLbl>
+  <dgm:styleLbl name="fgAcc3">
+    <dgm:scene3d>
+      <a:camera prst="orthographicFront"/>
+      <a:lightRig rig="threePt" dir="t"/>
+    </dgm:scene3d>
+    <dgm:sp3d/>
+    <dgm:txPr/>
+    <dgm:style>
+      <a:lnRef idx="2">
+        <a:scrgbClr r="0" g="0" b="0"/>
+      </a:lnRef>
+      <a:fillRef idx="1">
+        <a:scrgbClr r="0" g="0" b="0"/>
+      </a:fillRef>
+      <a:effectRef idx="0">
+        <a:scrgbClr r="0" g="0" b="0"/>
+      </a:effectRef>
+      <a:fontRef idx="minor"/>
+    </dgm:style>
+  </dgm:styleLbl>
+  <dgm:styleLbl name="fgAcc4">
+    <dgm:scene3d>
+      <a:camera prst="orthographicFront"/>
+      <a:lightRig rig="threePt" dir="t"/>
+    </dgm:scene3d>
+    <dgm:sp3d/>
+    <dgm:txPr/>
+    <dgm:style>
+      <a:lnRef idx="2">
+        <a:scrgbClr r="0" g="0" b="0"/>
+      </a:lnRef>
+      <a:fillRef idx="1">
+        <a:scrgbClr r="0" g="0" b="0"/>
+      </a:fillRef>
+      <a:effectRef idx="0">
+        <a:scrgbClr r="0" g="0" b="0"/>
+      </a:effectRef>
+      <a:fontRef idx="minor"/>
+    </dgm:style>
+  </dgm:styleLbl>
+  <dgm:styleLbl name="bgShp">
+    <dgm:scene3d>
+      <a:camera prst="orthographicFront"/>
+      <a:lightRig rig="threePt" dir="t"/>
+    </dgm:scene3d>
+    <dgm:sp3d/>
+    <dgm:txPr/>
+    <dgm:style>
+      <a:lnRef idx="0">
+        <a:scrgbClr r="0" g="0" b="0"/>
+      </a:lnRef>
+      <a:fillRef idx="1">
+        <a:scrgbClr r="0" g="0" b="0"/>
+      </a:fillRef>
+      <a:effectRef idx="0">
+        <a:scrgbClr r="0" g="0" b="0"/>
+      </a:effectRef>
+      <a:fontRef idx="minor"/>
+    </dgm:style>
+  </dgm:styleLbl>
+  <dgm:styleLbl name="dkBgShp">
+    <dgm:scene3d>
+      <a:camera prst="orthographicFront"/>
+      <a:lightRig rig="threePt" dir="t"/>
+    </dgm:scene3d>
+    <dgm:sp3d/>
+    <dgm:txPr/>
+    <dgm:style>
+      <a:lnRef idx="0">
+        <a:scrgbClr r="0" g="0" b="0"/>
+      </a:lnRef>
+      <a:fillRef idx="1">
+        <a:scrgbClr r="0" g="0" b="0"/>
+      </a:fillRef>
+      <a:effectRef idx="0">
+        <a:scrgbClr r="0" g="0" b="0"/>
+      </a:effectRef>
+      <a:fontRef idx="minor"/>
+    </dgm:style>
+  </dgm:styleLbl>
+  <dgm:styleLbl name="trBgShp">
+    <dgm:scene3d>
+      <a:camera prst="orthographicFront"/>
+      <a:lightRig rig="threePt" dir="t"/>
+    </dgm:scene3d>
+    <dgm:sp3d/>
+    <dgm:txPr/>
+    <dgm:style>
+      <a:lnRef idx="0">
+        <a:scrgbClr r="0" g="0" b="0"/>
+      </a:lnRef>
+      <a:fillRef idx="1">
+        <a:scrgbClr r="0" g="0" b="0"/>
+      </a:fillRef>
+      <a:effectRef idx="0">
+        <a:scrgbClr r="0" g="0" b="0"/>
+      </a:effectRef>
+      <a:fontRef idx="minor"/>
+    </dgm:style>
+  </dgm:styleLbl>
+  <dgm:styleLbl name="fgShp">
+    <dgm:scene3d>
+      <a:camera prst="orthographicFront"/>
+      <a:lightRig rig="threePt" dir="t"/>
+    </dgm:scene3d>
+    <dgm:sp3d/>
+    <dgm:txPr/>
+    <dgm:style>
+      <a:lnRef idx="3">
+        <a:scrgbClr r="0" g="0" b="0"/>
+      </a:lnRef>
+      <a:fillRef idx="1">
+        <a:scrgbClr r="0" g="0" b="0"/>
+      </a:fillRef>
+      <a:effectRef idx="1">
         <a:scrgbClr r="0" g="0" b="0"/>
       </a:effectRef>
       <a:fontRef idx="minor"/>
@@ -10681,7 +13992,7 @@
             <a:fld id="{B61BEF0D-F0BB-DE4B-95CE-6DB70DBA9567}" type="datetimeFigureOut">
               <a:rPr lang="en-US" smtClean="0"/>
               <a:pPr/>
-              <a:t>1/2/2018</a:t>
+              <a:t>1/3/2018</a:t>
             </a:fld>
             <a:endParaRPr lang="en-US" dirty="0"/>
           </a:p>
@@ -10934,7 +14245,7 @@
             <a:fld id="{B61BEF0D-F0BB-DE4B-95CE-6DB70DBA9567}" type="datetimeFigureOut">
               <a:rPr lang="en-US" smtClean="0"/>
               <a:pPr/>
-              <a:t>1/2/2018</a:t>
+              <a:t>1/3/2018</a:t>
             </a:fld>
             <a:endParaRPr lang="en-US" dirty="0"/>
           </a:p>
@@ -11250,7 +14561,7 @@
             <a:fld id="{B61BEF0D-F0BB-DE4B-95CE-6DB70DBA9567}" type="datetimeFigureOut">
               <a:rPr lang="en-US" smtClean="0"/>
               <a:pPr/>
-              <a:t>1/2/2018</a:t>
+              <a:t>1/3/2018</a:t>
             </a:fld>
             <a:endParaRPr lang="en-US" dirty="0"/>
           </a:p>
@@ -11593,7 +14904,7 @@
             <a:fld id="{B61BEF0D-F0BB-DE4B-95CE-6DB70DBA9567}" type="datetimeFigureOut">
               <a:rPr lang="en-US" smtClean="0"/>
               <a:pPr/>
-              <a:t>1/2/2018</a:t>
+              <a:t>1/3/2018</a:t>
             </a:fld>
             <a:endParaRPr lang="en-US" dirty="0"/>
           </a:p>
@@ -11909,7 +15220,7 @@
             <a:fld id="{B61BEF0D-F0BB-DE4B-95CE-6DB70DBA9567}" type="datetimeFigureOut">
               <a:rPr lang="en-US" smtClean="0"/>
               <a:pPr/>
-              <a:t>1/2/2018</a:t>
+              <a:t>1/3/2018</a:t>
             </a:fld>
             <a:endParaRPr lang="en-US" dirty="0"/>
           </a:p>
@@ -12304,7 +15615,7 @@
             <a:fld id="{B61BEF0D-F0BB-DE4B-95CE-6DB70DBA9567}" type="datetimeFigureOut">
               <a:rPr lang="en-US" smtClean="0"/>
               <a:pPr/>
-              <a:t>1/2/2018</a:t>
+              <a:t>1/3/2018</a:t>
             </a:fld>
             <a:endParaRPr lang="en-US" dirty="0"/>
           </a:p>
@@ -12475,7 +15786,7 @@
           <a:p>
             <a:fld id="{55C6B4A9-1611-4792-9094-5F34BCA07E0B}" type="datetimeFigureOut">
               <a:rPr lang="en-US" smtClean="0"/>
-              <a:t>1/2/2018</a:t>
+              <a:t>1/3/2018</a:t>
             </a:fld>
             <a:endParaRPr lang="en-US" dirty="0"/>
           </a:p>
@@ -12656,7 +15967,7 @@
             <a:fld id="{B61BEF0D-F0BB-DE4B-95CE-6DB70DBA9567}" type="datetimeFigureOut">
               <a:rPr lang="en-US" smtClean="0"/>
               <a:pPr/>
-              <a:t>1/2/2018</a:t>
+              <a:t>1/3/2018</a:t>
             </a:fld>
             <a:endParaRPr lang="en-US" dirty="0"/>
           </a:p>
@@ -12834,7 +16145,7 @@
             <a:fld id="{B61BEF0D-F0BB-DE4B-95CE-6DB70DBA9567}" type="datetimeFigureOut">
               <a:rPr lang="en-US" smtClean="0"/>
               <a:pPr/>
-              <a:t>1/2/2018</a:t>
+              <a:t>1/3/2018</a:t>
             </a:fld>
             <a:endParaRPr lang="en-US" dirty="0"/>
           </a:p>
@@ -13083,7 +16394,7 @@
             <a:fld id="{B61BEF0D-F0BB-DE4B-95CE-6DB70DBA9567}" type="datetimeFigureOut">
               <a:rPr lang="en-US" smtClean="0"/>
               <a:pPr/>
-              <a:t>1/2/2018</a:t>
+              <a:t>1/3/2018</a:t>
             </a:fld>
             <a:endParaRPr lang="en-US" dirty="0"/>
           </a:p>
@@ -13316,7 +16627,7 @@
           <a:p>
             <a:fld id="{EB712588-04B1-427B-82EE-E8DB90309F08}" type="datetimeFigureOut">
               <a:rPr lang="en-US" smtClean="0"/>
-              <a:t>1/2/2018</a:t>
+              <a:t>1/3/2018</a:t>
             </a:fld>
             <a:endParaRPr lang="en-US" dirty="0"/>
           </a:p>
@@ -13691,7 +17002,7 @@
             <a:fld id="{B61BEF0D-F0BB-DE4B-95CE-6DB70DBA9567}" type="datetimeFigureOut">
               <a:rPr lang="en-US" smtClean="0"/>
               <a:pPr/>
-              <a:t>1/2/2018</a:t>
+              <a:t>1/3/2018</a:t>
             </a:fld>
             <a:endParaRPr lang="en-US" dirty="0"/>
           </a:p>
@@ -13816,7 +17127,7 @@
             <a:fld id="{B61BEF0D-F0BB-DE4B-95CE-6DB70DBA9567}" type="datetimeFigureOut">
               <a:rPr lang="en-US" smtClean="0"/>
               <a:pPr/>
-              <a:t>1/2/2018</a:t>
+              <a:t>1/3/2018</a:t>
             </a:fld>
             <a:endParaRPr lang="en-US" dirty="0"/>
           </a:p>
@@ -13913,7 +17224,7 @@
             <a:fld id="{B61BEF0D-F0BB-DE4B-95CE-6DB70DBA9567}" type="datetimeFigureOut">
               <a:rPr lang="en-US" smtClean="0"/>
               <a:pPr/>
-              <a:t>1/2/2018</a:t>
+              <a:t>1/3/2018</a:t>
             </a:fld>
             <a:endParaRPr lang="en-US" dirty="0"/>
           </a:p>
@@ -14169,7 +17480,7 @@
           <a:p>
             <a:fld id="{42A54C80-263E-416B-A8E0-580EDEADCBDC}" type="datetimeFigureOut">
               <a:rPr lang="en-US" smtClean="0"/>
-              <a:t>1/2/2018</a:t>
+              <a:t>1/3/2018</a:t>
             </a:fld>
             <a:endParaRPr lang="en-US" dirty="0"/>
           </a:p>
@@ -14433,7 +17744,7 @@
             <a:fld id="{B61BEF0D-F0BB-DE4B-95CE-6DB70DBA9567}" type="datetimeFigureOut">
               <a:rPr lang="en-US" smtClean="0"/>
               <a:pPr/>
-              <a:t>1/2/2018</a:t>
+              <a:t>1/3/2018</a:t>
             </a:fld>
             <a:endParaRPr lang="en-US" dirty="0"/>
           </a:p>
@@ -15178,7 +18489,7 @@
             <a:fld id="{B61BEF0D-F0BB-DE4B-95CE-6DB70DBA9567}" type="datetimeFigureOut">
               <a:rPr lang="en-US" smtClean="0"/>
               <a:pPr/>
-              <a:t>1/2/2018</a:t>
+              <a:t>1/3/2018</a:t>
             </a:fld>
             <a:endParaRPr lang="en-US" dirty="0"/>
           </a:p>
@@ -17016,6 +20327,272 @@
     <p:extLst>
       <p:ext uri="{BB962C8B-B14F-4D97-AF65-F5344CB8AC3E}">
         <p14:creationId xmlns:p14="http://schemas.microsoft.com/office/powerpoint/2010/main" val="2756426817"/>
+      </p:ext>
+    </p:extLst>
+  </p:cSld>
+  <p:clrMapOvr>
+    <a:masterClrMapping/>
+  </p:clrMapOvr>
+</p:sld>
+</file>
+
+<file path=ppt/slides/slide13.xml><?xml version="1.0" encoding="utf-8"?>
+<p:sld xmlns:a="http://schemas.openxmlformats.org/drawingml/2006/main" xmlns:r="http://schemas.openxmlformats.org/officeDocument/2006/relationships" xmlns:p="http://schemas.openxmlformats.org/presentationml/2006/main">
+  <p:cSld>
+    <p:bg>
+      <p:bgPr>
+        <a:solidFill>
+          <a:schemeClr val="bg1"/>
+        </a:solidFill>
+        <a:effectLst/>
+      </p:bgPr>
+    </p:bg>
+    <p:spTree>
+      <p:nvGrpSpPr>
+        <p:cNvPr id="1" name=""/>
+        <p:cNvGrpSpPr/>
+        <p:nvPr/>
+      </p:nvGrpSpPr>
+      <p:grpSpPr>
+        <a:xfrm>
+          <a:off x="0" y="0"/>
+          <a:ext cx="0" cy="0"/>
+          <a:chOff x="0" y="0"/>
+          <a:chExt cx="0" cy="0"/>
+        </a:xfrm>
+      </p:grpSpPr>
+      <p:sp useBgFill="1">
+        <p:nvSpPr>
+          <p:cNvPr id="25" name="Rectangle 9">
+            <a:extLst>
+              <a:ext uri="{FF2B5EF4-FFF2-40B4-BE49-F238E27FC236}">
+                <a16:creationId xmlns:a16="http://schemas.microsoft.com/office/drawing/2014/main" id="{9F4444CE-BC8D-4D61-B303-4C05614E62AB}"/>
+              </a:ext>
+            </a:extLst>
+          </p:cNvPr>
+          <p:cNvSpPr>
+            <a:spLocks noGrp="1" noRot="1" noChangeAspect="1" noMove="1" noResize="1" noEditPoints="1" noAdjustHandles="1" noChangeArrowheads="1" noChangeShapeType="1" noTextEdit="1"/>
+          </p:cNvSpPr>
+          <p:nvPr>
+            <p:extLst>
+              <p:ext uri="{386F3935-93C4-4BCD-93E2-E3B085C9AB24}">
+                <p16:designElem xmlns:p16="http://schemas.microsoft.com/office/powerpoint/2015/main" val="1"/>
+              </p:ext>
+            </p:extLst>
+          </p:nvPr>
+        </p:nvSpPr>
+        <p:spPr>
+          <a:xfrm>
+            <a:off x="0" y="0"/>
+            <a:ext cx="12192000" cy="6858000"/>
+          </a:xfrm>
+          <a:prstGeom prst="rect">
+            <a:avLst/>
+          </a:prstGeom>
+          <a:ln>
+            <a:noFill/>
+          </a:ln>
+        </p:spPr>
+        <p:style>
+          <a:lnRef idx="2">
+            <a:schemeClr val="accent1">
+              <a:shade val="50000"/>
+            </a:schemeClr>
+          </a:lnRef>
+          <a:fillRef idx="1">
+            <a:schemeClr val="accent1"/>
+          </a:fillRef>
+          <a:effectRef idx="0">
+            <a:schemeClr val="accent1"/>
+          </a:effectRef>
+          <a:fontRef idx="minor">
+            <a:schemeClr val="lt1"/>
+          </a:fontRef>
+        </p:style>
+        <p:txBody>
+          <a:bodyPr rtlCol="0" anchor="ctr"/>
+          <a:lstStyle/>
+          <a:p>
+            <a:pPr algn="ctr"/>
+            <a:endParaRPr lang="en-US"/>
+          </a:p>
+        </p:txBody>
+      </p:sp>
+      <p:sp>
+        <p:nvSpPr>
+          <p:cNvPr id="26" name="Isosceles Triangle 11">
+            <a:extLst>
+              <a:ext uri="{FF2B5EF4-FFF2-40B4-BE49-F238E27FC236}">
+                <a16:creationId xmlns:a16="http://schemas.microsoft.com/office/drawing/2014/main" id="{73772B81-181F-48B7-8826-4D9686D15DF5}"/>
+              </a:ext>
+            </a:extLst>
+          </p:cNvPr>
+          <p:cNvSpPr>
+            <a:spLocks noGrp="1" noRot="1" noChangeAspect="1" noMove="1" noResize="1" noEditPoints="1" noAdjustHandles="1" noChangeArrowheads="1" noChangeShapeType="1" noTextEdit="1"/>
+          </p:cNvSpPr>
+          <p:nvPr>
+            <p:extLst>
+              <p:ext uri="{386F3935-93C4-4BCD-93E2-E3B085C9AB24}">
+                <p16:designElem xmlns:p16="http://schemas.microsoft.com/office/powerpoint/2015/main" val="1"/>
+              </p:ext>
+            </p:extLst>
+          </p:nvPr>
+        </p:nvSpPr>
+        <p:spPr>
+          <a:xfrm rot="10800000">
+            <a:off x="0" y="0"/>
+            <a:ext cx="842596" cy="5666154"/>
+          </a:xfrm>
+          <a:prstGeom prst="triangle">
+            <a:avLst>
+              <a:gd name="adj" fmla="val 100000"/>
+            </a:avLst>
+          </a:prstGeom>
+          <a:solidFill>
+            <a:schemeClr val="accent1">
+              <a:alpha val="85000"/>
+            </a:schemeClr>
+          </a:solidFill>
+          <a:ln>
+            <a:noFill/>
+          </a:ln>
+          <a:effectLst/>
+        </p:spPr>
+        <p:style>
+          <a:lnRef idx="1">
+            <a:schemeClr val="accent1"/>
+          </a:lnRef>
+          <a:fillRef idx="3">
+            <a:schemeClr val="accent1"/>
+          </a:fillRef>
+          <a:effectRef idx="2">
+            <a:schemeClr val="accent1"/>
+          </a:effectRef>
+          <a:fontRef idx="minor">
+            <a:schemeClr val="lt1"/>
+          </a:fontRef>
+        </p:style>
+      </p:sp>
+      <p:sp>
+        <p:nvSpPr>
+          <p:cNvPr id="14" name="Isosceles Triangle 13">
+            <a:extLst>
+              <a:ext uri="{FF2B5EF4-FFF2-40B4-BE49-F238E27FC236}">
+                <a16:creationId xmlns:a16="http://schemas.microsoft.com/office/drawing/2014/main" id="{B2205F6E-03C6-4E92-877C-E2482F6599AA}"/>
+              </a:ext>
+            </a:extLst>
+          </p:cNvPr>
+          <p:cNvSpPr>
+            <a:spLocks noGrp="1" noRot="1" noChangeAspect="1" noMove="1" noResize="1" noEditPoints="1" noAdjustHandles="1" noChangeArrowheads="1" noChangeShapeType="1" noTextEdit="1"/>
+          </p:cNvSpPr>
+          <p:nvPr>
+            <p:extLst>
+              <p:ext uri="{386F3935-93C4-4BCD-93E2-E3B085C9AB24}">
+                <p16:designElem xmlns:p16="http://schemas.microsoft.com/office/powerpoint/2015/main" val="1"/>
+              </p:ext>
+            </p:extLst>
+          </p:nvPr>
+        </p:nvSpPr>
+        <p:spPr>
+          <a:xfrm flipH="1">
+            <a:off x="11743267" y="4013200"/>
+            <a:ext cx="448733" cy="2844800"/>
+          </a:xfrm>
+          <a:prstGeom prst="triangle">
+            <a:avLst>
+              <a:gd name="adj" fmla="val 0"/>
+            </a:avLst>
+          </a:prstGeom>
+          <a:solidFill>
+            <a:schemeClr val="accent1">
+              <a:alpha val="85000"/>
+            </a:schemeClr>
+          </a:solidFill>
+          <a:ln>
+            <a:noFill/>
+          </a:ln>
+          <a:effectLst/>
+        </p:spPr>
+        <p:style>
+          <a:lnRef idx="1">
+            <a:schemeClr val="accent1"/>
+          </a:lnRef>
+          <a:fillRef idx="3">
+            <a:schemeClr val="accent1"/>
+          </a:fillRef>
+          <a:effectRef idx="2">
+            <a:schemeClr val="accent1"/>
+          </a:effectRef>
+          <a:fontRef idx="minor">
+            <a:schemeClr val="lt1"/>
+          </a:fontRef>
+        </p:style>
+      </p:sp>
+      <p:sp>
+        <p:nvSpPr>
+          <p:cNvPr id="2" name="Title 1">
+            <a:extLst>
+              <a:ext uri="{FF2B5EF4-FFF2-40B4-BE49-F238E27FC236}">
+                <a16:creationId xmlns:a16="http://schemas.microsoft.com/office/drawing/2014/main" id="{32A0DBD2-2E85-41A0-B69E-179723D54BF6}"/>
+              </a:ext>
+            </a:extLst>
+          </p:cNvPr>
+          <p:cNvSpPr>
+            <a:spLocks noGrp="1"/>
+          </p:cNvSpPr>
+          <p:nvPr>
+            <p:ph type="title"/>
+          </p:nvPr>
+        </p:nvSpPr>
+        <p:spPr>
+          <a:xfrm>
+            <a:off x="1286933" y="609600"/>
+            <a:ext cx="10197494" cy="1099457"/>
+          </a:xfrm>
+        </p:spPr>
+        <p:txBody>
+          <a:bodyPr>
+            <a:normAutofit/>
+          </a:bodyPr>
+          <a:lstStyle/>
+          <a:p>
+            <a:r>
+              <a:rPr lang="en-US"/>
+              <a:t>Tips for working with CSS and HTML</a:t>
+            </a:r>
+            <a:endParaRPr lang="en-US" dirty="0"/>
+          </a:p>
+        </p:txBody>
+      </p:sp>
+      <p:graphicFrame>
+        <p:nvGraphicFramePr>
+          <p:cNvPr id="27" name="Content Placeholder 2"/>
+          <p:cNvGraphicFramePr>
+            <a:graphicFrameLocks noGrp="1"/>
+          </p:cNvGraphicFramePr>
+          <p:nvPr>
+            <p:ph idx="1"/>
+            <p:extLst>
+              <p:ext uri="{D42A27DB-BD31-4B8C-83A1-F6EECF244321}">
+                <p14:modId xmlns:p14="http://schemas.microsoft.com/office/powerpoint/2010/main" val="756160829"/>
+              </p:ext>
+            </p:extLst>
+          </p:nvPr>
+        </p:nvGraphicFramePr>
+        <p:xfrm>
+          <a:off x="1286933" y="1948543"/>
+          <a:ext cx="9618133" cy="4093482"/>
+        </p:xfrm>
+        <a:graphic>
+          <a:graphicData uri="http://schemas.openxmlformats.org/drawingml/2006/diagram">
+            <dgm:relIds xmlns:dgm="http://schemas.openxmlformats.org/drawingml/2006/diagram" xmlns:r="http://schemas.openxmlformats.org/officeDocument/2006/relationships" r:dm="rId2" r:lo="rId3" r:qs="rId4" r:cs="rId5"/>
+          </a:graphicData>
+        </a:graphic>
+      </p:graphicFrame>
+    </p:spTree>
+    <p:extLst>
+      <p:ext uri="{BB962C8B-B14F-4D97-AF65-F5344CB8AC3E}">
+        <p14:creationId xmlns:p14="http://schemas.microsoft.com/office/powerpoint/2010/main" val="3500082507"/>
       </p:ext>
     </p:extLst>
   </p:cSld>

</xml_diff>

<commit_message>
feat:Padding and Margins in CSS
</commit_message>
<xml_diff>
--- a/Introduction-to-CSS.pptx
+++ b/Introduction-to-CSS.pptx
@@ -33,6 +33,7 @@
     <p:sldId id="281" r:id="rId27"/>
     <p:sldId id="282" r:id="rId28"/>
     <p:sldId id="283" r:id="rId29"/>
+    <p:sldId id="284" r:id="rId30"/>
   </p:sldIdLst>
   <p:sldSz cx="12192000" cy="6858000"/>
   <p:notesSz cx="6858000" cy="9144000"/>
@@ -144,7 +145,7 @@
   <pc:docChgLst>
     <pc:chgData name="anum sharma" userId="f66cf99955dbac7d" providerId="LiveId" clId="{6E04F4B5-AC0F-493B-B1A2-008A2E900AEB}"/>
     <pc:docChg chg="undo custSel addSld delSld modSld sldOrd">
-      <pc:chgData name="anum sharma" userId="f66cf99955dbac7d" providerId="LiveId" clId="{6E04F4B5-AC0F-493B-B1A2-008A2E900AEB}" dt="2018-01-07T03:15:19.611" v="7703"/>
+      <pc:chgData name="anum sharma" userId="f66cf99955dbac7d" providerId="LiveId" clId="{6E04F4B5-AC0F-493B-B1A2-008A2E900AEB}" dt="2018-01-07T03:39:51.403" v="8699" actId="1076"/>
       <pc:docMkLst>
         <pc:docMk/>
       </pc:docMkLst>
@@ -2077,12 +2078,51 @@
           </ac:picMkLst>
         </pc:picChg>
       </pc:sldChg>
-      <pc:sldChg chg="add">
-        <pc:chgData name="anum sharma" userId="f66cf99955dbac7d" providerId="LiveId" clId="{6E04F4B5-AC0F-493B-B1A2-008A2E900AEB}" dt="2018-01-07T03:15:19.611" v="7703"/>
+      <pc:sldChg chg="modSp add">
+        <pc:chgData name="anum sharma" userId="f66cf99955dbac7d" providerId="LiveId" clId="{6E04F4B5-AC0F-493B-B1A2-008A2E900AEB}" dt="2018-01-07T03:32:40.131" v="8394"/>
         <pc:sldMkLst>
           <pc:docMk/>
           <pc:sldMk cId="1277495974" sldId="283"/>
         </pc:sldMkLst>
+        <pc:spChg chg="mod">
+          <ac:chgData name="anum sharma" userId="f66cf99955dbac7d" providerId="LiveId" clId="{6E04F4B5-AC0F-493B-B1A2-008A2E900AEB}" dt="2018-01-07T03:21:15.772" v="7754" actId="20577"/>
+          <ac:spMkLst>
+            <pc:docMk/>
+            <pc:sldMk cId="1277495974" sldId="283"/>
+            <ac:spMk id="2" creationId="{7DCB721F-BC72-4F58-99F9-55F1D247165A}"/>
+          </ac:spMkLst>
+        </pc:spChg>
+        <pc:spChg chg="mod">
+          <ac:chgData name="anum sharma" userId="f66cf99955dbac7d" providerId="LiveId" clId="{6E04F4B5-AC0F-493B-B1A2-008A2E900AEB}" dt="2018-01-07T03:32:40.131" v="8394"/>
+          <ac:spMkLst>
+            <pc:docMk/>
+            <pc:sldMk cId="1277495974" sldId="283"/>
+            <ac:spMk id="3" creationId="{96EF265A-0A9A-46D6-8E10-B9CA3DD3BDD5}"/>
+          </ac:spMkLst>
+        </pc:spChg>
+      </pc:sldChg>
+      <pc:sldChg chg="modSp add">
+        <pc:chgData name="anum sharma" userId="f66cf99955dbac7d" providerId="LiveId" clId="{6E04F4B5-AC0F-493B-B1A2-008A2E900AEB}" dt="2018-01-07T03:39:51.403" v="8699" actId="1076"/>
+        <pc:sldMkLst>
+          <pc:docMk/>
+          <pc:sldMk cId="2896427939" sldId="284"/>
+        </pc:sldMkLst>
+        <pc:spChg chg="mod">
+          <ac:chgData name="anum sharma" userId="f66cf99955dbac7d" providerId="LiveId" clId="{6E04F4B5-AC0F-493B-B1A2-008A2E900AEB}" dt="2018-01-07T03:39:46.036" v="8698" actId="27636"/>
+          <ac:spMkLst>
+            <pc:docMk/>
+            <pc:sldMk cId="2896427939" sldId="284"/>
+            <ac:spMk id="2" creationId="{3B7B7B7A-F665-4A3D-BCF8-0E74E017FEA8}"/>
+          </ac:spMkLst>
+        </pc:spChg>
+        <pc:spChg chg="mod">
+          <ac:chgData name="anum sharma" userId="f66cf99955dbac7d" providerId="LiveId" clId="{6E04F4B5-AC0F-493B-B1A2-008A2E900AEB}" dt="2018-01-07T03:39:51.403" v="8699" actId="1076"/>
+          <ac:spMkLst>
+            <pc:docMk/>
+            <pc:sldMk cId="2896427939" sldId="284"/>
+            <ac:spMk id="3" creationId="{D4211DC6-8EBE-4EF4-96A1-D480645502E6}"/>
+          </ac:spMkLst>
+        </pc:spChg>
       </pc:sldChg>
     </pc:docChg>
   </pc:docChgLst>
@@ -35961,12 +36001,20 @@
             <p:ph type="title"/>
           </p:nvPr>
         </p:nvSpPr>
-        <p:spPr/>
+        <p:spPr>
+          <a:xfrm>
+            <a:off x="677334" y="609600"/>
+            <a:ext cx="8596668" cy="702365"/>
+          </a:xfrm>
+        </p:spPr>
         <p:txBody>
           <a:bodyPr/>
           <a:lstStyle/>
           <a:p>
-            <a:endParaRPr lang="en-US"/>
+            <a:r>
+              <a:rPr lang="en-US" dirty="0"/>
+              <a:t>CSS Concept 4 –Padding and Margins</a:t>
+            </a:r>
           </a:p>
         </p:txBody>
       </p:sp>
@@ -35986,12 +36034,250 @@
             <p:ph idx="1"/>
           </p:nvPr>
         </p:nvSpPr>
-        <p:spPr/>
+        <p:spPr>
+          <a:xfrm>
+            <a:off x="677334" y="1491354"/>
+            <a:ext cx="8596668" cy="4757046"/>
+          </a:xfrm>
+        </p:spPr>
         <p:txBody>
           <a:bodyPr/>
           <a:lstStyle/>
           <a:p>
-            <a:endParaRPr lang="en-US"/>
+            <a:r>
+              <a:rPr lang="en-US" dirty="0"/>
+              <a:t>Padding is that space inside the elements that hold the contents of an element away from its edge.</a:t>
+            </a:r>
+          </a:p>
+          <a:p>
+            <a:r>
+              <a:rPr lang="en-US" dirty="0"/>
+              <a:t>Padding Syntax:</a:t>
+            </a:r>
+          </a:p>
+          <a:p>
+            <a:pPr lvl="3"/>
+            <a:r>
+              <a:rPr lang="en-US" dirty="0"/>
+              <a:t>Individual Properties:</a:t>
+            </a:r>
+          </a:p>
+          <a:p>
+            <a:pPr lvl="6"/>
+            <a:r>
+              <a:rPr lang="en-US" dirty="0"/>
+              <a:t> padding-top: //values;</a:t>
+            </a:r>
+          </a:p>
+          <a:p>
+            <a:pPr marL="2743200" lvl="6" indent="0">
+              <a:buNone/>
+            </a:pPr>
+            <a:r>
+              <a:rPr lang="en-US" dirty="0"/>
+              <a:t>      padding-right://values;</a:t>
+            </a:r>
+          </a:p>
+          <a:p>
+            <a:pPr marL="2743200" lvl="6" indent="0">
+              <a:buNone/>
+            </a:pPr>
+            <a:r>
+              <a:rPr lang="en-US" dirty="0"/>
+              <a:t>      padding –bottom://values;</a:t>
+            </a:r>
+          </a:p>
+          <a:p>
+            <a:pPr marL="2743200" lvl="6" indent="0">
+              <a:buNone/>
+            </a:pPr>
+            <a:r>
+              <a:rPr lang="en-US" dirty="0"/>
+              <a:t>      padding-left://values;</a:t>
+            </a:r>
+          </a:p>
+          <a:p>
+            <a:pPr marL="1371600" lvl="3" indent="0">
+              <a:buNone/>
+            </a:pPr>
+            <a:r>
+              <a:rPr lang="en-US" b="1" dirty="0">
+                <a:solidFill>
+                  <a:srgbClr val="FF0000"/>
+                </a:solidFill>
+              </a:rPr>
+              <a:t>The sequence should be – top right bottom left</a:t>
+            </a:r>
+          </a:p>
+          <a:p>
+            <a:pPr marL="400050" indent="-285750">
+              <a:buFont typeface="Wingdings" panose="05000000000000000000" pitchFamily="2" charset="2"/>
+              <a:buChar char="v"/>
+            </a:pPr>
+            <a:r>
+              <a:rPr lang="en-US" dirty="0"/>
+              <a:t>Short Notation:</a:t>
+            </a:r>
+          </a:p>
+          <a:p>
+            <a:pPr marL="1200150" lvl="2">
+              <a:buFont typeface="Wingdings" panose="05000000000000000000" pitchFamily="2" charset="2"/>
+              <a:buChar char="v"/>
+            </a:pPr>
+            <a:r>
+              <a:rPr lang="en-US" dirty="0"/>
+              <a:t>padding: </a:t>
+            </a:r>
+            <a:r>
+              <a:rPr lang="en-US" dirty="0">
+                <a:solidFill>
+                  <a:srgbClr val="FF0000"/>
+                </a:solidFill>
+              </a:rPr>
+              <a:t>10px</a:t>
+            </a:r>
+            <a:r>
+              <a:rPr lang="en-US" dirty="0"/>
+              <a:t>(top) </a:t>
+            </a:r>
+            <a:r>
+              <a:rPr lang="en-US" dirty="0">
+                <a:solidFill>
+                  <a:srgbClr val="FF0000"/>
+                </a:solidFill>
+              </a:rPr>
+              <a:t>20px</a:t>
+            </a:r>
+            <a:r>
+              <a:rPr lang="en-US" dirty="0"/>
+              <a:t>(right)</a:t>
+            </a:r>
+            <a:r>
+              <a:rPr lang="en-US" dirty="0">
+                <a:solidFill>
+                  <a:srgbClr val="FF0000"/>
+                </a:solidFill>
+              </a:rPr>
+              <a:t> 15px</a:t>
+            </a:r>
+            <a:r>
+              <a:rPr lang="en-US" dirty="0"/>
+              <a:t>(bottom) </a:t>
+            </a:r>
+            <a:r>
+              <a:rPr lang="en-US" dirty="0">
+                <a:solidFill>
+                  <a:srgbClr val="FF0000"/>
+                </a:solidFill>
+              </a:rPr>
+              <a:t>10px</a:t>
+            </a:r>
+            <a:r>
+              <a:rPr lang="en-US" dirty="0"/>
+              <a:t>(left)</a:t>
+            </a:r>
+          </a:p>
+          <a:p>
+            <a:pPr marL="1200150" lvl="2">
+              <a:buFont typeface="Wingdings" panose="05000000000000000000" pitchFamily="2" charset="2"/>
+              <a:buChar char="v"/>
+            </a:pPr>
+            <a:r>
+              <a:rPr lang="en-US" dirty="0"/>
+              <a:t>padding: </a:t>
+            </a:r>
+            <a:r>
+              <a:rPr lang="en-US" dirty="0">
+                <a:solidFill>
+                  <a:srgbClr val="FF0000"/>
+                </a:solidFill>
+              </a:rPr>
+              <a:t>10p</a:t>
+            </a:r>
+            <a:r>
+              <a:rPr lang="en-US" dirty="0"/>
+              <a:t>x(top)  </a:t>
+            </a:r>
+            <a:r>
+              <a:rPr lang="en-US" dirty="0">
+                <a:solidFill>
+                  <a:srgbClr val="FF0000"/>
+                </a:solidFill>
+              </a:rPr>
+              <a:t>20px</a:t>
+            </a:r>
+            <a:r>
+              <a:rPr lang="en-US" dirty="0"/>
+              <a:t>(right and left) </a:t>
+            </a:r>
+            <a:r>
+              <a:rPr lang="en-US" dirty="0">
+                <a:solidFill>
+                  <a:srgbClr val="FF0000"/>
+                </a:solidFill>
+              </a:rPr>
+              <a:t>10px</a:t>
+            </a:r>
+            <a:r>
+              <a:rPr lang="en-US" dirty="0"/>
+              <a:t>(bottom)</a:t>
+            </a:r>
+          </a:p>
+          <a:p>
+            <a:pPr marL="1200150" lvl="2">
+              <a:buFont typeface="Wingdings" panose="05000000000000000000" pitchFamily="2" charset="2"/>
+              <a:buChar char="v"/>
+            </a:pPr>
+            <a:r>
+              <a:rPr lang="en-US" dirty="0"/>
+              <a:t>padding: </a:t>
+            </a:r>
+            <a:r>
+              <a:rPr lang="en-US" dirty="0">
+                <a:solidFill>
+                  <a:srgbClr val="FF0000"/>
+                </a:solidFill>
+              </a:rPr>
+              <a:t>10px</a:t>
+            </a:r>
+            <a:r>
+              <a:rPr lang="en-US" dirty="0"/>
+              <a:t>(top and bottom) </a:t>
+            </a:r>
+            <a:r>
+              <a:rPr lang="en-US" dirty="0">
+                <a:solidFill>
+                  <a:srgbClr val="FF0000"/>
+                </a:solidFill>
+              </a:rPr>
+              <a:t>20px</a:t>
+            </a:r>
+            <a:r>
+              <a:rPr lang="en-US" dirty="0"/>
+              <a:t> (right and left side)</a:t>
+            </a:r>
+          </a:p>
+          <a:p>
+            <a:pPr marL="1200150" lvl="2">
+              <a:buFont typeface="Wingdings" panose="05000000000000000000" pitchFamily="2" charset="2"/>
+              <a:buChar char="v"/>
+            </a:pPr>
+            <a:r>
+              <a:rPr lang="en-US" dirty="0"/>
+              <a:t>padding: </a:t>
+            </a:r>
+            <a:r>
+              <a:rPr lang="en-US" dirty="0">
+                <a:solidFill>
+                  <a:srgbClr val="FF0000"/>
+                </a:solidFill>
+              </a:rPr>
+              <a:t>10px</a:t>
+            </a:r>
+            <a:r>
+              <a:rPr lang="en-US" dirty="0"/>
+              <a:t> (apply to all sides) </a:t>
+            </a:r>
           </a:p>
         </p:txBody>
       </p:sp>
@@ -35999,6 +36285,362 @@
     <p:extLst>
       <p:ext uri="{BB962C8B-B14F-4D97-AF65-F5344CB8AC3E}">
         <p14:creationId xmlns:p14="http://schemas.microsoft.com/office/powerpoint/2010/main" val="1277495974"/>
+      </p:ext>
+    </p:extLst>
+  </p:cSld>
+  <p:clrMapOvr>
+    <a:masterClrMapping/>
+  </p:clrMapOvr>
+</p:sld>
+</file>
+
+<file path=ppt/slides/slide29.xml><?xml version="1.0" encoding="utf-8"?>
+<p:sld xmlns:a="http://schemas.openxmlformats.org/drawingml/2006/main" xmlns:r="http://schemas.openxmlformats.org/officeDocument/2006/relationships" xmlns:p="http://schemas.openxmlformats.org/presentationml/2006/main">
+  <p:cSld>
+    <p:spTree>
+      <p:nvGrpSpPr>
+        <p:cNvPr id="1" name=""/>
+        <p:cNvGrpSpPr/>
+        <p:nvPr/>
+      </p:nvGrpSpPr>
+      <p:grpSpPr>
+        <a:xfrm>
+          <a:off x="0" y="0"/>
+          <a:ext cx="0" cy="0"/>
+          <a:chOff x="0" y="0"/>
+          <a:chExt cx="0" cy="0"/>
+        </a:xfrm>
+      </p:grpSpPr>
+      <p:sp>
+        <p:nvSpPr>
+          <p:cNvPr id="2" name="Title 1">
+            <a:extLst>
+              <a:ext uri="{FF2B5EF4-FFF2-40B4-BE49-F238E27FC236}">
+                <a16:creationId xmlns:a16="http://schemas.microsoft.com/office/drawing/2014/main" id="{3B7B7B7A-F665-4A3D-BCF8-0E74E017FEA8}"/>
+              </a:ext>
+            </a:extLst>
+          </p:cNvPr>
+          <p:cNvSpPr>
+            <a:spLocks noGrp="1"/>
+          </p:cNvSpPr>
+          <p:nvPr>
+            <p:ph type="title"/>
+          </p:nvPr>
+        </p:nvSpPr>
+        <p:spPr>
+          <a:xfrm>
+            <a:off x="677334" y="609600"/>
+            <a:ext cx="8596668" cy="596348"/>
+          </a:xfrm>
+        </p:spPr>
+        <p:txBody>
+          <a:bodyPr>
+            <a:normAutofit fontScale="90000"/>
+          </a:bodyPr>
+          <a:lstStyle/>
+          <a:p>
+            <a:r>
+              <a:rPr lang="en-US" dirty="0"/>
+              <a:t>Margins</a:t>
+            </a:r>
+          </a:p>
+        </p:txBody>
+      </p:sp>
+      <p:sp>
+        <p:nvSpPr>
+          <p:cNvPr id="3" name="Content Placeholder 2">
+            <a:extLst>
+              <a:ext uri="{FF2B5EF4-FFF2-40B4-BE49-F238E27FC236}">
+                <a16:creationId xmlns:a16="http://schemas.microsoft.com/office/drawing/2014/main" id="{D4211DC6-8EBE-4EF4-96A1-D480645502E6}"/>
+              </a:ext>
+            </a:extLst>
+          </p:cNvPr>
+          <p:cNvSpPr>
+            <a:spLocks noGrp="1"/>
+          </p:cNvSpPr>
+          <p:nvPr>
+            <p:ph idx="1"/>
+          </p:nvPr>
+        </p:nvSpPr>
+        <p:spPr>
+          <a:xfrm>
+            <a:off x="677334" y="1266552"/>
+            <a:ext cx="8596668" cy="4981848"/>
+          </a:xfrm>
+        </p:spPr>
+        <p:txBody>
+          <a:bodyPr>
+            <a:normAutofit fontScale="92500" lnSpcReduction="20000"/>
+          </a:bodyPr>
+          <a:lstStyle/>
+          <a:p>
+            <a:r>
+              <a:rPr lang="en-US" dirty="0"/>
+              <a:t>It represent the space between elements.</a:t>
+            </a:r>
+          </a:p>
+          <a:p>
+            <a:r>
+              <a:rPr lang="en-US" dirty="0"/>
+              <a:t>Values are not calculated as part of an element’s total width.</a:t>
+            </a:r>
+          </a:p>
+          <a:p>
+            <a:r>
+              <a:rPr lang="en-US" dirty="0"/>
+              <a:t>Most elements have default margin you must account for when structuring your layout.</a:t>
+            </a:r>
+          </a:p>
+          <a:p>
+            <a:r>
+              <a:rPr lang="en-US" dirty="0"/>
+              <a:t>Margin Syntax is same as padding:</a:t>
+            </a:r>
+          </a:p>
+          <a:p>
+            <a:pPr lvl="3"/>
+            <a:r>
+              <a:rPr lang="en-US" sz="1500" dirty="0"/>
+              <a:t>Individual Properties:</a:t>
+            </a:r>
+          </a:p>
+          <a:p>
+            <a:pPr lvl="6"/>
+            <a:r>
+              <a:rPr lang="en-US" sz="1500" dirty="0"/>
+              <a:t> margin-top: //values;</a:t>
+            </a:r>
+          </a:p>
+          <a:p>
+            <a:pPr marL="2743200" lvl="6" indent="0">
+              <a:buNone/>
+            </a:pPr>
+            <a:r>
+              <a:rPr lang="en-US" sz="1500" dirty="0"/>
+              <a:t>      margin-right://values;</a:t>
+            </a:r>
+          </a:p>
+          <a:p>
+            <a:pPr marL="2743200" lvl="6" indent="0">
+              <a:buNone/>
+            </a:pPr>
+            <a:r>
+              <a:rPr lang="en-US" sz="1500" dirty="0"/>
+              <a:t>      margin–bottom://values;</a:t>
+            </a:r>
+          </a:p>
+          <a:p>
+            <a:pPr marL="2743200" lvl="6" indent="0">
+              <a:buNone/>
+            </a:pPr>
+            <a:r>
+              <a:rPr lang="en-US" sz="1500" dirty="0"/>
+              <a:t>      margin-left://values;</a:t>
+            </a:r>
+          </a:p>
+          <a:p>
+            <a:pPr marL="1371600" lvl="3" indent="0">
+              <a:buNone/>
+            </a:pPr>
+            <a:r>
+              <a:rPr lang="en-US" sz="1500" b="1" dirty="0">
+                <a:solidFill>
+                  <a:srgbClr val="FF0000"/>
+                </a:solidFill>
+              </a:rPr>
+              <a:t>The sequence should be – top right bottom left</a:t>
+            </a:r>
+          </a:p>
+          <a:p>
+            <a:pPr marL="400050" indent="-285750">
+              <a:buFont typeface="Wingdings" panose="05000000000000000000" pitchFamily="2" charset="2"/>
+              <a:buChar char="v"/>
+            </a:pPr>
+            <a:r>
+              <a:rPr lang="en-US" sz="1500" dirty="0"/>
+              <a:t>Short Notation:</a:t>
+            </a:r>
+          </a:p>
+          <a:p>
+            <a:pPr marL="1200150" lvl="2">
+              <a:buFont typeface="Wingdings" panose="05000000000000000000" pitchFamily="2" charset="2"/>
+              <a:buChar char="v"/>
+            </a:pPr>
+            <a:r>
+              <a:rPr lang="en-US" sz="1500" dirty="0"/>
+              <a:t>margin: </a:t>
+            </a:r>
+            <a:r>
+              <a:rPr lang="en-US" sz="1500" dirty="0">
+                <a:solidFill>
+                  <a:srgbClr val="FF0000"/>
+                </a:solidFill>
+              </a:rPr>
+              <a:t>10px</a:t>
+            </a:r>
+            <a:r>
+              <a:rPr lang="en-US" sz="1500" dirty="0"/>
+              <a:t>(top) </a:t>
+            </a:r>
+            <a:r>
+              <a:rPr lang="en-US" sz="1500" dirty="0">
+                <a:solidFill>
+                  <a:srgbClr val="FF0000"/>
+                </a:solidFill>
+              </a:rPr>
+              <a:t>20px</a:t>
+            </a:r>
+            <a:r>
+              <a:rPr lang="en-US" sz="1500" dirty="0"/>
+              <a:t>(right)</a:t>
+            </a:r>
+            <a:r>
+              <a:rPr lang="en-US" sz="1500" dirty="0">
+                <a:solidFill>
+                  <a:srgbClr val="FF0000"/>
+                </a:solidFill>
+              </a:rPr>
+              <a:t> 15px</a:t>
+            </a:r>
+            <a:r>
+              <a:rPr lang="en-US" sz="1500" dirty="0"/>
+              <a:t>(bottom) </a:t>
+            </a:r>
+            <a:r>
+              <a:rPr lang="en-US" sz="1500" dirty="0">
+                <a:solidFill>
+                  <a:srgbClr val="FF0000"/>
+                </a:solidFill>
+              </a:rPr>
+              <a:t>10px</a:t>
+            </a:r>
+            <a:r>
+              <a:rPr lang="en-US" sz="1500" dirty="0"/>
+              <a:t>(left)</a:t>
+            </a:r>
+          </a:p>
+          <a:p>
+            <a:pPr marL="1200150" lvl="2">
+              <a:buFont typeface="Wingdings" panose="05000000000000000000" pitchFamily="2" charset="2"/>
+              <a:buChar char="v"/>
+            </a:pPr>
+            <a:r>
+              <a:rPr lang="en-US" sz="1500" dirty="0"/>
+              <a:t>margin: </a:t>
+            </a:r>
+            <a:r>
+              <a:rPr lang="en-US" sz="1500" dirty="0">
+                <a:solidFill>
+                  <a:srgbClr val="FF0000"/>
+                </a:solidFill>
+              </a:rPr>
+              <a:t>10p</a:t>
+            </a:r>
+            <a:r>
+              <a:rPr lang="en-US" sz="1500" dirty="0"/>
+              <a:t>x(top)  </a:t>
+            </a:r>
+            <a:r>
+              <a:rPr lang="en-US" sz="1500" dirty="0">
+                <a:solidFill>
+                  <a:srgbClr val="FF0000"/>
+                </a:solidFill>
+              </a:rPr>
+              <a:t>20px</a:t>
+            </a:r>
+            <a:r>
+              <a:rPr lang="en-US" sz="1500" dirty="0"/>
+              <a:t>(right and left) </a:t>
+            </a:r>
+            <a:r>
+              <a:rPr lang="en-US" sz="1500" dirty="0">
+                <a:solidFill>
+                  <a:srgbClr val="FF0000"/>
+                </a:solidFill>
+              </a:rPr>
+              <a:t>10px</a:t>
+            </a:r>
+            <a:r>
+              <a:rPr lang="en-US" sz="1500" dirty="0"/>
+              <a:t>(bottom)</a:t>
+            </a:r>
+          </a:p>
+          <a:p>
+            <a:pPr marL="1200150" lvl="2">
+              <a:buFont typeface="Wingdings" panose="05000000000000000000" pitchFamily="2" charset="2"/>
+              <a:buChar char="v"/>
+            </a:pPr>
+            <a:r>
+              <a:rPr lang="en-US" sz="1500" dirty="0"/>
+              <a:t>margin: </a:t>
+            </a:r>
+            <a:r>
+              <a:rPr lang="en-US" sz="1500" dirty="0">
+                <a:solidFill>
+                  <a:srgbClr val="FF0000"/>
+                </a:solidFill>
+              </a:rPr>
+              <a:t>10px</a:t>
+            </a:r>
+            <a:r>
+              <a:rPr lang="en-US" sz="1500" dirty="0"/>
+              <a:t>(top and bottom) </a:t>
+            </a:r>
+            <a:r>
+              <a:rPr lang="en-US" sz="1500" dirty="0">
+                <a:solidFill>
+                  <a:srgbClr val="FF0000"/>
+                </a:solidFill>
+              </a:rPr>
+              <a:t>20px</a:t>
+            </a:r>
+            <a:r>
+              <a:rPr lang="en-US" sz="1500" dirty="0"/>
+              <a:t> (right and left side)</a:t>
+            </a:r>
+          </a:p>
+          <a:p>
+            <a:pPr marL="1200150" lvl="2">
+              <a:buFont typeface="Wingdings" panose="05000000000000000000" pitchFamily="2" charset="2"/>
+              <a:buChar char="v"/>
+            </a:pPr>
+            <a:r>
+              <a:rPr lang="en-US" sz="1500" dirty="0"/>
+              <a:t>margin: </a:t>
+            </a:r>
+            <a:r>
+              <a:rPr lang="en-US" sz="1500" dirty="0">
+                <a:solidFill>
+                  <a:srgbClr val="FF0000"/>
+                </a:solidFill>
+              </a:rPr>
+              <a:t>10px</a:t>
+            </a:r>
+            <a:r>
+              <a:rPr lang="en-US" sz="1500" dirty="0"/>
+              <a:t> (apply to all sides) </a:t>
+            </a:r>
+          </a:p>
+          <a:p>
+            <a:pPr lvl="4"/>
+            <a:endParaRPr lang="en-US" dirty="0"/>
+          </a:p>
+          <a:p>
+            <a:pPr lvl="2"/>
+            <a:endParaRPr lang="en-US" dirty="0"/>
+          </a:p>
+          <a:p>
+            <a:endParaRPr lang="en-US" dirty="0"/>
+          </a:p>
+          <a:p>
+            <a:endParaRPr lang="en-US" dirty="0"/>
+          </a:p>
+        </p:txBody>
+      </p:sp>
+    </p:spTree>
+    <p:extLst>
+      <p:ext uri="{BB962C8B-B14F-4D97-AF65-F5344CB8AC3E}">
+        <p14:creationId xmlns:p14="http://schemas.microsoft.com/office/powerpoint/2010/main" val="2896427939"/>
       </p:ext>
     </p:extLst>
   </p:cSld>

</xml_diff>

<commit_message>
feat: Unit of Measurement in CSS
</commit_message>
<xml_diff>
--- a/Introduction-to-CSS.pptx
+++ b/Introduction-to-CSS.pptx
@@ -39,6 +39,8 @@
     <p:sldId id="287" r:id="rId33"/>
     <p:sldId id="288" r:id="rId34"/>
     <p:sldId id="289" r:id="rId35"/>
+    <p:sldId id="290" r:id="rId36"/>
+    <p:sldId id="291" r:id="rId37"/>
   </p:sldIdLst>
   <p:sldSz cx="12192000" cy="6858000"/>
   <p:notesSz cx="6858000" cy="9144000"/>
@@ -150,7 +152,7 @@
   <pc:docChgLst>
     <pc:chgData name="anum sharma" userId="f66cf99955dbac7d" providerId="LiveId" clId="{6E04F4B5-AC0F-493B-B1A2-008A2E900AEB}"/>
     <pc:docChg chg="undo custSel addSld delSld modSld sldOrd">
-      <pc:chgData name="anum sharma" userId="f66cf99955dbac7d" providerId="LiveId" clId="{6E04F4B5-AC0F-493B-B1A2-008A2E900AEB}" dt="2018-01-07T07:24:00.125" v="10697" actId="14100"/>
+      <pc:chgData name="anum sharma" userId="f66cf99955dbac7d" providerId="LiveId" clId="{6E04F4B5-AC0F-493B-B1A2-008A2E900AEB}" dt="2018-01-07T07:53:20.324" v="11575" actId="20577"/>
       <pc:docMkLst>
         <pc:docMk/>
       </pc:docMkLst>
@@ -2249,6 +2251,84 @@
             <pc:docMk/>
             <pc:sldMk cId="363056572" sldId="289"/>
             <ac:spMk id="3" creationId="{D10E7500-4985-43A2-97E6-EF07C0F68B3F}"/>
+          </ac:spMkLst>
+        </pc:spChg>
+      </pc:sldChg>
+      <pc:sldChg chg="addSp delSp modSp add mod setBg">
+        <pc:chgData name="anum sharma" userId="f66cf99955dbac7d" providerId="LiveId" clId="{6E04F4B5-AC0F-493B-B1A2-008A2E900AEB}" dt="2018-01-07T07:47:45.626" v="11356" actId="26606"/>
+        <pc:sldMkLst>
+          <pc:docMk/>
+          <pc:sldMk cId="1998336445" sldId="290"/>
+        </pc:sldMkLst>
+        <pc:spChg chg="mod">
+          <ac:chgData name="anum sharma" userId="f66cf99955dbac7d" providerId="LiveId" clId="{6E04F4B5-AC0F-493B-B1A2-008A2E900AEB}" dt="2018-01-07T07:47:45.626" v="11355" actId="26606"/>
+          <ac:spMkLst>
+            <pc:docMk/>
+            <pc:sldMk cId="1998336445" sldId="290"/>
+            <ac:spMk id="2" creationId="{26E7FE46-3424-40D4-8B9E-09BEEB47E961}"/>
+          </ac:spMkLst>
+        </pc:spChg>
+        <pc:spChg chg="add del mod">
+          <ac:chgData name="anum sharma" userId="f66cf99955dbac7d" providerId="LiveId" clId="{6E04F4B5-AC0F-493B-B1A2-008A2E900AEB}" dt="2018-01-07T07:47:45.626" v="11356" actId="26606"/>
+          <ac:spMkLst>
+            <pc:docMk/>
+            <pc:sldMk cId="1998336445" sldId="290"/>
+            <ac:spMk id="3" creationId="{D5D33D68-4C6C-4B76-B567-4A7260C6C0AE}"/>
+          </ac:spMkLst>
+        </pc:spChg>
+        <pc:spChg chg="add del">
+          <ac:chgData name="anum sharma" userId="f66cf99955dbac7d" providerId="LiveId" clId="{6E04F4B5-AC0F-493B-B1A2-008A2E900AEB}" dt="2018-01-07T07:47:45.626" v="11355" actId="26606"/>
+          <ac:spMkLst>
+            <pc:docMk/>
+            <pc:sldMk cId="1998336445" sldId="290"/>
+            <ac:spMk id="10" creationId="{655AE6B0-AC9E-4167-806F-E9DB135FC46B}"/>
+          </ac:spMkLst>
+        </pc:spChg>
+        <pc:spChg chg="add del">
+          <ac:chgData name="anum sharma" userId="f66cf99955dbac7d" providerId="LiveId" clId="{6E04F4B5-AC0F-493B-B1A2-008A2E900AEB}" dt="2018-01-07T07:47:45.626" v="11355" actId="26606"/>
+          <ac:spMkLst>
+            <pc:docMk/>
+            <pc:sldMk cId="1998336445" sldId="290"/>
+            <ac:spMk id="23" creationId="{87BD1F4E-A66D-4C06-86DA-8D56CA7A3B41}"/>
+          </ac:spMkLst>
+        </pc:spChg>
+        <pc:grpChg chg="add del">
+          <ac:chgData name="anum sharma" userId="f66cf99955dbac7d" providerId="LiveId" clId="{6E04F4B5-AC0F-493B-B1A2-008A2E900AEB}" dt="2018-01-07T07:47:45.626" v="11355" actId="26606"/>
+          <ac:grpSpMkLst>
+            <pc:docMk/>
+            <pc:sldMk cId="1998336445" sldId="290"/>
+            <ac:grpSpMk id="12" creationId="{3523416A-383B-4FDC-B4C9-D8EDDFE9C043}"/>
+          </ac:grpSpMkLst>
+        </pc:grpChg>
+        <pc:graphicFrameChg chg="add del">
+          <ac:chgData name="anum sharma" userId="f66cf99955dbac7d" providerId="LiveId" clId="{6E04F4B5-AC0F-493B-B1A2-008A2E900AEB}" dt="2018-01-07T07:47:45.626" v="11355" actId="26606"/>
+          <ac:graphicFrameMkLst>
+            <pc:docMk/>
+            <pc:sldMk cId="1998336445" sldId="290"/>
+            <ac:graphicFrameMk id="5" creationId="{00000000-0000-0000-0000-000000000000}"/>
+          </ac:graphicFrameMkLst>
+        </pc:graphicFrameChg>
+      </pc:sldChg>
+      <pc:sldChg chg="modSp add">
+        <pc:chgData name="anum sharma" userId="f66cf99955dbac7d" providerId="LiveId" clId="{6E04F4B5-AC0F-493B-B1A2-008A2E900AEB}" dt="2018-01-07T07:53:20.324" v="11575" actId="20577"/>
+        <pc:sldMkLst>
+          <pc:docMk/>
+          <pc:sldMk cId="675102336" sldId="291"/>
+        </pc:sldMkLst>
+        <pc:spChg chg="mod">
+          <ac:chgData name="anum sharma" userId="f66cf99955dbac7d" providerId="LiveId" clId="{6E04F4B5-AC0F-493B-B1A2-008A2E900AEB}" dt="2018-01-07T07:48:02.121" v="11360" actId="27636"/>
+          <ac:spMkLst>
+            <pc:docMk/>
+            <pc:sldMk cId="675102336" sldId="291"/>
+            <ac:spMk id="2" creationId="{EF317D30-980B-49F5-B6B5-61B7942BA36D}"/>
+          </ac:spMkLst>
+        </pc:spChg>
+        <pc:spChg chg="mod">
+          <ac:chgData name="anum sharma" userId="f66cf99955dbac7d" providerId="LiveId" clId="{6E04F4B5-AC0F-493B-B1A2-008A2E900AEB}" dt="2018-01-07T07:53:20.324" v="11575" actId="20577"/>
+          <ac:spMkLst>
+            <pc:docMk/>
+            <pc:sldMk cId="675102336" sldId="291"/>
+            <ac:spMk id="3" creationId="{927B76CB-C999-43F9-8D5E-32F03B8238F6}"/>
           </ac:spMkLst>
         </pc:spChg>
       </pc:sldChg>
@@ -38521,6 +38601,319 @@
 </p:sld>
 </file>
 
+<file path=ppt/slides/slide35.xml><?xml version="1.0" encoding="utf-8"?>
+<p:sld xmlns:a="http://schemas.openxmlformats.org/drawingml/2006/main" xmlns:r="http://schemas.openxmlformats.org/officeDocument/2006/relationships" xmlns:p="http://schemas.openxmlformats.org/presentationml/2006/main">
+  <p:cSld>
+    <p:spTree>
+      <p:nvGrpSpPr>
+        <p:cNvPr id="1" name=""/>
+        <p:cNvGrpSpPr/>
+        <p:nvPr/>
+      </p:nvGrpSpPr>
+      <p:grpSpPr>
+        <a:xfrm>
+          <a:off x="0" y="0"/>
+          <a:ext cx="0" cy="0"/>
+          <a:chOff x="0" y="0"/>
+          <a:chExt cx="0" cy="0"/>
+        </a:xfrm>
+      </p:grpSpPr>
+      <p:sp>
+        <p:nvSpPr>
+          <p:cNvPr id="2" name="Title 1">
+            <a:extLst>
+              <a:ext uri="{FF2B5EF4-FFF2-40B4-BE49-F238E27FC236}">
+                <a16:creationId xmlns:a16="http://schemas.microsoft.com/office/drawing/2014/main" id="{26E7FE46-3424-40D4-8B9E-09BEEB47E961}"/>
+              </a:ext>
+            </a:extLst>
+          </p:cNvPr>
+          <p:cNvSpPr>
+            <a:spLocks noGrp="1"/>
+          </p:cNvSpPr>
+          <p:nvPr>
+            <p:ph type="title"/>
+          </p:nvPr>
+        </p:nvSpPr>
+        <p:spPr>
+          <a:xfrm>
+            <a:off x="677334" y="609600"/>
+            <a:ext cx="8596668" cy="742122"/>
+          </a:xfrm>
+        </p:spPr>
+        <p:txBody>
+          <a:bodyPr/>
+          <a:lstStyle/>
+          <a:p>
+            <a:r>
+              <a:rPr lang="en-US"/>
+              <a:t>Unit of Measurement</a:t>
+            </a:r>
+            <a:endParaRPr lang="en-US" dirty="0"/>
+          </a:p>
+        </p:txBody>
+      </p:sp>
+      <p:sp>
+        <p:nvSpPr>
+          <p:cNvPr id="3" name="Content Placeholder 2">
+            <a:extLst>
+              <a:ext uri="{FF2B5EF4-FFF2-40B4-BE49-F238E27FC236}">
+                <a16:creationId xmlns:a16="http://schemas.microsoft.com/office/drawing/2014/main" id="{D5D33D68-4C6C-4B76-B567-4A7260C6C0AE}"/>
+              </a:ext>
+            </a:extLst>
+          </p:cNvPr>
+          <p:cNvSpPr>
+            <a:spLocks noGrp="1"/>
+          </p:cNvSpPr>
+          <p:nvPr>
+            <p:ph idx="1"/>
+          </p:nvPr>
+        </p:nvSpPr>
+        <p:spPr>
+          <a:xfrm>
+            <a:off x="677334" y="1617250"/>
+            <a:ext cx="8596668" cy="4783550"/>
+          </a:xfrm>
+        </p:spPr>
+        <p:txBody>
+          <a:bodyPr/>
+          <a:lstStyle/>
+          <a:p>
+            <a:r>
+              <a:rPr lang="en-US" dirty="0" err="1"/>
+              <a:t>px</a:t>
+            </a:r>
+            <a:r>
+              <a:rPr lang="en-US" dirty="0"/>
+              <a:t>(Pixel)</a:t>
+            </a:r>
+          </a:p>
+          <a:p>
+            <a:pPr lvl="3"/>
+            <a:r>
+              <a:rPr lang="en-US" sz="1600" dirty="0"/>
+              <a:t>Absolute(fixed) value</a:t>
+            </a:r>
+          </a:p>
+          <a:p>
+            <a:pPr lvl="3"/>
+            <a:r>
+              <a:rPr lang="en-US" sz="1600" dirty="0"/>
+              <a:t>Used to define the height and width values</a:t>
+            </a:r>
+          </a:p>
+          <a:p>
+            <a:pPr lvl="3"/>
+            <a:r>
+              <a:rPr lang="en-US" sz="1600" dirty="0"/>
+              <a:t>Example: p { font-size:17px;  }</a:t>
+            </a:r>
+          </a:p>
+          <a:p>
+            <a:r>
+              <a:rPr lang="en-US" dirty="0" err="1"/>
+              <a:t>em</a:t>
+            </a:r>
+            <a:r>
+              <a:rPr lang="en-US" dirty="0"/>
+              <a:t> </a:t>
+            </a:r>
+          </a:p>
+          <a:p>
+            <a:pPr lvl="3"/>
+            <a:r>
+              <a:rPr lang="en-US" dirty="0"/>
+              <a:t>Relative value(relative to font size of another element)</a:t>
+            </a:r>
+          </a:p>
+          <a:p>
+            <a:pPr lvl="3"/>
+            <a:r>
+              <a:rPr lang="en-US" dirty="0"/>
+              <a:t>Value of text as its default size. If someone has their browser ‘s default size is 16 pixels, so if set the body font size to 100%, then that would equals 16 pixel.</a:t>
+            </a:r>
+          </a:p>
+          <a:p>
+            <a:pPr lvl="3"/>
+            <a:r>
+              <a:rPr lang="en-US" dirty="0"/>
+              <a:t>Example:  h1 { font-size:3em;  }    here 3em = 300% of 16 pixels</a:t>
+            </a:r>
+          </a:p>
+          <a:p>
+            <a:pPr lvl="3"/>
+            <a:r>
+              <a:rPr lang="en-US" dirty="0"/>
+              <a:t>If you set the paragraph tag to be one </a:t>
+            </a:r>
+            <a:r>
+              <a:rPr lang="en-US" dirty="0" err="1"/>
+              <a:t>em</a:t>
+            </a:r>
+            <a:r>
+              <a:rPr lang="en-US" dirty="0"/>
+              <a:t> which equals 16 pixels</a:t>
+            </a:r>
+          </a:p>
+          <a:p>
+            <a:pPr lvl="3"/>
+            <a:endParaRPr lang="en-US" dirty="0"/>
+          </a:p>
+          <a:p>
+            <a:pPr lvl="3"/>
+            <a:endParaRPr lang="en-US" dirty="0"/>
+          </a:p>
+        </p:txBody>
+      </p:sp>
+    </p:spTree>
+    <p:extLst>
+      <p:ext uri="{BB962C8B-B14F-4D97-AF65-F5344CB8AC3E}">
+        <p14:creationId xmlns:p14="http://schemas.microsoft.com/office/powerpoint/2010/main" val="1998336445"/>
+      </p:ext>
+    </p:extLst>
+  </p:cSld>
+  <p:clrMapOvr>
+    <a:masterClrMapping/>
+  </p:clrMapOvr>
+</p:sld>
+</file>
+
+<file path=ppt/slides/slide36.xml><?xml version="1.0" encoding="utf-8"?>
+<p:sld xmlns:a="http://schemas.openxmlformats.org/drawingml/2006/main" xmlns:r="http://schemas.openxmlformats.org/officeDocument/2006/relationships" xmlns:p="http://schemas.openxmlformats.org/presentationml/2006/main">
+  <p:cSld>
+    <p:spTree>
+      <p:nvGrpSpPr>
+        <p:cNvPr id="1" name=""/>
+        <p:cNvGrpSpPr/>
+        <p:nvPr/>
+      </p:nvGrpSpPr>
+      <p:grpSpPr>
+        <a:xfrm>
+          <a:off x="0" y="0"/>
+          <a:ext cx="0" cy="0"/>
+          <a:chOff x="0" y="0"/>
+          <a:chExt cx="0" cy="0"/>
+        </a:xfrm>
+      </p:grpSpPr>
+      <p:sp>
+        <p:nvSpPr>
+          <p:cNvPr id="2" name="Title 1">
+            <a:extLst>
+              <a:ext uri="{FF2B5EF4-FFF2-40B4-BE49-F238E27FC236}">
+                <a16:creationId xmlns:a16="http://schemas.microsoft.com/office/drawing/2014/main" id="{EF317D30-980B-49F5-B6B5-61B7942BA36D}"/>
+              </a:ext>
+            </a:extLst>
+          </p:cNvPr>
+          <p:cNvSpPr>
+            <a:spLocks noGrp="1"/>
+          </p:cNvSpPr>
+          <p:nvPr>
+            <p:ph type="title"/>
+          </p:nvPr>
+        </p:nvSpPr>
+        <p:spPr>
+          <a:xfrm>
+            <a:off x="677334" y="609600"/>
+            <a:ext cx="8596668" cy="636104"/>
+          </a:xfrm>
+        </p:spPr>
+        <p:txBody>
+          <a:bodyPr>
+            <a:normAutofit fontScale="90000"/>
+          </a:bodyPr>
+          <a:lstStyle/>
+          <a:p>
+            <a:r>
+              <a:rPr lang="en-US" dirty="0"/>
+              <a:t>Unit of Measurement</a:t>
+            </a:r>
+          </a:p>
+        </p:txBody>
+      </p:sp>
+      <p:sp>
+        <p:nvSpPr>
+          <p:cNvPr id="3" name="Content Placeholder 2">
+            <a:extLst>
+              <a:ext uri="{FF2B5EF4-FFF2-40B4-BE49-F238E27FC236}">
+                <a16:creationId xmlns:a16="http://schemas.microsoft.com/office/drawing/2014/main" id="{927B76CB-C999-43F9-8D5E-32F03B8238F6}"/>
+              </a:ext>
+            </a:extLst>
+          </p:cNvPr>
+          <p:cNvSpPr>
+            <a:spLocks noGrp="1"/>
+          </p:cNvSpPr>
+          <p:nvPr>
+            <p:ph idx="1"/>
+          </p:nvPr>
+        </p:nvSpPr>
+        <p:spPr>
+          <a:xfrm>
+            <a:off x="677334" y="1488613"/>
+            <a:ext cx="8596668" cy="3880773"/>
+          </a:xfrm>
+        </p:spPr>
+        <p:txBody>
+          <a:bodyPr/>
+          <a:lstStyle/>
+          <a:p>
+            <a:r>
+              <a:rPr lang="en-US" dirty="0"/>
+              <a:t>rem or root </a:t>
+            </a:r>
+            <a:r>
+              <a:rPr lang="en-US" dirty="0" err="1"/>
+              <a:t>em</a:t>
+            </a:r>
+            <a:endParaRPr lang="en-US" dirty="0"/>
+          </a:p>
+          <a:p>
+            <a:pPr lvl="2"/>
+            <a:r>
+              <a:rPr lang="en-US" dirty="0"/>
+              <a:t>Relative value(relative to font-size of root element)</a:t>
+            </a:r>
+          </a:p>
+          <a:p>
+            <a:pPr lvl="2"/>
+            <a:r>
+              <a:rPr lang="en-US" dirty="0"/>
+              <a:t>Offers more predictable control then ems</a:t>
+            </a:r>
+          </a:p>
+          <a:p>
+            <a:r>
+              <a:rPr lang="en-US" dirty="0"/>
+              <a:t>% (Percentage)</a:t>
+            </a:r>
+          </a:p>
+          <a:p>
+            <a:pPr lvl="2"/>
+            <a:r>
+              <a:rPr lang="en-US" dirty="0"/>
+              <a:t>Used in responsive layouts</a:t>
+            </a:r>
+          </a:p>
+          <a:p>
+            <a:pPr lvl="2"/>
+            <a:r>
+              <a:rPr lang="en-US" dirty="0"/>
+              <a:t>Not typically used for font sizing</a:t>
+            </a:r>
+          </a:p>
+        </p:txBody>
+      </p:sp>
+    </p:spTree>
+    <p:extLst>
+      <p:ext uri="{BB962C8B-B14F-4D97-AF65-F5344CB8AC3E}">
+        <p14:creationId xmlns:p14="http://schemas.microsoft.com/office/powerpoint/2010/main" val="675102336"/>
+      </p:ext>
+    </p:extLst>
+  </p:cSld>
+  <p:clrMapOvr>
+    <a:masterClrMapping/>
+  </p:clrMapOvr>
+</p:sld>
+</file>
+
 <file path=ppt/slides/slide4.xml><?xml version="1.0" encoding="utf-8"?>
 <p:sld xmlns:a="http://schemas.openxmlformats.org/drawingml/2006/main" xmlns:r="http://schemas.openxmlformats.org/officeDocument/2006/relationships" xmlns:p="http://schemas.openxmlformats.org/presentationml/2006/main">
   <p:cSld>

</xml_diff>

<commit_message>
edit: Add link in vendor prefixes
</commit_message>
<xml_diff>
--- a/Introduction-to-CSS.pptx
+++ b/Introduction-to-CSS.pptx
@@ -153,7 +153,7 @@
   <pc:docChgLst>
     <pc:chgData name="anum sharma" userId="f66cf99955dbac7d" providerId="LiveId" clId="{6E04F4B5-AC0F-493B-B1A2-008A2E900AEB}"/>
     <pc:docChg chg="undo custSel addSld delSld modSld sldOrd">
-      <pc:chgData name="anum sharma" userId="f66cf99955dbac7d" providerId="LiveId" clId="{6E04F4B5-AC0F-493B-B1A2-008A2E900AEB}" dt="2018-01-07T08:05:39.111" v="11776" actId="20577"/>
+      <pc:chgData name="anum sharma" userId="f66cf99955dbac7d" providerId="LiveId" clId="{6E04F4B5-AC0F-493B-B1A2-008A2E900AEB}" dt="2018-01-07T08:07:32.581" v="11810" actId="20577"/>
       <pc:docMkLst>
         <pc:docMk/>
       </pc:docMkLst>
@@ -2334,7 +2334,7 @@
         </pc:spChg>
       </pc:sldChg>
       <pc:sldChg chg="modSp add">
-        <pc:chgData name="anum sharma" userId="f66cf99955dbac7d" providerId="LiveId" clId="{6E04F4B5-AC0F-493B-B1A2-008A2E900AEB}" dt="2018-01-07T08:05:39.111" v="11776" actId="20577"/>
+        <pc:chgData name="anum sharma" userId="f66cf99955dbac7d" providerId="LiveId" clId="{6E04F4B5-AC0F-493B-B1A2-008A2E900AEB}" dt="2018-01-07T08:07:32.581" v="11810" actId="20577"/>
         <pc:sldMkLst>
           <pc:docMk/>
           <pc:sldMk cId="2035962300" sldId="292"/>
@@ -2348,7 +2348,7 @@
           </ac:spMkLst>
         </pc:spChg>
         <pc:spChg chg="mod">
-          <ac:chgData name="anum sharma" userId="f66cf99955dbac7d" providerId="LiveId" clId="{6E04F4B5-AC0F-493B-B1A2-008A2E900AEB}" dt="2018-01-07T08:03:51.345" v="11740" actId="20577"/>
+          <ac:chgData name="anum sharma" userId="f66cf99955dbac7d" providerId="LiveId" clId="{6E04F4B5-AC0F-493B-B1A2-008A2E900AEB}" dt="2018-01-07T08:07:32.581" v="11810" actId="20577"/>
           <ac:spMkLst>
             <pc:docMk/>
             <pc:sldMk cId="2035962300" sldId="292"/>
@@ -38983,12 +38983,8 @@
           <a:lstStyle/>
           <a:p>
             <a:r>
-              <a:rPr lang="en-US"/>
-              <a:t>CSS Concept 8 </a:t>
-            </a:r>
-            <a:r>
               <a:rPr lang="en-US" dirty="0"/>
-              <a:t>- Vendor Prefixes</a:t>
+              <a:t>CSS Concept 8 - Vendor Prefixes</a:t>
             </a:r>
           </a:p>
         </p:txBody>
@@ -39096,6 +39092,35 @@
             <a:r>
               <a:rPr lang="en-US" dirty="0"/>
               <a:t>Opera(Opera)</a:t>
+            </a:r>
+          </a:p>
+          <a:p>
+            <a:pPr marL="914400" lvl="2" indent="0">
+              <a:buNone/>
+            </a:pPr>
+            <a:endParaRPr lang="en-US" dirty="0"/>
+          </a:p>
+          <a:p>
+            <a:pPr marL="114300" indent="0">
+              <a:buNone/>
+            </a:pPr>
+            <a:r>
+              <a:rPr lang="en-US" dirty="0"/>
+              <a:t>Which </a:t>
+            </a:r>
+            <a:r>
+              <a:rPr lang="en-US"/>
+              <a:t>vendor prefix - </a:t>
+            </a:r>
+            <a:r>
+              <a:rPr lang="en-US">
+                <a:hlinkClick r:id="rId2"/>
+              </a:rPr>
+              <a:t>https://ireade.github.io/which-vendor-prefix/</a:t>
+            </a:r>
+            <a:r>
+              <a:rPr lang="en-US"/>
+              <a:t> </a:t>
             </a:r>
           </a:p>
         </p:txBody>

</xml_diff>

<commit_message>
feat: Challenge 3 solved
</commit_message>
<xml_diff>
--- a/Introduction-to-CSS.pptx
+++ b/Introduction-to-CSS.pptx
@@ -42,6 +42,8 @@
     <p:sldId id="290" r:id="rId36"/>
     <p:sldId id="291" r:id="rId37"/>
     <p:sldId id="292" r:id="rId38"/>
+    <p:sldId id="293" r:id="rId39"/>
+    <p:sldId id="294" r:id="rId40"/>
   </p:sldIdLst>
   <p:sldSz cx="12192000" cy="6858000"/>
   <p:notesSz cx="6858000" cy="9144000"/>
@@ -153,7 +155,7 @@
   <pc:docChgLst>
     <pc:chgData name="anum sharma" userId="f66cf99955dbac7d" providerId="LiveId" clId="{6E04F4B5-AC0F-493B-B1A2-008A2E900AEB}"/>
     <pc:docChg chg="undo custSel addSld delSld modSld sldOrd">
-      <pc:chgData name="anum sharma" userId="f66cf99955dbac7d" providerId="LiveId" clId="{6E04F4B5-AC0F-493B-B1A2-008A2E900AEB}" dt="2018-01-07T08:07:32.581" v="11810" actId="20577"/>
+      <pc:chgData name="anum sharma" userId="f66cf99955dbac7d" providerId="LiveId" clId="{6E04F4B5-AC0F-493B-B1A2-008A2E900AEB}" dt="2018-01-07T08:31:40.561" v="11889" actId="1076"/>
       <pc:docMkLst>
         <pc:docMk/>
       </pc:docMkLst>
@@ -2355,6 +2357,76 @@
             <ac:spMk id="3" creationId="{53D65523-5D1A-47B5-A39C-81C22C6D6039}"/>
           </ac:spMkLst>
         </pc:spChg>
+      </pc:sldChg>
+      <pc:sldChg chg="modSp add">
+        <pc:chgData name="anum sharma" userId="f66cf99955dbac7d" providerId="LiveId" clId="{6E04F4B5-AC0F-493B-B1A2-008A2E900AEB}" dt="2018-01-07T08:25:33.092" v="11853" actId="5793"/>
+        <pc:sldMkLst>
+          <pc:docMk/>
+          <pc:sldMk cId="121705626" sldId="293"/>
+        </pc:sldMkLst>
+        <pc:spChg chg="mod">
+          <ac:chgData name="anum sharma" userId="f66cf99955dbac7d" providerId="LiveId" clId="{6E04F4B5-AC0F-493B-B1A2-008A2E900AEB}" dt="2018-01-07T08:24:25.898" v="11838" actId="14100"/>
+          <ac:spMkLst>
+            <pc:docMk/>
+            <pc:sldMk cId="121705626" sldId="293"/>
+            <ac:spMk id="2" creationId="{A5E2FA47-F95A-4594-A747-E259E1DC6802}"/>
+          </ac:spMkLst>
+        </pc:spChg>
+        <pc:spChg chg="mod">
+          <ac:chgData name="anum sharma" userId="f66cf99955dbac7d" providerId="LiveId" clId="{6E04F4B5-AC0F-493B-B1A2-008A2E900AEB}" dt="2018-01-07T08:25:33.092" v="11853" actId="5793"/>
+          <ac:spMkLst>
+            <pc:docMk/>
+            <pc:sldMk cId="121705626" sldId="293"/>
+            <ac:spMk id="3" creationId="{32F6686D-216F-4E9A-9137-15811675E8E8}"/>
+          </ac:spMkLst>
+        </pc:spChg>
+      </pc:sldChg>
+      <pc:sldChg chg="addSp delSp modSp add">
+        <pc:chgData name="anum sharma" userId="f66cf99955dbac7d" providerId="LiveId" clId="{6E04F4B5-AC0F-493B-B1A2-008A2E900AEB}" dt="2018-01-07T08:31:40.561" v="11889" actId="1076"/>
+        <pc:sldMkLst>
+          <pc:docMk/>
+          <pc:sldMk cId="2724543480" sldId="294"/>
+        </pc:sldMkLst>
+        <pc:spChg chg="mod">
+          <ac:chgData name="anum sharma" userId="f66cf99955dbac7d" providerId="LiveId" clId="{6E04F4B5-AC0F-493B-B1A2-008A2E900AEB}" dt="2018-01-07T08:31:33.073" v="11887"/>
+          <ac:spMkLst>
+            <pc:docMk/>
+            <pc:sldMk cId="2724543480" sldId="294"/>
+            <ac:spMk id="2" creationId="{A927901D-845A-4A11-A146-A52D5B329265}"/>
+          </ac:spMkLst>
+        </pc:spChg>
+        <pc:spChg chg="del">
+          <ac:chgData name="anum sharma" userId="f66cf99955dbac7d" providerId="LiveId" clId="{6E04F4B5-AC0F-493B-B1A2-008A2E900AEB}" dt="2018-01-07T08:28:35.711" v="11855" actId="931"/>
+          <ac:spMkLst>
+            <pc:docMk/>
+            <pc:sldMk cId="2724543480" sldId="294"/>
+            <ac:spMk id="3" creationId="{7D0DE2CE-DB61-44A2-95C4-ADEFDD17F089}"/>
+          </ac:spMkLst>
+        </pc:spChg>
+        <pc:spChg chg="add mod">
+          <ac:chgData name="anum sharma" userId="f66cf99955dbac7d" providerId="LiveId" clId="{6E04F4B5-AC0F-493B-B1A2-008A2E900AEB}" dt="2018-01-07T08:30:19.696" v="11868"/>
+          <ac:spMkLst>
+            <pc:docMk/>
+            <pc:sldMk cId="2724543480" sldId="294"/>
+            <ac:spMk id="8" creationId="{440651A2-DDB1-4088-B7C8-B778383C15CE}"/>
+          </ac:spMkLst>
+        </pc:spChg>
+        <pc:picChg chg="add mod">
+          <ac:chgData name="anum sharma" userId="f66cf99955dbac7d" providerId="LiveId" clId="{6E04F4B5-AC0F-493B-B1A2-008A2E900AEB}" dt="2018-01-07T08:31:38.396" v="11888" actId="1076"/>
+          <ac:picMkLst>
+            <pc:docMk/>
+            <pc:sldMk cId="2724543480" sldId="294"/>
+            <ac:picMk id="5" creationId="{55F922BC-E1A7-4E45-8F05-0DE786402B82}"/>
+          </ac:picMkLst>
+        </pc:picChg>
+        <pc:picChg chg="add mod">
+          <ac:chgData name="anum sharma" userId="f66cf99955dbac7d" providerId="LiveId" clId="{6E04F4B5-AC0F-493B-B1A2-008A2E900AEB}" dt="2018-01-07T08:31:40.561" v="11889" actId="1076"/>
+          <ac:picMkLst>
+            <pc:docMk/>
+            <pc:sldMk cId="2724543480" sldId="294"/>
+            <ac:picMk id="7" creationId="{5919B117-3402-41F9-9836-F3803246E0E2}"/>
+          </ac:picMkLst>
+        </pc:picChg>
       </pc:sldChg>
     </pc:docChg>
   </pc:docChgLst>
@@ -39106,20 +39178,16 @@
             </a:pPr>
             <a:r>
               <a:rPr lang="en-US" dirty="0"/>
-              <a:t>Which </a:t>
+              <a:t>Which vendor prefix - </a:t>
             </a:r>
             <a:r>
-              <a:rPr lang="en-US"/>
-              <a:t>vendor prefix - </a:t>
-            </a:r>
-            <a:r>
-              <a:rPr lang="en-US">
+              <a:rPr lang="en-US" dirty="0">
                 <a:hlinkClick r:id="rId2"/>
               </a:rPr>
               <a:t>https://ireade.github.io/which-vendor-prefix/</a:t>
             </a:r>
             <a:r>
-              <a:rPr lang="en-US"/>
+              <a:rPr lang="en-US" dirty="0"/>
               <a:t> </a:t>
             </a:r>
           </a:p>
@@ -39129,6 +39197,351 @@
     <p:extLst>
       <p:ext uri="{BB962C8B-B14F-4D97-AF65-F5344CB8AC3E}">
         <p14:creationId xmlns:p14="http://schemas.microsoft.com/office/powerpoint/2010/main" val="2035962300"/>
+      </p:ext>
+    </p:extLst>
+  </p:cSld>
+  <p:clrMapOvr>
+    <a:masterClrMapping/>
+  </p:clrMapOvr>
+</p:sld>
+</file>
+
+<file path=ppt/slides/slide38.xml><?xml version="1.0" encoding="utf-8"?>
+<p:sld xmlns:a="http://schemas.openxmlformats.org/drawingml/2006/main" xmlns:r="http://schemas.openxmlformats.org/officeDocument/2006/relationships" xmlns:p="http://schemas.openxmlformats.org/presentationml/2006/main">
+  <p:cSld>
+    <p:spTree>
+      <p:nvGrpSpPr>
+        <p:cNvPr id="1" name=""/>
+        <p:cNvGrpSpPr/>
+        <p:nvPr/>
+      </p:nvGrpSpPr>
+      <p:grpSpPr>
+        <a:xfrm>
+          <a:off x="0" y="0"/>
+          <a:ext cx="0" cy="0"/>
+          <a:chOff x="0" y="0"/>
+          <a:chExt cx="0" cy="0"/>
+        </a:xfrm>
+      </p:grpSpPr>
+      <p:sp>
+        <p:nvSpPr>
+          <p:cNvPr id="2" name="Title 1">
+            <a:extLst>
+              <a:ext uri="{FF2B5EF4-FFF2-40B4-BE49-F238E27FC236}">
+                <a16:creationId xmlns:a16="http://schemas.microsoft.com/office/drawing/2014/main" id="{A5E2FA47-F95A-4594-A747-E259E1DC6802}"/>
+              </a:ext>
+            </a:extLst>
+          </p:cNvPr>
+          <p:cNvSpPr>
+            <a:spLocks noGrp="1"/>
+          </p:cNvSpPr>
+          <p:nvPr>
+            <p:ph type="title"/>
+          </p:nvPr>
+        </p:nvSpPr>
+        <p:spPr>
+          <a:xfrm>
+            <a:off x="677334" y="609600"/>
+            <a:ext cx="8596668" cy="662609"/>
+          </a:xfrm>
+        </p:spPr>
+        <p:txBody>
+          <a:bodyPr/>
+          <a:lstStyle/>
+          <a:p>
+            <a:r>
+              <a:rPr lang="en-US" dirty="0"/>
+              <a:t>Challenge for this lesson </a:t>
+            </a:r>
+          </a:p>
+        </p:txBody>
+      </p:sp>
+      <p:sp>
+        <p:nvSpPr>
+          <p:cNvPr id="3" name="Content Placeholder 2">
+            <a:extLst>
+              <a:ext uri="{FF2B5EF4-FFF2-40B4-BE49-F238E27FC236}">
+                <a16:creationId xmlns:a16="http://schemas.microsoft.com/office/drawing/2014/main" id="{32F6686D-216F-4E9A-9137-15811675E8E8}"/>
+              </a:ext>
+            </a:extLst>
+          </p:cNvPr>
+          <p:cNvSpPr>
+            <a:spLocks noGrp="1"/>
+          </p:cNvSpPr>
+          <p:nvPr>
+            <p:ph idx="1"/>
+          </p:nvPr>
+        </p:nvSpPr>
+        <p:spPr>
+          <a:xfrm>
+            <a:off x="677334" y="1497980"/>
+            <a:ext cx="8596668" cy="3880773"/>
+          </a:xfrm>
+        </p:spPr>
+        <p:txBody>
+          <a:bodyPr>
+            <a:normAutofit lnSpcReduction="10000"/>
+          </a:bodyPr>
+          <a:lstStyle/>
+          <a:p>
+            <a:pPr marL="0" indent="0">
+              <a:buNone/>
+            </a:pPr>
+            <a:r>
+              <a:rPr lang="en-US" dirty="0"/>
+              <a:t>Add your styles below this :</a:t>
+            </a:r>
+          </a:p>
+          <a:p>
+            <a:r>
+              <a:rPr lang="en-US" dirty="0"/>
+              <a:t>1. set the .wrapper to a width of 70%.</a:t>
+            </a:r>
+          </a:p>
+          <a:p>
+            <a:r>
+              <a:rPr lang="en-US" dirty="0"/>
+              <a:t>2. for both the header and footer :</a:t>
+            </a:r>
+          </a:p>
+          <a:p>
+            <a:pPr marL="0" indent="0">
+              <a:buNone/>
+            </a:pPr>
+            <a:r>
+              <a:rPr lang="en-US" dirty="0"/>
+              <a:t>	set the background color to purple</a:t>
+            </a:r>
+          </a:p>
+          <a:p>
+            <a:pPr marL="0" indent="0">
+              <a:buNone/>
+            </a:pPr>
+            <a:r>
+              <a:rPr lang="en-US" dirty="0"/>
+              <a:t>	set the text color to white</a:t>
+            </a:r>
+          </a:p>
+          <a:p>
+            <a:r>
+              <a:rPr lang="en-US" dirty="0"/>
+              <a:t>	add a padding to all four sides of 30px</a:t>
+            </a:r>
+          </a:p>
+          <a:p>
+            <a:r>
+              <a:rPr lang="en-US" dirty="0"/>
+              <a:t>3. For the .content:</a:t>
+            </a:r>
+          </a:p>
+          <a:p>
+            <a:pPr marL="0" indent="0">
+              <a:buNone/>
+            </a:pPr>
+            <a:r>
+              <a:rPr lang="en-US" dirty="0"/>
+              <a:t>	add a 1px solid border colored black</a:t>
+            </a:r>
+          </a:p>
+          <a:p>
+            <a:pPr marL="0" indent="0">
+              <a:buNone/>
+            </a:pPr>
+            <a:r>
+              <a:rPr lang="en-US" dirty="0"/>
+              <a:t>	add a padding to all the four sides of 30px</a:t>
+            </a:r>
+          </a:p>
+          <a:p>
+            <a:pPr marL="0" indent="0">
+              <a:buNone/>
+            </a:pPr>
+            <a:r>
+              <a:rPr lang="en-US" dirty="0"/>
+              <a:t>	add a top and bottom margin of 10px</a:t>
+            </a:r>
+          </a:p>
+        </p:txBody>
+      </p:sp>
+    </p:spTree>
+    <p:extLst>
+      <p:ext uri="{BB962C8B-B14F-4D97-AF65-F5344CB8AC3E}">
+        <p14:creationId xmlns:p14="http://schemas.microsoft.com/office/powerpoint/2010/main" val="121705626"/>
+      </p:ext>
+    </p:extLst>
+  </p:cSld>
+  <p:clrMapOvr>
+    <a:masterClrMapping/>
+  </p:clrMapOvr>
+</p:sld>
+</file>
+
+<file path=ppt/slides/slide39.xml><?xml version="1.0" encoding="utf-8"?>
+<p:sld xmlns:a="http://schemas.openxmlformats.org/drawingml/2006/main" xmlns:r="http://schemas.openxmlformats.org/officeDocument/2006/relationships" xmlns:p="http://schemas.openxmlformats.org/presentationml/2006/main">
+  <p:cSld>
+    <p:spTree>
+      <p:nvGrpSpPr>
+        <p:cNvPr id="1" name=""/>
+        <p:cNvGrpSpPr/>
+        <p:nvPr/>
+      </p:nvGrpSpPr>
+      <p:grpSpPr>
+        <a:xfrm>
+          <a:off x="0" y="0"/>
+          <a:ext cx="0" cy="0"/>
+          <a:chOff x="0" y="0"/>
+          <a:chExt cx="0" cy="0"/>
+        </a:xfrm>
+      </p:grpSpPr>
+      <p:sp>
+        <p:nvSpPr>
+          <p:cNvPr id="2" name="Title 1">
+            <a:extLst>
+              <a:ext uri="{FF2B5EF4-FFF2-40B4-BE49-F238E27FC236}">
+                <a16:creationId xmlns:a16="http://schemas.microsoft.com/office/drawing/2014/main" id="{A927901D-845A-4A11-A146-A52D5B329265}"/>
+              </a:ext>
+            </a:extLst>
+          </p:cNvPr>
+          <p:cNvSpPr>
+            <a:spLocks noGrp="1"/>
+          </p:cNvSpPr>
+          <p:nvPr>
+            <p:ph type="title"/>
+          </p:nvPr>
+        </p:nvSpPr>
+        <p:spPr>
+          <a:xfrm>
+            <a:off x="742523" y="187000"/>
+            <a:ext cx="8596668" cy="1320800"/>
+          </a:xfrm>
+        </p:spPr>
+        <p:txBody>
+          <a:bodyPr/>
+          <a:lstStyle/>
+          <a:p>
+            <a:r>
+              <a:rPr lang="en-US" dirty="0">
+                <a:solidFill>
+                  <a:srgbClr val="7030A0"/>
+                </a:solidFill>
+              </a:rPr>
+              <a:t>Challenge Solved</a:t>
+            </a:r>
+          </a:p>
+        </p:txBody>
+      </p:sp>
+      <p:pic>
+        <p:nvPicPr>
+          <p:cNvPr id="5" name="Content Placeholder 4">
+            <a:extLst>
+              <a:ext uri="{FF2B5EF4-FFF2-40B4-BE49-F238E27FC236}">
+                <a16:creationId xmlns:a16="http://schemas.microsoft.com/office/drawing/2014/main" id="{55F922BC-E1A7-4E45-8F05-0DE786402B82}"/>
+              </a:ext>
+            </a:extLst>
+          </p:cNvPr>
+          <p:cNvPicPr>
+            <a:picLocks noGrp="1" noChangeAspect="1"/>
+          </p:cNvPicPr>
+          <p:nvPr>
+            <p:ph idx="1"/>
+          </p:nvPr>
+        </p:nvPicPr>
+        <p:blipFill>
+          <a:blip r:embed="rId2"/>
+          <a:stretch>
+            <a:fillRect/>
+          </a:stretch>
+        </p:blipFill>
+        <p:spPr>
+          <a:xfrm>
+            <a:off x="502081" y="1247451"/>
+            <a:ext cx="4210638" cy="4648849"/>
+          </a:xfrm>
+        </p:spPr>
+      </p:pic>
+      <p:pic>
+        <p:nvPicPr>
+          <p:cNvPr id="7" name="Picture 6" descr="A screenshot of a cell phone&#10;&#10;Description generated with very high confidence">
+            <a:extLst>
+              <a:ext uri="{FF2B5EF4-FFF2-40B4-BE49-F238E27FC236}">
+                <a16:creationId xmlns:a16="http://schemas.microsoft.com/office/drawing/2014/main" id="{5919B117-3402-41F9-9836-F3803246E0E2}"/>
+              </a:ext>
+            </a:extLst>
+          </p:cNvPr>
+          <p:cNvPicPr>
+            <a:picLocks noChangeAspect="1"/>
+          </p:cNvPicPr>
+          <p:nvPr/>
+        </p:nvPicPr>
+        <p:blipFill>
+          <a:blip r:embed="rId3"/>
+          <a:stretch>
+            <a:fillRect/>
+          </a:stretch>
+        </p:blipFill>
+        <p:spPr>
+          <a:xfrm>
+            <a:off x="5654691" y="1247450"/>
+            <a:ext cx="5384371" cy="4648849"/>
+          </a:xfrm>
+          <a:prstGeom prst="rect">
+            <a:avLst/>
+          </a:prstGeom>
+        </p:spPr>
+      </p:pic>
+      <p:sp>
+        <p:nvSpPr>
+          <p:cNvPr id="8" name="Arrow: Right 7">
+            <a:extLst>
+              <a:ext uri="{FF2B5EF4-FFF2-40B4-BE49-F238E27FC236}">
+                <a16:creationId xmlns:a16="http://schemas.microsoft.com/office/drawing/2014/main" id="{440651A2-DDB1-4088-B7C8-B778383C15CE}"/>
+              </a:ext>
+            </a:extLst>
+          </p:cNvPr>
+          <p:cNvSpPr/>
+          <p:nvPr/>
+        </p:nvSpPr>
+        <p:spPr>
+          <a:xfrm>
+            <a:off x="3671888" y="2971800"/>
+            <a:ext cx="1657350" cy="314325"/>
+          </a:xfrm>
+          <a:prstGeom prst="rightArrow">
+            <a:avLst/>
+          </a:prstGeom>
+          <a:solidFill>
+            <a:srgbClr val="7030A0"/>
+          </a:solidFill>
+        </p:spPr>
+        <p:style>
+          <a:lnRef idx="2">
+            <a:schemeClr val="accent1">
+              <a:shade val="50000"/>
+            </a:schemeClr>
+          </a:lnRef>
+          <a:fillRef idx="1">
+            <a:schemeClr val="accent1"/>
+          </a:fillRef>
+          <a:effectRef idx="0">
+            <a:schemeClr val="accent1"/>
+          </a:effectRef>
+          <a:fontRef idx="minor">
+            <a:schemeClr val="lt1"/>
+          </a:fontRef>
+        </p:style>
+        <p:txBody>
+          <a:bodyPr rtlCol="0" anchor="ctr"/>
+          <a:lstStyle/>
+          <a:p>
+            <a:pPr algn="ctr"/>
+            <a:endParaRPr lang="en-US"/>
+          </a:p>
+        </p:txBody>
+      </p:sp>
+    </p:spTree>
+    <p:extLst>
+      <p:ext uri="{BB962C8B-B14F-4D97-AF65-F5344CB8AC3E}">
+        <p14:creationId xmlns:p14="http://schemas.microsoft.com/office/powerpoint/2010/main" val="2724543480"/>
       </p:ext>
     </p:extLst>
   </p:cSld>

</xml_diff>

<commit_message>
feat: Structuring of page in CSS
</commit_message>
<xml_diff>
--- a/Introduction-to-CSS.pptx
+++ b/Introduction-to-CSS.pptx
@@ -44,6 +44,7 @@
     <p:sldId id="292" r:id="rId38"/>
     <p:sldId id="293" r:id="rId39"/>
     <p:sldId id="294" r:id="rId40"/>
+    <p:sldId id="295" r:id="rId41"/>
   </p:sldIdLst>
   <p:sldSz cx="12192000" cy="6858000"/>
   <p:notesSz cx="6858000" cy="9144000"/>
@@ -155,7 +156,7 @@
   <pc:docChgLst>
     <pc:chgData name="anum sharma" userId="f66cf99955dbac7d" providerId="LiveId" clId="{6E04F4B5-AC0F-493B-B1A2-008A2E900AEB}"/>
     <pc:docChg chg="undo custSel addSld delSld modSld sldOrd">
-      <pc:chgData name="anum sharma" userId="f66cf99955dbac7d" providerId="LiveId" clId="{6E04F4B5-AC0F-493B-B1A2-008A2E900AEB}" dt="2018-01-07T08:31:40.561" v="11889" actId="1076"/>
+      <pc:chgData name="anum sharma" userId="f66cf99955dbac7d" providerId="LiveId" clId="{6E04F4B5-AC0F-493B-B1A2-008A2E900AEB}" dt="2018-01-08T08:02:11.562" v="12097" actId="20577"/>
       <pc:docMkLst>
         <pc:docMk/>
       </pc:docMkLst>
@@ -2089,7 +2090,7 @@
         </pc:picChg>
       </pc:sldChg>
       <pc:sldChg chg="modSp add">
-        <pc:chgData name="anum sharma" userId="f66cf99955dbac7d" providerId="LiveId" clId="{6E04F4B5-AC0F-493B-B1A2-008A2E900AEB}" dt="2018-01-07T03:32:40.131" v="8394"/>
+        <pc:chgData name="anum sharma" userId="f66cf99955dbac7d" providerId="LiveId" clId="{6E04F4B5-AC0F-493B-B1A2-008A2E900AEB}" dt="2018-01-07T03:32:40.131" v="8394" actId="1076"/>
         <pc:sldMkLst>
           <pc:docMk/>
           <pc:sldMk cId="1277495974" sldId="283"/>
@@ -2103,7 +2104,7 @@
           </ac:spMkLst>
         </pc:spChg>
         <pc:spChg chg="mod">
-          <ac:chgData name="anum sharma" userId="f66cf99955dbac7d" providerId="LiveId" clId="{6E04F4B5-AC0F-493B-B1A2-008A2E900AEB}" dt="2018-01-07T03:32:40.131" v="8394"/>
+          <ac:chgData name="anum sharma" userId="f66cf99955dbac7d" providerId="LiveId" clId="{6E04F4B5-AC0F-493B-B1A2-008A2E900AEB}" dt="2018-01-07T03:32:40.131" v="8394" actId="1076"/>
           <ac:spMkLst>
             <pc:docMk/>
             <pc:sldMk cId="1277495974" sldId="283"/>
@@ -2388,7 +2389,7 @@
           <pc:sldMk cId="2724543480" sldId="294"/>
         </pc:sldMkLst>
         <pc:spChg chg="mod">
-          <ac:chgData name="anum sharma" userId="f66cf99955dbac7d" providerId="LiveId" clId="{6E04F4B5-AC0F-493B-B1A2-008A2E900AEB}" dt="2018-01-07T08:31:33.073" v="11887"/>
+          <ac:chgData name="anum sharma" userId="f66cf99955dbac7d" providerId="LiveId" clId="{6E04F4B5-AC0F-493B-B1A2-008A2E900AEB}" dt="2018-01-07T08:31:33.073" v="11887" actId="1076"/>
           <ac:spMkLst>
             <pc:docMk/>
             <pc:sldMk cId="2724543480" sldId="294"/>
@@ -2404,7 +2405,7 @@
           </ac:spMkLst>
         </pc:spChg>
         <pc:spChg chg="add mod">
-          <ac:chgData name="anum sharma" userId="f66cf99955dbac7d" providerId="LiveId" clId="{6E04F4B5-AC0F-493B-B1A2-008A2E900AEB}" dt="2018-01-07T08:30:19.696" v="11868"/>
+          <ac:chgData name="anum sharma" userId="f66cf99955dbac7d" providerId="LiveId" clId="{6E04F4B5-AC0F-493B-B1A2-008A2E900AEB}" dt="2018-01-07T08:30:19.696" v="11868" actId="1076"/>
           <ac:spMkLst>
             <pc:docMk/>
             <pc:sldMk cId="2724543480" sldId="294"/>
@@ -2427,6 +2428,29 @@
             <ac:picMk id="7" creationId="{5919B117-3402-41F9-9836-F3803246E0E2}"/>
           </ac:picMkLst>
         </pc:picChg>
+      </pc:sldChg>
+      <pc:sldChg chg="modSp add">
+        <pc:chgData name="anum sharma" userId="f66cf99955dbac7d" providerId="LiveId" clId="{6E04F4B5-AC0F-493B-B1A2-008A2E900AEB}" dt="2018-01-08T08:02:11.562" v="12097" actId="20577"/>
+        <pc:sldMkLst>
+          <pc:docMk/>
+          <pc:sldMk cId="4122480437" sldId="295"/>
+        </pc:sldMkLst>
+        <pc:spChg chg="mod">
+          <ac:chgData name="anum sharma" userId="f66cf99955dbac7d" providerId="LiveId" clId="{6E04F4B5-AC0F-493B-B1A2-008A2E900AEB}" dt="2018-01-08T07:56:13.019" v="11910" actId="27636"/>
+          <ac:spMkLst>
+            <pc:docMk/>
+            <pc:sldMk cId="4122480437" sldId="295"/>
+            <ac:spMk id="2" creationId="{CA35E1AB-F075-4774-9ED1-CA4DA6BADCCE}"/>
+          </ac:spMkLst>
+        </pc:spChg>
+        <pc:spChg chg="mod">
+          <ac:chgData name="anum sharma" userId="f66cf99955dbac7d" providerId="LiveId" clId="{6E04F4B5-AC0F-493B-B1A2-008A2E900AEB}" dt="2018-01-08T08:02:11.562" v="12097" actId="20577"/>
+          <ac:spMkLst>
+            <pc:docMk/>
+            <pc:sldMk cId="4122480437" sldId="295"/>
+            <ac:spMk id="3" creationId="{80057D45-2FFC-416D-A265-2694B37319B9}"/>
+          </ac:spMkLst>
+        </pc:spChg>
       </pc:sldChg>
     </pc:docChg>
   </pc:docChgLst>
@@ -23302,7 +23326,7 @@
   <inkml:trace contextRef="#ctx0" brushRef="#br0">4543 446</inkml:trace>
   <inkml:trace contextRef="#ctx0" brushRef="#br0" timeOffset="-5823.0882">733 827</inkml:trace>
   <inkml:trace contextRef="#ctx0" brushRef="#br0" timeOffset="-8691.763">1971 764,'6'0,"6"0,2 0</inkml:trace>
-  <inkml:trace contextRef="#ctx0" brushRef="#br0" timeOffset="-1375.6843">733 700,'5'0,"8"0,6 0,6 0,-1 6,0 1,2 0,1-2,3-1,0-1,1-2,1-1,0 0,0 0,0 0,0 0,0-1,0 1,0 0,0 0,-1 0,1 0,0 0,0 0,-1 0,1 0,0 0,0 0,-1 0,1 0,0 0,0 0,-1 0,1 0,0 0,0 0,-1 0,1 0,0 0,0 0,-1 0,1 0,0 0,0 0,-1 0,1 0,0 0,0 0,-1 0,1 0,0 0,0 0,-1 0,1 0,0 0,0 0,-1 0,1 0,0 0,0 0,-1 0,1 0,0 0,0 0,-1 0,1 0,0 0,0 0,-1 0,1 0,0 0,0-5,-1-3,1-4,0-1,0 3,-1 2,1 3,0 2,0 1,-1 2,1 0,0 1,0-1,-1 1,1-1,0 0,0 1,-1-1,1 0,0 0,0 0,-1 0,1 0,0 0,0 0,-1-1,1 1,0 0,0 0,-1 0,1 0,0 0,0 1,-1-1,1 0,0 0,0 0,-1 0,1 0,-6 0</inkml:trace>
+  <inkml:trace contextRef="#ctx0" brushRef="#br0" timeOffset="-1375.6842">733 700,'5'0,"8"0,6 0,6 0,-1 6,0 1,2 0,1-2,3-1,0-1,1-2,1-1,0 0,0 0,0 0,0 0,0-1,0 1,0 0,0 0,-1 0,1 0,0 0,0 0,-1 0,1 0,0 0,0 0,-1 0,1 0,0 0,0 0,-1 0,1 0,0 0,0 0,-1 0,1 0,0 0,0 0,-1 0,1 0,0 0,0 0,-1 0,1 0,0 0,0 0,-1 0,1 0,0 0,0 0,-1 0,1 0,0 0,0 0,-1 0,1 0,0 0,0 0,-1 0,1 0,0 0,0 0,-1 0,1 0,0 0,0 0,-1 0,1 0,0 0,0-5,-1-3,1-4,0-1,0 3,-1 2,1 3,0 2,0 1,-1 2,1 0,0 1,0-1,-1 1,1-1,0 0,0 1,-1-1,1 0,0 0,0 0,-1 0,1 0,0 0,0 0,-1-1,1 1,0 0,0 0,-1 0,1 0,0 0,0 1,-1-1,1 0,0 0,0 0,-1 0,1 0,-6 0</inkml:trace>
   <inkml:trace contextRef="#ctx0" brushRef="#br0" timeOffset="52746.6642">4162 161,'0'0,"0"0,0 0,0 0,0 0,0 0,0 0,0 0,0 0,0 0,0 0,0 0,0 0,0 0,0 0,0 0,0 0,0 0,0 0,0 5,0 2,0 0,0-2,0 5,0-1,0 5,0-1,0-2,0 2,0-1,0 3,0-1,0-3,0 2,0-2,0 4,0-1,0-4,0 3,0-1,0 3,0-2,0-2,0 2,0-2,0 4,0-1,0 2,0-2,0-2,0 1,0-1,0 3,0-2,0 3,0-1,0 2,0-2,0-4,0 2,0-1,0 3,0-2,0-2,0-4,0 3,0 0,0-3,0-1,0-3,0-1,0 4,0 1,0 0,0-2,0-2,0-1,0 0,0-2,0 0,0 5,0 2,0-1,0 0,0-3,0 0,0-2,0 0,0-1,0-1,0 1,0 0,0 0,0-1</inkml:trace>
   <inkml:trace contextRef="#ctx0" brushRef="#br0" timeOffset="54993.3656">4035 97,'0'0,"0"0,0 0,0 0,0 0,0 0,0 0,0 0,0 0,0 0,0 0,0 0,0 0,0 0,0 0,0 0,0 0,0 0,0 0,0 0,0 0,0 0,0 0,-5 0,-8 0,-1 0,-4-5,2-3,-3 2,-3 0,2 2,0 2,-3 0,-3 2,3 0,0 0,-1 0,-2 1,-2-1,-2 0,-1 0,-1 0,6 0,-5 0,-1-5,-2-2,1 0,-6 1,4 2,3 2,1 1,1 0,-1 1,1 0,-1 1,0-1,-6 0,-2 0,0 0,2 1,1-1,2 0,-4 0,-2-6,2-1,1 0,1 2,2 1,7 1,2 2,0 0,-1 1,-1 1,3-1,1 0,-1 0,-2 1,-2-1,-2 0,5 0,0 0,-5 0,2 0,-6 0,4 0,-4 0,4 0,-4 0,-2 0,0 0,1 0,6 0,3 0,0 0,0 0,-2 0,-1 0,-2 5,0 2,0 0,-1-1,0-2,0-2,0-1,-5 0,-2 4,0 2,2 0,-4-2,5-1,3-2,2 5,-5 0,-1 0,0-2,1-1,-4-2,-1-1,1-1,2 0,-3 0,0 5,1 2,-3 0,1-2,-5-1,2 4,2 0,-1-1,0-1,-3-2,2-2,2-1,4-1,3 0,2 0,-4-1,-1 1,1 0,6 0,5-1,0 1,5 0,1 0,4 0,-1 0,-2 0,2 0,4 0,-1 1,2-1,4 0,2 0,-2 0,0 0,2 0,2 0,2 0,1 0,1 0,1 0,0 0,1 0,-1 0,0 0,1 0,-1 0,0 5,0 2,0 0,0-2,0-1,0-1,0-2,0 5,0 1,0 0,0-2,0 4,0 0,0-1,0 4,0-1,0 3,0 5,0-1,5 2,2-2,6 1,-1 2,-1-2,2 2,0-4,-3 1,2-2,-1 1,-2-2,3-4,-1 2,-2-1,2 2,0-1,4-2,-2 2,-2 4,2-1,-1 3,3-3,-2 2,-2-2,-3 1,-4-1,4-5,0 2,4-1,0 2,-2 0,-2-4,2-3,0-2,-2 3,3 0,0-2,-3-1,4 4,-1 0,-2-1,-2-2,2-3,0-1,-1 5,3 0,0 0,-3-2,4-2,-1 0,4-2,-2-1,-2 0,2 0,-1-1,3 1,-1 0,-4 0,3 0,-1-1,-3 1,-2 0,-4 0,-1 0,4 0,1 0,0 0,-2 1,-2-1,-1 0,-1 0,0 0,-1 0,-1 0,1 0,0 0</inkml:trace>
 </inkml:ink>
@@ -24031,7 +24055,7 @@
             <a:fld id="{B61BEF0D-F0BB-DE4B-95CE-6DB70DBA9567}" type="datetimeFigureOut">
               <a:rPr lang="en-US" smtClean="0"/>
               <a:pPr/>
-              <a:t>1/6/2018</a:t>
+              <a:t>1/7/2018</a:t>
             </a:fld>
             <a:endParaRPr lang="en-US" dirty="0"/>
           </a:p>
@@ -24284,7 +24308,7 @@
             <a:fld id="{B61BEF0D-F0BB-DE4B-95CE-6DB70DBA9567}" type="datetimeFigureOut">
               <a:rPr lang="en-US" smtClean="0"/>
               <a:pPr/>
-              <a:t>1/6/2018</a:t>
+              <a:t>1/7/2018</a:t>
             </a:fld>
             <a:endParaRPr lang="en-US" dirty="0"/>
           </a:p>
@@ -24600,7 +24624,7 @@
             <a:fld id="{B61BEF0D-F0BB-DE4B-95CE-6DB70DBA9567}" type="datetimeFigureOut">
               <a:rPr lang="en-US" smtClean="0"/>
               <a:pPr/>
-              <a:t>1/6/2018</a:t>
+              <a:t>1/7/2018</a:t>
             </a:fld>
             <a:endParaRPr lang="en-US" dirty="0"/>
           </a:p>
@@ -24943,7 +24967,7 @@
             <a:fld id="{B61BEF0D-F0BB-DE4B-95CE-6DB70DBA9567}" type="datetimeFigureOut">
               <a:rPr lang="en-US" smtClean="0"/>
               <a:pPr/>
-              <a:t>1/6/2018</a:t>
+              <a:t>1/7/2018</a:t>
             </a:fld>
             <a:endParaRPr lang="en-US" dirty="0"/>
           </a:p>
@@ -25259,7 +25283,7 @@
             <a:fld id="{B61BEF0D-F0BB-DE4B-95CE-6DB70DBA9567}" type="datetimeFigureOut">
               <a:rPr lang="en-US" smtClean="0"/>
               <a:pPr/>
-              <a:t>1/6/2018</a:t>
+              <a:t>1/7/2018</a:t>
             </a:fld>
             <a:endParaRPr lang="en-US" dirty="0"/>
           </a:p>
@@ -25654,7 +25678,7 @@
             <a:fld id="{B61BEF0D-F0BB-DE4B-95CE-6DB70DBA9567}" type="datetimeFigureOut">
               <a:rPr lang="en-US" smtClean="0"/>
               <a:pPr/>
-              <a:t>1/6/2018</a:t>
+              <a:t>1/7/2018</a:t>
             </a:fld>
             <a:endParaRPr lang="en-US" dirty="0"/>
           </a:p>
@@ -25825,7 +25849,7 @@
           <a:p>
             <a:fld id="{55C6B4A9-1611-4792-9094-5F34BCA07E0B}" type="datetimeFigureOut">
               <a:rPr lang="en-US" smtClean="0"/>
-              <a:t>1/6/2018</a:t>
+              <a:t>1/7/2018</a:t>
             </a:fld>
             <a:endParaRPr lang="en-US" dirty="0"/>
           </a:p>
@@ -26006,7 +26030,7 @@
             <a:fld id="{B61BEF0D-F0BB-DE4B-95CE-6DB70DBA9567}" type="datetimeFigureOut">
               <a:rPr lang="en-US" smtClean="0"/>
               <a:pPr/>
-              <a:t>1/6/2018</a:t>
+              <a:t>1/7/2018</a:t>
             </a:fld>
             <a:endParaRPr lang="en-US" dirty="0"/>
           </a:p>
@@ -26184,7 +26208,7 @@
             <a:fld id="{B61BEF0D-F0BB-DE4B-95CE-6DB70DBA9567}" type="datetimeFigureOut">
               <a:rPr lang="en-US" smtClean="0"/>
               <a:pPr/>
-              <a:t>1/6/2018</a:t>
+              <a:t>1/7/2018</a:t>
             </a:fld>
             <a:endParaRPr lang="en-US" dirty="0"/>
           </a:p>
@@ -26433,7 +26457,7 @@
             <a:fld id="{B61BEF0D-F0BB-DE4B-95CE-6DB70DBA9567}" type="datetimeFigureOut">
               <a:rPr lang="en-US" smtClean="0"/>
               <a:pPr/>
-              <a:t>1/6/2018</a:t>
+              <a:t>1/7/2018</a:t>
             </a:fld>
             <a:endParaRPr lang="en-US" dirty="0"/>
           </a:p>
@@ -26666,7 +26690,7 @@
           <a:p>
             <a:fld id="{EB712588-04B1-427B-82EE-E8DB90309F08}" type="datetimeFigureOut">
               <a:rPr lang="en-US" smtClean="0"/>
-              <a:t>1/6/2018</a:t>
+              <a:t>1/7/2018</a:t>
             </a:fld>
             <a:endParaRPr lang="en-US" dirty="0"/>
           </a:p>
@@ -27041,7 +27065,7 @@
             <a:fld id="{B61BEF0D-F0BB-DE4B-95CE-6DB70DBA9567}" type="datetimeFigureOut">
               <a:rPr lang="en-US" smtClean="0"/>
               <a:pPr/>
-              <a:t>1/6/2018</a:t>
+              <a:t>1/7/2018</a:t>
             </a:fld>
             <a:endParaRPr lang="en-US" dirty="0"/>
           </a:p>
@@ -27166,7 +27190,7 @@
             <a:fld id="{B61BEF0D-F0BB-DE4B-95CE-6DB70DBA9567}" type="datetimeFigureOut">
               <a:rPr lang="en-US" smtClean="0"/>
               <a:pPr/>
-              <a:t>1/6/2018</a:t>
+              <a:t>1/7/2018</a:t>
             </a:fld>
             <a:endParaRPr lang="en-US" dirty="0"/>
           </a:p>
@@ -27263,7 +27287,7 @@
             <a:fld id="{B61BEF0D-F0BB-DE4B-95CE-6DB70DBA9567}" type="datetimeFigureOut">
               <a:rPr lang="en-US" smtClean="0"/>
               <a:pPr/>
-              <a:t>1/6/2018</a:t>
+              <a:t>1/7/2018</a:t>
             </a:fld>
             <a:endParaRPr lang="en-US" dirty="0"/>
           </a:p>
@@ -27519,7 +27543,7 @@
           <a:p>
             <a:fld id="{42A54C80-263E-416B-A8E0-580EDEADCBDC}" type="datetimeFigureOut">
               <a:rPr lang="en-US" smtClean="0"/>
-              <a:t>1/6/2018</a:t>
+              <a:t>1/7/2018</a:t>
             </a:fld>
             <a:endParaRPr lang="en-US" dirty="0"/>
           </a:p>
@@ -27783,7 +27807,7 @@
             <a:fld id="{B61BEF0D-F0BB-DE4B-95CE-6DB70DBA9567}" type="datetimeFigureOut">
               <a:rPr lang="en-US" smtClean="0"/>
               <a:pPr/>
-              <a:t>1/6/2018</a:t>
+              <a:t>1/7/2018</a:t>
             </a:fld>
             <a:endParaRPr lang="en-US" dirty="0"/>
           </a:p>
@@ -28528,7 +28552,7 @@
             <a:fld id="{B61BEF0D-F0BB-DE4B-95CE-6DB70DBA9567}" type="datetimeFigureOut">
               <a:rPr lang="en-US" smtClean="0"/>
               <a:pPr/>
-              <a:t>1/6/2018</a:t>
+              <a:t>1/7/2018</a:t>
             </a:fld>
             <a:endParaRPr lang="en-US" dirty="0"/>
           </a:p>
@@ -40374,6 +40398,139 @@
 </p:sld>
 </file>
 
+<file path=ppt/slides/slide40.xml><?xml version="1.0" encoding="utf-8"?>
+<p:sld xmlns:a="http://schemas.openxmlformats.org/drawingml/2006/main" xmlns:r="http://schemas.openxmlformats.org/officeDocument/2006/relationships" xmlns:p="http://schemas.openxmlformats.org/presentationml/2006/main">
+  <p:cSld>
+    <p:spTree>
+      <p:nvGrpSpPr>
+        <p:cNvPr id="1" name=""/>
+        <p:cNvGrpSpPr/>
+        <p:nvPr/>
+      </p:nvGrpSpPr>
+      <p:grpSpPr>
+        <a:xfrm>
+          <a:off x="0" y="0"/>
+          <a:ext cx="0" cy="0"/>
+          <a:chOff x="0" y="0"/>
+          <a:chExt cx="0" cy="0"/>
+        </a:xfrm>
+      </p:grpSpPr>
+      <p:sp>
+        <p:nvSpPr>
+          <p:cNvPr id="2" name="Title 1">
+            <a:extLst>
+              <a:ext uri="{FF2B5EF4-FFF2-40B4-BE49-F238E27FC236}">
+                <a16:creationId xmlns:a16="http://schemas.microsoft.com/office/drawing/2014/main" id="{CA35E1AB-F075-4774-9ED1-CA4DA6BADCCE}"/>
+              </a:ext>
+            </a:extLst>
+          </p:cNvPr>
+          <p:cNvSpPr>
+            <a:spLocks noGrp="1"/>
+          </p:cNvSpPr>
+          <p:nvPr>
+            <p:ph type="title"/>
+          </p:nvPr>
+        </p:nvSpPr>
+        <p:spPr>
+          <a:xfrm>
+            <a:off x="677334" y="609600"/>
+            <a:ext cx="8596668" cy="609600"/>
+          </a:xfrm>
+        </p:spPr>
+        <p:txBody>
+          <a:bodyPr>
+            <a:normAutofit fontScale="90000"/>
+          </a:bodyPr>
+          <a:lstStyle/>
+          <a:p>
+            <a:r>
+              <a:rPr lang="en-US" dirty="0"/>
+              <a:t>Structuring a Page</a:t>
+            </a:r>
+          </a:p>
+        </p:txBody>
+      </p:sp>
+      <p:sp>
+        <p:nvSpPr>
+          <p:cNvPr id="3" name="Content Placeholder 2">
+            <a:extLst>
+              <a:ext uri="{FF2B5EF4-FFF2-40B4-BE49-F238E27FC236}">
+                <a16:creationId xmlns:a16="http://schemas.microsoft.com/office/drawing/2014/main" id="{80057D45-2FFC-416D-A265-2694B37319B9}"/>
+              </a:ext>
+            </a:extLst>
+          </p:cNvPr>
+          <p:cNvSpPr>
+            <a:spLocks noGrp="1"/>
+          </p:cNvSpPr>
+          <p:nvPr>
+            <p:ph idx="1"/>
+          </p:nvPr>
+        </p:nvSpPr>
+        <p:spPr>
+          <a:xfrm>
+            <a:off x="677334" y="1352207"/>
+            <a:ext cx="8596668" cy="3880773"/>
+          </a:xfrm>
+        </p:spPr>
+        <p:txBody>
+          <a:bodyPr/>
+          <a:lstStyle/>
+          <a:p>
+            <a:r>
+              <a:rPr lang="en-US" dirty="0"/>
+              <a:t>HTML page layouts options for structing a page:</a:t>
+            </a:r>
+          </a:p>
+          <a:p>
+            <a:pPr lvl="1"/>
+            <a:r>
+              <a:rPr lang="en-US" dirty="0"/>
+              <a:t>Tables</a:t>
+            </a:r>
+          </a:p>
+          <a:p>
+            <a:pPr lvl="1"/>
+            <a:r>
+              <a:rPr lang="en-US" dirty="0"/>
+              <a:t>Floats and clears </a:t>
+            </a:r>
+          </a:p>
+          <a:p>
+            <a:pPr lvl="1"/>
+            <a:r>
+              <a:rPr lang="en-US" dirty="0"/>
+              <a:t>CSS frameworks and Grid</a:t>
+            </a:r>
+          </a:p>
+          <a:p>
+            <a:pPr lvl="1"/>
+            <a:r>
+              <a:rPr lang="en-US" dirty="0"/>
+              <a:t>Flexbox</a:t>
+            </a:r>
+          </a:p>
+          <a:p>
+            <a:pPr lvl="1"/>
+            <a:r>
+              <a:rPr lang="en-US" dirty="0"/>
+              <a:t>CSS Grid (New)</a:t>
+            </a:r>
+          </a:p>
+        </p:txBody>
+      </p:sp>
+    </p:spTree>
+    <p:extLst>
+      <p:ext uri="{BB962C8B-B14F-4D97-AF65-F5344CB8AC3E}">
+        <p14:creationId xmlns:p14="http://schemas.microsoft.com/office/powerpoint/2010/main" val="4122480437"/>
+      </p:ext>
+    </p:extLst>
+  </p:cSld>
+  <p:clrMapOvr>
+    <a:masterClrMapping/>
+  </p:clrMapOvr>
+</p:sld>
+</file>
+
 <file path=ppt/slides/slide5.xml><?xml version="1.0" encoding="utf-8"?>
 <p:sld xmlns:a="http://schemas.openxmlformats.org/drawingml/2006/main" xmlns:r="http://schemas.openxmlformats.org/officeDocument/2006/relationships" xmlns:p="http://schemas.openxmlformats.org/presentationml/2006/main">
   <p:cSld>

</xml_diff>